<commit_message>
insight of analysis part
insight part changed from highest to lowest external debt.
</commit_message>
<xml_diff>
--- a/Term Presentation MSDS7330-404 GrpB.pptx
+++ b/Term Presentation MSDS7330-404 GrpB.pptx
@@ -120,6 +120,10 @@
 </p:presentation>
 </file>
 
+<file path=ppt/revisionInfo.xml><?xml version="1.0" encoding="utf-8"?>
+<p1510:revInfo xmlns:a="http://schemas.openxmlformats.org/drawingml/2006/main" xmlns:r="http://schemas.openxmlformats.org/officeDocument/2006/relationships" xmlns:p1510="http://schemas.microsoft.com/office/powerpoint/2015/10/main"/>
+</file>
+
 <file path=ppt/notesMasters/notesMaster1.xml><?xml version="1.0" encoding="utf-8"?>
 <p:notesMaster xmlns:a="http://schemas.openxmlformats.org/drawingml/2006/main" xmlns:r="http://schemas.openxmlformats.org/officeDocument/2006/relationships" xmlns:p="http://schemas.openxmlformats.org/presentationml/2006/main">
   <p:cSld>
@@ -202,7 +206,7 @@
           <a:p>
             <a:fld id="{3B223B20-14E5-414C-943F-923CD8C3ABC0}" type="datetimeFigureOut">
               <a:rPr lang="en-US" smtClean="0"/>
-              <a:t>11/29/17</a:t>
+              <a:t>11/29/2017</a:t>
             </a:fld>
             <a:endParaRPr lang="en-US"/>
           </a:p>
@@ -266,38 +270,37 @@
           <a:p>
             <a:pPr lvl="0"/>
             <a:r>
-              <a:rPr lang="en-US" smtClean="0"/>
+              <a:rPr lang="en-US"/>
               <a:t>Click to edit Master text styles</a:t>
             </a:r>
           </a:p>
           <a:p>
             <a:pPr lvl="1"/>
             <a:r>
-              <a:rPr lang="en-US" smtClean="0"/>
+              <a:rPr lang="en-US"/>
               <a:t>Second level</a:t>
             </a:r>
           </a:p>
           <a:p>
             <a:pPr lvl="2"/>
             <a:r>
-              <a:rPr lang="en-US" smtClean="0"/>
+              <a:rPr lang="en-US"/>
               <a:t>Third level</a:t>
             </a:r>
           </a:p>
           <a:p>
             <a:pPr lvl="3"/>
             <a:r>
-              <a:rPr lang="en-US" smtClean="0"/>
+              <a:rPr lang="en-US"/>
               <a:t>Fourth level</a:t>
             </a:r>
           </a:p>
           <a:p>
             <a:pPr lvl="4"/>
             <a:r>
-              <a:rPr lang="en-US" smtClean="0"/>
+              <a:rPr lang="en-US"/>
               <a:t>Fifth level</a:t>
             </a:r>
-            <a:endParaRPr lang="en-US"/>
           </a:p>
         </p:txBody>
       </p:sp>
@@ -526,7 +529,7 @@
           </a:lstStyle>
           <a:p>
             <a:r>
-              <a:rPr lang="en-US" smtClean="0"/>
+              <a:rPr lang="en-US"/>
               <a:t>Click to edit Master title style</a:t>
             </a:r>
             <a:endParaRPr lang="en-US" dirty="0"/>
@@ -602,7 +605,7 @@
           </a:lstStyle>
           <a:p>
             <a:r>
-              <a:rPr lang="en-US" smtClean="0"/>
+              <a:rPr lang="en-US"/>
               <a:t>Click to edit Master subtitle style</a:t>
             </a:r>
             <a:endParaRPr lang="en-US" dirty="0"/>
@@ -639,7 +642,7 @@
           <a:p>
             <a:fld id="{19BFB1E6-C45E-FB40-AD8E-8FF72B5CFFBD}" type="datetimeFigureOut">
               <a:rPr lang="en-US" smtClean="0"/>
-              <a:t>11/29/17</a:t>
+              <a:t>11/29/2017</a:t>
             </a:fld>
             <a:endParaRPr lang="en-US"/>
           </a:p>
@@ -883,7 +886,7 @@
           <a:lstStyle/>
           <a:p>
             <a:r>
-              <a:rPr lang="en-US" smtClean="0"/>
+              <a:rPr lang="en-US"/>
               <a:t>Click to edit Master title style</a:t>
             </a:r>
             <a:endParaRPr lang="en-US" dirty="0"/>
@@ -912,35 +915,35 @@
           <a:p>
             <a:pPr lvl="0"/>
             <a:r>
-              <a:rPr lang="en-US" smtClean="0"/>
+              <a:rPr lang="en-US"/>
               <a:t>Click to edit Master text styles</a:t>
             </a:r>
           </a:p>
           <a:p>
             <a:pPr lvl="1"/>
             <a:r>
-              <a:rPr lang="en-US" smtClean="0"/>
+              <a:rPr lang="en-US"/>
               <a:t>Second level</a:t>
             </a:r>
           </a:p>
           <a:p>
             <a:pPr lvl="2"/>
             <a:r>
-              <a:rPr lang="en-US" smtClean="0"/>
+              <a:rPr lang="en-US"/>
               <a:t>Third level</a:t>
             </a:r>
           </a:p>
           <a:p>
             <a:pPr lvl="3"/>
             <a:r>
-              <a:rPr lang="en-US" smtClean="0"/>
+              <a:rPr lang="en-US"/>
               <a:t>Fourth level</a:t>
             </a:r>
           </a:p>
           <a:p>
             <a:pPr lvl="4"/>
             <a:r>
-              <a:rPr lang="en-US" smtClean="0"/>
+              <a:rPr lang="en-US"/>
               <a:t>Fifth level</a:t>
             </a:r>
             <a:endParaRPr lang="en-US" dirty="0"/>
@@ -964,7 +967,7 @@
           <a:p>
             <a:fld id="{19BFB1E6-C45E-FB40-AD8E-8FF72B5CFFBD}" type="datetimeFigureOut">
               <a:rPr lang="en-US" smtClean="0"/>
-              <a:t>11/29/17</a:t>
+              <a:t>11/29/2017</a:t>
             </a:fld>
             <a:endParaRPr lang="en-US"/>
           </a:p>
@@ -1058,7 +1061,7 @@
           <a:lstStyle/>
           <a:p>
             <a:r>
-              <a:rPr lang="en-US" smtClean="0"/>
+              <a:rPr lang="en-US"/>
               <a:t>Click to edit Master title style</a:t>
             </a:r>
             <a:endParaRPr lang="en-US" dirty="0"/>
@@ -1087,35 +1090,35 @@
           <a:p>
             <a:pPr lvl="0"/>
             <a:r>
-              <a:rPr lang="en-US" smtClean="0"/>
+              <a:rPr lang="en-US"/>
               <a:t>Click to edit Master text styles</a:t>
             </a:r>
           </a:p>
           <a:p>
             <a:pPr lvl="1"/>
             <a:r>
-              <a:rPr lang="en-US" smtClean="0"/>
+              <a:rPr lang="en-US"/>
               <a:t>Second level</a:t>
             </a:r>
           </a:p>
           <a:p>
             <a:pPr lvl="2"/>
             <a:r>
-              <a:rPr lang="en-US" smtClean="0"/>
+              <a:rPr lang="en-US"/>
               <a:t>Third level</a:t>
             </a:r>
           </a:p>
           <a:p>
             <a:pPr lvl="3"/>
             <a:r>
-              <a:rPr lang="en-US" smtClean="0"/>
+              <a:rPr lang="en-US"/>
               <a:t>Fourth level</a:t>
             </a:r>
           </a:p>
           <a:p>
             <a:pPr lvl="4"/>
             <a:r>
-              <a:rPr lang="en-US" smtClean="0"/>
+              <a:rPr lang="en-US"/>
               <a:t>Fifth level</a:t>
             </a:r>
             <a:endParaRPr lang="en-US" dirty="0"/>
@@ -1139,7 +1142,7 @@
           <a:p>
             <a:fld id="{19BFB1E6-C45E-FB40-AD8E-8FF72B5CFFBD}" type="datetimeFigureOut">
               <a:rPr lang="en-US" smtClean="0"/>
-              <a:t>11/29/17</a:t>
+              <a:t>11/29/2017</a:t>
             </a:fld>
             <a:endParaRPr lang="en-US"/>
           </a:p>
@@ -1228,7 +1231,7 @@
           <a:lstStyle/>
           <a:p>
             <a:r>
-              <a:rPr lang="en-US" smtClean="0"/>
+              <a:rPr lang="en-US"/>
               <a:t>Click to edit Master title style</a:t>
             </a:r>
             <a:endParaRPr lang="en-US" dirty="0"/>
@@ -1252,35 +1255,35 @@
           <a:p>
             <a:pPr lvl="0"/>
             <a:r>
-              <a:rPr lang="en-US" smtClean="0"/>
+              <a:rPr lang="en-US"/>
               <a:t>Click to edit Master text styles</a:t>
             </a:r>
           </a:p>
           <a:p>
             <a:pPr lvl="1"/>
             <a:r>
-              <a:rPr lang="en-US" smtClean="0"/>
+              <a:rPr lang="en-US"/>
               <a:t>Second level</a:t>
             </a:r>
           </a:p>
           <a:p>
             <a:pPr lvl="2"/>
             <a:r>
-              <a:rPr lang="en-US" smtClean="0"/>
+              <a:rPr lang="en-US"/>
               <a:t>Third level</a:t>
             </a:r>
           </a:p>
           <a:p>
             <a:pPr lvl="3"/>
             <a:r>
-              <a:rPr lang="en-US" smtClean="0"/>
+              <a:rPr lang="en-US"/>
               <a:t>Fourth level</a:t>
             </a:r>
           </a:p>
           <a:p>
             <a:pPr lvl="4"/>
             <a:r>
-              <a:rPr lang="en-US" smtClean="0"/>
+              <a:rPr lang="en-US"/>
               <a:t>Fifth level</a:t>
             </a:r>
             <a:endParaRPr lang="en-US" dirty="0"/>
@@ -1304,7 +1307,7 @@
           <a:p>
             <a:fld id="{19BFB1E6-C45E-FB40-AD8E-8FF72B5CFFBD}" type="datetimeFigureOut">
               <a:rPr lang="en-US" smtClean="0"/>
-              <a:t>11/29/17</a:t>
+              <a:t>11/29/2017</a:t>
             </a:fld>
             <a:endParaRPr lang="en-US"/>
           </a:p>
@@ -1413,7 +1416,7 @@
           </a:lstStyle>
           <a:p>
             <a:r>
-              <a:rPr lang="en-US" smtClean="0"/>
+              <a:rPr lang="en-US"/>
               <a:t>Click to edit Master title style</a:t>
             </a:r>
             <a:endParaRPr lang="en-US" dirty="0"/>
@@ -1540,7 +1543,7 @@
           <a:p>
             <a:pPr lvl="0"/>
             <a:r>
-              <a:rPr lang="en-US" smtClean="0"/>
+              <a:rPr lang="en-US"/>
               <a:t>Click to edit Master text styles</a:t>
             </a:r>
           </a:p>
@@ -1576,7 +1579,7 @@
           <a:p>
             <a:fld id="{19BFB1E6-C45E-FB40-AD8E-8FF72B5CFFBD}" type="datetimeFigureOut">
               <a:rPr lang="en-US" smtClean="0"/>
-              <a:t>11/29/17</a:t>
+              <a:t>11/29/2017</a:t>
             </a:fld>
             <a:endParaRPr lang="en-US"/>
           </a:p>
@@ -1755,7 +1758,7 @@
           </a:lstStyle>
           <a:p>
             <a:r>
-              <a:rPr lang="en-US" smtClean="0"/>
+              <a:rPr lang="en-US"/>
               <a:t>Click to edit Master title style</a:t>
             </a:r>
             <a:endParaRPr lang="en-US" dirty="0"/>
@@ -1820,35 +1823,35 @@
           <a:p>
             <a:pPr lvl="0"/>
             <a:r>
-              <a:rPr lang="en-US" smtClean="0"/>
+              <a:rPr lang="en-US"/>
               <a:t>Click to edit Master text styles</a:t>
             </a:r>
           </a:p>
           <a:p>
             <a:pPr lvl="1"/>
             <a:r>
-              <a:rPr lang="en-US" smtClean="0"/>
+              <a:rPr lang="en-US"/>
               <a:t>Second level</a:t>
             </a:r>
           </a:p>
           <a:p>
             <a:pPr lvl="2"/>
             <a:r>
-              <a:rPr lang="en-US" smtClean="0"/>
+              <a:rPr lang="en-US"/>
               <a:t>Third level</a:t>
             </a:r>
           </a:p>
           <a:p>
             <a:pPr lvl="3"/>
             <a:r>
-              <a:rPr lang="en-US" smtClean="0"/>
+              <a:rPr lang="en-US"/>
               <a:t>Fourth level</a:t>
             </a:r>
           </a:p>
           <a:p>
             <a:pPr lvl="4"/>
             <a:r>
-              <a:rPr lang="en-US" smtClean="0"/>
+              <a:rPr lang="en-US"/>
               <a:t>Fifth level</a:t>
             </a:r>
             <a:endParaRPr lang="en-US" dirty="0"/>
@@ -1913,35 +1916,35 @@
           <a:p>
             <a:pPr lvl="0"/>
             <a:r>
-              <a:rPr lang="en-US" smtClean="0"/>
+              <a:rPr lang="en-US"/>
               <a:t>Click to edit Master text styles</a:t>
             </a:r>
           </a:p>
           <a:p>
             <a:pPr lvl="1"/>
             <a:r>
-              <a:rPr lang="en-US" smtClean="0"/>
+              <a:rPr lang="en-US"/>
               <a:t>Second level</a:t>
             </a:r>
           </a:p>
           <a:p>
             <a:pPr lvl="2"/>
             <a:r>
-              <a:rPr lang="en-US" smtClean="0"/>
+              <a:rPr lang="en-US"/>
               <a:t>Third level</a:t>
             </a:r>
           </a:p>
           <a:p>
             <a:pPr lvl="3"/>
             <a:r>
-              <a:rPr lang="en-US" smtClean="0"/>
+              <a:rPr lang="en-US"/>
               <a:t>Fourth level</a:t>
             </a:r>
           </a:p>
           <a:p>
             <a:pPr lvl="4"/>
             <a:r>
-              <a:rPr lang="en-US" smtClean="0"/>
+              <a:rPr lang="en-US"/>
               <a:t>Fifth level</a:t>
             </a:r>
             <a:endParaRPr lang="en-US" dirty="0"/>
@@ -1965,7 +1968,7 @@
           <a:p>
             <a:fld id="{19BFB1E6-C45E-FB40-AD8E-8FF72B5CFFBD}" type="datetimeFigureOut">
               <a:rPr lang="en-US" smtClean="0"/>
-              <a:t>11/29/17</a:t>
+              <a:t>11/29/2017</a:t>
             </a:fld>
             <a:endParaRPr lang="en-US"/>
           </a:p>
@@ -2072,7 +2075,7 @@
           </a:lstStyle>
           <a:p>
             <a:r>
-              <a:rPr lang="en-US" smtClean="0"/>
+              <a:rPr lang="en-US"/>
               <a:t>Click to edit Master title style</a:t>
             </a:r>
             <a:endParaRPr lang="en-US" dirty="0"/>
@@ -2153,7 +2156,7 @@
           <a:p>
             <a:pPr lvl="0"/>
             <a:r>
-              <a:rPr lang="en-US" smtClean="0"/>
+              <a:rPr lang="en-US"/>
               <a:t>Click to edit Master text styles</a:t>
             </a:r>
           </a:p>
@@ -2217,35 +2220,35 @@
           <a:p>
             <a:pPr lvl="0"/>
             <a:r>
-              <a:rPr lang="en-US" smtClean="0"/>
+              <a:rPr lang="en-US"/>
               <a:t>Click to edit Master text styles</a:t>
             </a:r>
           </a:p>
           <a:p>
             <a:pPr lvl="1"/>
             <a:r>
-              <a:rPr lang="en-US" smtClean="0"/>
+              <a:rPr lang="en-US"/>
               <a:t>Second level</a:t>
             </a:r>
           </a:p>
           <a:p>
             <a:pPr lvl="2"/>
             <a:r>
-              <a:rPr lang="en-US" smtClean="0"/>
+              <a:rPr lang="en-US"/>
               <a:t>Third level</a:t>
             </a:r>
           </a:p>
           <a:p>
             <a:pPr lvl="3"/>
             <a:r>
-              <a:rPr lang="en-US" smtClean="0"/>
+              <a:rPr lang="en-US"/>
               <a:t>Fourth level</a:t>
             </a:r>
           </a:p>
           <a:p>
             <a:pPr lvl="4"/>
             <a:r>
-              <a:rPr lang="en-US" smtClean="0"/>
+              <a:rPr lang="en-US"/>
               <a:t>Fifth level</a:t>
             </a:r>
             <a:endParaRPr lang="en-US" dirty="0"/>
@@ -2326,7 +2329,7 @@
           <a:p>
             <a:pPr lvl="0"/>
             <a:r>
-              <a:rPr lang="en-US" smtClean="0"/>
+              <a:rPr lang="en-US"/>
               <a:t>Click to edit Master text styles</a:t>
             </a:r>
           </a:p>
@@ -2390,35 +2393,35 @@
           <a:p>
             <a:pPr lvl="0"/>
             <a:r>
-              <a:rPr lang="en-US" smtClean="0"/>
+              <a:rPr lang="en-US"/>
               <a:t>Click to edit Master text styles</a:t>
             </a:r>
           </a:p>
           <a:p>
             <a:pPr lvl="1"/>
             <a:r>
-              <a:rPr lang="en-US" smtClean="0"/>
+              <a:rPr lang="en-US"/>
               <a:t>Second level</a:t>
             </a:r>
           </a:p>
           <a:p>
             <a:pPr lvl="2"/>
             <a:r>
-              <a:rPr lang="en-US" smtClean="0"/>
+              <a:rPr lang="en-US"/>
               <a:t>Third level</a:t>
             </a:r>
           </a:p>
           <a:p>
             <a:pPr lvl="3"/>
             <a:r>
-              <a:rPr lang="en-US" smtClean="0"/>
+              <a:rPr lang="en-US"/>
               <a:t>Fourth level</a:t>
             </a:r>
           </a:p>
           <a:p>
             <a:pPr lvl="4"/>
             <a:r>
-              <a:rPr lang="en-US" smtClean="0"/>
+              <a:rPr lang="en-US"/>
               <a:t>Fifth level</a:t>
             </a:r>
             <a:endParaRPr lang="en-US" dirty="0"/>
@@ -2442,7 +2445,7 @@
           <a:p>
             <a:fld id="{19BFB1E6-C45E-FB40-AD8E-8FF72B5CFFBD}" type="datetimeFigureOut">
               <a:rPr lang="en-US" smtClean="0"/>
-              <a:t>11/29/17</a:t>
+              <a:t>11/29/2017</a:t>
             </a:fld>
             <a:endParaRPr lang="en-US"/>
           </a:p>
@@ -2536,7 +2539,7 @@
           <a:lstStyle/>
           <a:p>
             <a:r>
-              <a:rPr lang="en-US" smtClean="0"/>
+              <a:rPr lang="en-US"/>
               <a:t>Click to edit Master title style</a:t>
             </a:r>
             <a:endParaRPr lang="en-US" dirty="0"/>
@@ -2560,7 +2563,7 @@
           <a:p>
             <a:fld id="{19BFB1E6-C45E-FB40-AD8E-8FF72B5CFFBD}" type="datetimeFigureOut">
               <a:rPr lang="en-US" smtClean="0"/>
-              <a:t>11/29/17</a:t>
+              <a:t>11/29/2017</a:t>
             </a:fld>
             <a:endParaRPr lang="en-US"/>
           </a:p>
@@ -2650,7 +2653,7 @@
           <a:p>
             <a:fld id="{19BFB1E6-C45E-FB40-AD8E-8FF72B5CFFBD}" type="datetimeFigureOut">
               <a:rPr lang="en-US" smtClean="0"/>
-              <a:t>11/29/17</a:t>
+              <a:t>11/29/2017</a:t>
             </a:fld>
             <a:endParaRPr lang="en-US"/>
           </a:p>
@@ -2795,7 +2798,7 @@
           </a:lstStyle>
           <a:p>
             <a:r>
-              <a:rPr lang="en-US" smtClean="0"/>
+              <a:rPr lang="en-US"/>
               <a:t>Click to edit Master title style</a:t>
             </a:r>
             <a:endParaRPr lang="en-US" dirty="0"/>
@@ -2852,35 +2855,35 @@
           <a:p>
             <a:pPr lvl="0"/>
             <a:r>
-              <a:rPr lang="en-US" smtClean="0"/>
+              <a:rPr lang="en-US"/>
               <a:t>Click to edit Master text styles</a:t>
             </a:r>
           </a:p>
           <a:p>
             <a:pPr lvl="1"/>
             <a:r>
-              <a:rPr lang="en-US" smtClean="0"/>
+              <a:rPr lang="en-US"/>
               <a:t>Second level</a:t>
             </a:r>
           </a:p>
           <a:p>
             <a:pPr lvl="2"/>
             <a:r>
-              <a:rPr lang="en-US" smtClean="0"/>
+              <a:rPr lang="en-US"/>
               <a:t>Third level</a:t>
             </a:r>
           </a:p>
           <a:p>
             <a:pPr lvl="3"/>
             <a:r>
-              <a:rPr lang="en-US" smtClean="0"/>
+              <a:rPr lang="en-US"/>
               <a:t>Fourth level</a:t>
             </a:r>
           </a:p>
           <a:p>
             <a:pPr lvl="4"/>
             <a:r>
-              <a:rPr lang="en-US" smtClean="0"/>
+              <a:rPr lang="en-US"/>
               <a:t>Fifth level</a:t>
             </a:r>
             <a:endParaRPr lang="en-US" dirty="0"/>
@@ -2955,7 +2958,7 @@
           <a:p>
             <a:pPr lvl="0"/>
             <a:r>
-              <a:rPr lang="en-US" smtClean="0"/>
+              <a:rPr lang="en-US"/>
               <a:t>Click to edit Master text styles</a:t>
             </a:r>
           </a:p>
@@ -2991,7 +2994,7 @@
           <a:p>
             <a:fld id="{19BFB1E6-C45E-FB40-AD8E-8FF72B5CFFBD}" type="datetimeFigureOut">
               <a:rPr lang="en-US" smtClean="0"/>
-              <a:t>11/29/17</a:t>
+              <a:t>11/29/2017</a:t>
             </a:fld>
             <a:endParaRPr lang="en-US"/>
           </a:p>
@@ -3201,7 +3204,7 @@
           </a:lstStyle>
           <a:p>
             <a:r>
-              <a:rPr lang="en-US" smtClean="0"/>
+              <a:rPr lang="en-US"/>
               <a:t>Click to edit Master title style</a:t>
             </a:r>
             <a:endParaRPr lang="en-US" dirty="0"/>
@@ -3268,7 +3271,7 @@
           </a:lstStyle>
           <a:p>
             <a:r>
-              <a:rPr lang="en-US" smtClean="0"/>
+              <a:rPr lang="en-US"/>
               <a:t>Drag picture to placeholder or click icon to add</a:t>
             </a:r>
             <a:endParaRPr lang="en-US" dirty="0"/>
@@ -3343,7 +3346,7 @@
           <a:p>
             <a:pPr lvl="0"/>
             <a:r>
-              <a:rPr lang="en-US" smtClean="0"/>
+              <a:rPr lang="en-US"/>
               <a:t>Click to edit Master text styles</a:t>
             </a:r>
           </a:p>
@@ -3379,7 +3382,7 @@
           <a:p>
             <a:fld id="{19BFB1E6-C45E-FB40-AD8E-8FF72B5CFFBD}" type="datetimeFigureOut">
               <a:rPr lang="en-US" smtClean="0"/>
-              <a:t>11/29/17</a:t>
+              <a:t>11/29/2017</a:t>
             </a:fld>
             <a:endParaRPr lang="en-US"/>
           </a:p>
@@ -3550,7 +3553,7 @@
           <a:lstStyle/>
           <a:p>
             <a:r>
-              <a:rPr lang="en-US" smtClean="0"/>
+              <a:rPr lang="en-US"/>
               <a:t>Click to edit Master title style</a:t>
             </a:r>
             <a:endParaRPr lang="en-US" dirty="0"/>
@@ -3584,35 +3587,35 @@
           <a:p>
             <a:pPr lvl="0"/>
             <a:r>
-              <a:rPr lang="en-US" smtClean="0"/>
+              <a:rPr lang="en-US"/>
               <a:t>Click to edit Master text styles</a:t>
             </a:r>
           </a:p>
           <a:p>
             <a:pPr lvl="1"/>
             <a:r>
-              <a:rPr lang="en-US" smtClean="0"/>
+              <a:rPr lang="en-US"/>
               <a:t>Second level</a:t>
             </a:r>
           </a:p>
           <a:p>
             <a:pPr lvl="2"/>
             <a:r>
-              <a:rPr lang="en-US" smtClean="0"/>
+              <a:rPr lang="en-US"/>
               <a:t>Third level</a:t>
             </a:r>
           </a:p>
           <a:p>
             <a:pPr lvl="3"/>
             <a:r>
-              <a:rPr lang="en-US" smtClean="0"/>
+              <a:rPr lang="en-US"/>
               <a:t>Fourth level</a:t>
             </a:r>
           </a:p>
           <a:p>
             <a:pPr lvl="4"/>
             <a:r>
-              <a:rPr lang="en-US" smtClean="0"/>
+              <a:rPr lang="en-US"/>
               <a:t>Fifth level</a:t>
             </a:r>
             <a:endParaRPr lang="en-US" dirty="0"/>
@@ -3652,7 +3655,7 @@
           <a:p>
             <a:fld id="{19BFB1E6-C45E-FB40-AD8E-8FF72B5CFFBD}" type="datetimeFigureOut">
               <a:rPr lang="en-US" smtClean="0"/>
-              <a:t>11/29/17</a:t>
+              <a:t>11/29/2017</a:t>
             </a:fld>
             <a:endParaRPr lang="en-US"/>
           </a:p>
@@ -4186,19 +4189,19 @@
           <a:p>
             <a:pPr algn="l"/>
             <a:r>
-              <a:rPr lang="en-US" dirty="0" smtClean="0"/>
+              <a:rPr lang="en-US" dirty="0"/>
               <a:t>Term PRESENTATION </a:t>
             </a:r>
             <a:r>
-              <a:rPr lang="mr-IN" sz="2400" dirty="0" smtClean="0"/>
+              <a:rPr lang="mr-IN" sz="2400" dirty="0"/>
               <a:t>–</a:t>
             </a:r>
             <a:r>
-              <a:rPr lang="en-US" sz="2400" dirty="0" smtClean="0"/>
+              <a:rPr lang="en-US" sz="2400" dirty="0"/>
               <a:t> Group B</a:t>
             </a:r>
             <a:br>
-              <a:rPr lang="en-US" sz="2400" dirty="0" smtClean="0"/>
+              <a:rPr lang="en-US" sz="2400" dirty="0"/>
             </a:br>
             <a:endParaRPr lang="en-US" sz="2400" dirty="0"/>
           </a:p>
@@ -4228,7 +4231,7 @@
           <a:p>
             <a:pPr algn="r"/>
             <a:r>
-              <a:rPr lang="en-US" sz="2400" dirty="0" smtClean="0">
+              <a:rPr lang="en-US" sz="2400" dirty="0">
                 <a:solidFill>
                   <a:srgbClr val="0432FF"/>
                 </a:solidFill>
@@ -4236,7 +4239,7 @@
               <a:t>MSDS 7330 </a:t>
             </a:r>
             <a:r>
-              <a:rPr lang="mr-IN" sz="2400" dirty="0" smtClean="0">
+              <a:rPr lang="mr-IN" sz="2400" dirty="0">
                 <a:solidFill>
                   <a:srgbClr val="0432FF"/>
                 </a:solidFill>
@@ -4244,7 +4247,7 @@
               <a:t>–</a:t>
             </a:r>
             <a:r>
-              <a:rPr lang="en-US" sz="2400" dirty="0" smtClean="0">
+              <a:rPr lang="en-US" sz="2400" dirty="0">
                 <a:solidFill>
                   <a:srgbClr val="0432FF"/>
                 </a:solidFill>
@@ -4255,14 +4258,14 @@
           <a:p>
             <a:pPr algn="r"/>
             <a:r>
-              <a:rPr lang="en-US" sz="2400" dirty="0" smtClean="0"/>
+              <a:rPr lang="en-US" sz="2400" dirty="0"/>
               <a:t>SABITRI KC</a:t>
             </a:r>
           </a:p>
           <a:p>
             <a:pPr algn="r"/>
             <a:r>
-              <a:rPr lang="en-US" sz="2400" dirty="0" smtClean="0"/>
+              <a:rPr lang="en-US" sz="2400" dirty="0"/>
               <a:t>KIM WONG</a:t>
             </a:r>
           </a:p>
@@ -4270,11 +4273,7 @@
             <a:pPr algn="r"/>
             <a:r>
               <a:rPr lang="en-US" sz="2400" dirty="0"/>
-              <a:t>RAMYA </a:t>
-            </a:r>
-            <a:r>
-              <a:rPr lang="en-US" sz="2400" dirty="0" smtClean="0"/>
-              <a:t>MANDAVA</a:t>
+              <a:t>RAMYA MANDAVA</a:t>
             </a:r>
           </a:p>
           <a:p>
@@ -4352,10 +4351,9 @@
           <a:lstStyle/>
           <a:p>
             <a:r>
-              <a:rPr lang="en-US" dirty="0" smtClean="0"/>
+              <a:rPr lang="en-US" dirty="0"/>
               <a:t>11/30/2017</a:t>
             </a:r>
-            <a:endParaRPr lang="en-US" dirty="0"/>
           </a:p>
         </p:txBody>
       </p:sp>
@@ -4411,7 +4409,7 @@
           <a:lstStyle/>
           <a:p>
             <a:r>
-              <a:rPr lang="en-US" sz="2400" b="1" u="sng" dirty="0" smtClean="0">
+              <a:rPr lang="en-US" sz="2400" b="1" u="sng" dirty="0">
                 <a:effectLst/>
                 <a:ea typeface="Calibri" charset="0"/>
                 <a:cs typeface="Times New Roman" charset="0"/>
@@ -4419,7 +4417,7 @@
               <a:t>Project Abstract</a:t>
             </a:r>
             <a:r>
-              <a:rPr lang="en-US" sz="2400" dirty="0" smtClean="0">
+              <a:rPr lang="en-US" sz="2400" dirty="0">
                 <a:effectLst/>
                 <a:ea typeface="Calibri" charset="0"/>
                 <a:cs typeface="Times New Roman" charset="0"/>
@@ -4428,7 +4426,7 @@
             </a:r>
           </a:p>
           <a:p>
-            <a:endParaRPr lang="en-US" sz="2400" dirty="0" smtClean="0">
+            <a:endParaRPr lang="en-US" sz="2400" dirty="0">
               <a:effectLst/>
               <a:ea typeface="Calibri" charset="0"/>
               <a:cs typeface="Times New Roman" charset="0"/>
@@ -4449,7 +4447,7 @@
               </a:tabLst>
             </a:pPr>
             <a:r>
-              <a:rPr lang="en-US" sz="2400" dirty="0" smtClean="0">
+              <a:rPr lang="en-US" sz="2400" dirty="0">
                 <a:effectLst/>
                 <a:ea typeface="Calibri" charset="0"/>
                 <a:cs typeface="Times New Roman" charset="0"/>
@@ -4459,7 +4457,7 @@
           </a:p>
           <a:p>
             <a:r>
-              <a:rPr lang="en-US" sz="2400" u="sng" dirty="0" smtClean="0">
+              <a:rPr lang="en-US" sz="2400" u="sng" dirty="0">
                 <a:effectLst/>
                 <a:ea typeface="Calibri" charset="0"/>
                 <a:cs typeface="Times New Roman" charset="0"/>
@@ -4467,7 +4465,7 @@
               <a:t>Answer: </a:t>
             </a:r>
             <a:r>
-              <a:rPr lang="en-US" sz="2400" dirty="0" smtClean="0">
+              <a:rPr lang="en-US" sz="2400" dirty="0">
                 <a:effectLst/>
                 <a:ea typeface="Calibri" charset="0"/>
                 <a:cs typeface="Times New Roman" charset="0"/>
@@ -4475,7 +4473,7 @@
               <a:t>We would like to use the international debt public data set from World Bank available at </a:t>
             </a:r>
             <a:r>
-              <a:rPr lang="en-US" sz="2400" u="sng" dirty="0" smtClean="0">
+              <a:rPr lang="en-US" sz="2400" u="sng" dirty="0">
                 <a:solidFill>
                   <a:srgbClr val="0070C0"/>
                 </a:solidFill>
@@ -4487,7 +4485,7 @@
               <a:t>https://cloud.google.com/bigquery/public-data/world-bank-international-debt</a:t>
             </a:r>
             <a:r>
-              <a:rPr lang="en-US" sz="2400" dirty="0" smtClean="0">
+              <a:rPr lang="en-US" sz="2400" dirty="0">
                 <a:solidFill>
                   <a:srgbClr val="0070C0"/>
                 </a:solidFill>
@@ -4498,7 +4496,7 @@
               <a:t> </a:t>
             </a:r>
             <a:r>
-              <a:rPr lang="en-US" sz="2400" dirty="0" smtClean="0">
+              <a:rPr lang="en-US" sz="2400" dirty="0">
                 <a:effectLst/>
                 <a:ea typeface="Calibri" charset="0"/>
                 <a:cs typeface="Times New Roman" charset="0"/>
@@ -4506,7 +4504,7 @@
               <a:t>and also at </a:t>
             </a:r>
             <a:r>
-              <a:rPr lang="en-US" sz="2400" u="sng" dirty="0" smtClean="0">
+              <a:rPr lang="en-US" sz="2400" u="sng" dirty="0">
                 <a:solidFill>
                   <a:srgbClr val="0070C0"/>
                 </a:solidFill>
@@ -4517,7 +4515,7 @@
               </a:rPr>
               <a:t>https://data.worldbank.org/data-catalog/international-debt-statistics</a:t>
             </a:r>
-            <a:endParaRPr lang="en-US" sz="2400" dirty="0" smtClean="0">
+            <a:endParaRPr lang="en-US" sz="2400" dirty="0">
               <a:solidFill>
                 <a:srgbClr val="0070C0"/>
               </a:solidFill>
@@ -4528,14 +4526,14 @@
           </a:p>
           <a:p>
             <a:r>
-              <a:rPr lang="en-US" sz="2400" u="none" strike="noStrike" dirty="0" smtClean="0">
+              <a:rPr lang="en-US" sz="2400" u="none" strike="noStrike" dirty="0">
                 <a:effectLst/>
                 <a:ea typeface="Calibri" charset="0"/>
                 <a:cs typeface="Times New Roman" charset="0"/>
               </a:rPr>
               <a:t> </a:t>
             </a:r>
-            <a:endParaRPr lang="en-US" sz="2400" dirty="0" smtClean="0">
+            <a:endParaRPr lang="en-US" sz="2400" dirty="0">
               <a:effectLst/>
               <a:ea typeface="Calibri" charset="0"/>
               <a:cs typeface="Times New Roman" charset="0"/>
@@ -4556,7 +4554,7 @@
               </a:tabLst>
             </a:pPr>
             <a:r>
-              <a:rPr lang="en-US" sz="2400" dirty="0" smtClean="0">
+              <a:rPr lang="en-US" sz="2400" dirty="0">
                 <a:effectLst/>
                 <a:ea typeface="Calibri" charset="0"/>
                 <a:cs typeface="Times New Roman" charset="0"/>
@@ -4566,7 +4564,7 @@
           </a:p>
           <a:p>
             <a:r>
-              <a:rPr lang="en-US" sz="2400" u="sng" dirty="0" smtClean="0">
+              <a:rPr lang="en-US" sz="2400" u="sng" dirty="0">
                 <a:effectLst/>
                 <a:ea typeface="Calibri" charset="0"/>
                 <a:cs typeface="Times New Roman" charset="0"/>
@@ -4574,7 +4572,7 @@
               <a:t>Answer:</a:t>
             </a:r>
             <a:r>
-              <a:rPr lang="en-US" sz="2400" dirty="0" smtClean="0">
+              <a:rPr lang="en-US" sz="2400" dirty="0">
                 <a:effectLst/>
                 <a:ea typeface="Calibri" charset="0"/>
                 <a:cs typeface="Times New Roman" charset="0"/>
@@ -4584,7 +4582,7 @@
           </a:p>
           <a:p>
             <a:r>
-              <a:rPr lang="en-US" sz="2400" dirty="0" smtClean="0">
+              <a:rPr lang="en-US" sz="2400" dirty="0">
                 <a:effectLst/>
                 <a:ea typeface="Calibri" charset="0"/>
                 <a:cs typeface="Times New Roman" charset="0"/>
@@ -4614,7 +4612,7 @@
               <a:t>What</a:t>
             </a:r>
             <a:r>
-              <a:rPr lang="en-US" sz="2400" dirty="0" smtClean="0">
+              <a:rPr lang="en-US" sz="2400" dirty="0">
                 <a:effectLst/>
                 <a:ea typeface="Calibri" charset="0"/>
                 <a:cs typeface="Times New Roman" charset="0"/>
@@ -4622,7 +4620,7 @@
               <a:t> tool? </a:t>
             </a:r>
             <a:r>
-              <a:rPr lang="en-US" sz="2400" u="sng" dirty="0" smtClean="0">
+              <a:rPr lang="en-US" sz="2400" u="sng" dirty="0">
                 <a:effectLst/>
                 <a:ea typeface="Calibri" charset="0"/>
                 <a:cs typeface="Times New Roman" charset="0"/>
@@ -4630,20 +4628,12 @@
               <a:t>MySQL</a:t>
             </a:r>
             <a:r>
-              <a:rPr lang="en-US" sz="2400" dirty="0" smtClean="0">
+              <a:rPr lang="en-US" sz="2400" dirty="0">
                 <a:effectLst/>
                 <a:ea typeface="Calibri" charset="0"/>
                 <a:cs typeface="Times New Roman" charset="0"/>
               </a:rPr>
-              <a:t>? XML?, </a:t>
-            </a:r>
-            <a:r>
-              <a:rPr lang="en-US" sz="2400" dirty="0" smtClean="0">
-                <a:effectLst/>
-                <a:ea typeface="Calibri" charset="0"/>
-                <a:cs typeface="Times New Roman" charset="0"/>
-              </a:rPr>
-              <a:t>MongoDB</a:t>
+              <a:t>? XML?, MongoDB</a:t>
             </a:r>
           </a:p>
           <a:p>
@@ -4659,14 +4649,14 @@
               </a:tabLst>
             </a:pPr>
             <a:r>
-              <a:rPr lang="en-US" sz="2400" u="sng" dirty="0" smtClean="0">
+              <a:rPr lang="en-US" sz="2400" u="sng" dirty="0">
                 <a:ea typeface="Calibri" charset="0"/>
                 <a:cs typeface="Times New Roman" charset="0"/>
               </a:rPr>
               <a:t>Ans</a:t>
             </a:r>
             <a:r>
-              <a:rPr lang="en-US" sz="2400" u="sng" dirty="0" smtClean="0">
+              <a:rPr lang="en-US" sz="2400" u="sng" dirty="0">
                 <a:effectLst/>
                 <a:ea typeface="Calibri" charset="0"/>
                 <a:cs typeface="Times New Roman" charset="0"/>
@@ -4674,7 +4664,7 @@
               <a:t>wer</a:t>
             </a:r>
             <a:r>
-              <a:rPr lang="en-US" sz="2400" dirty="0" smtClean="0">
+              <a:rPr lang="en-US" sz="2400" dirty="0">
                 <a:effectLst/>
                 <a:ea typeface="Calibri" charset="0"/>
                 <a:cs typeface="Times New Roman" charset="0"/>
@@ -4682,7 +4672,7 @@
               <a:t>: We will be doing this in</a:t>
             </a:r>
             <a:r>
-              <a:rPr lang="en-US" sz="2400" b="1" dirty="0" smtClean="0">
+              <a:rPr lang="en-US" sz="2400" b="1" dirty="0">
                 <a:effectLst/>
                 <a:ea typeface="Calibri" charset="0"/>
                 <a:cs typeface="Times New Roman" charset="0"/>
@@ -4690,18 +4680,13 @@
               <a:t> MySQL</a:t>
             </a:r>
             <a:r>
-              <a:rPr lang="en-US" sz="2400" dirty="0" smtClean="0">
+              <a:rPr lang="en-US" sz="2400" dirty="0">
                 <a:effectLst/>
                 <a:ea typeface="Calibri" charset="0"/>
                 <a:cs typeface="Times New Roman" charset="0"/>
               </a:rPr>
               <a:t> on IBM bluemix.</a:t>
             </a:r>
-            <a:endParaRPr lang="en-US" sz="2400" dirty="0">
-              <a:effectLst/>
-              <a:ea typeface="Calibri" charset="0"/>
-              <a:cs typeface="Times New Roman" charset="0"/>
-            </a:endParaRPr>
           </a:p>
         </p:txBody>
       </p:sp>
@@ -4768,14 +4753,14 @@
               </a:spcAft>
             </a:pPr>
             <a:r>
-              <a:rPr lang="en-US" sz="2400" dirty="0" smtClean="0">
+              <a:rPr lang="en-US" sz="2400" dirty="0">
                 <a:effectLst/>
                 <a:ea typeface="Times New Roman" charset="0"/>
               </a:rPr>
               <a:t>Data Size (How much MB or GB):</a:t>
             </a:r>
             <a:r>
-              <a:rPr lang="en-US" sz="2400" dirty="0" smtClean="0">
+              <a:rPr lang="en-US" sz="2400" dirty="0">
                 <a:solidFill>
                   <a:srgbClr val="FF0000"/>
                 </a:solidFill>
@@ -4785,7 +4770,7 @@
               <a:t> 7% &lt;</a:t>
             </a:r>
             <a:r>
-              <a:rPr lang="en-US" sz="2400" dirty="0" err="1" smtClean="0">
+              <a:rPr lang="en-US" sz="2400" dirty="0" err="1">
                 <a:solidFill>
                   <a:srgbClr val="FF0000"/>
                 </a:solidFill>
@@ -4795,7 +4780,7 @@
               <a:t>Ramya</a:t>
             </a:r>
             <a:r>
-              <a:rPr lang="en-US" sz="2400" dirty="0" smtClean="0">
+              <a:rPr lang="en-US" sz="2400" dirty="0">
                 <a:solidFill>
                   <a:srgbClr val="FF0000"/>
                 </a:solidFill>
@@ -4817,7 +4802,7 @@
                 <a:spcPts val="750"/>
               </a:spcAft>
             </a:pPr>
-            <a:endParaRPr lang="en-US" sz="2400" dirty="0" smtClean="0">
+            <a:endParaRPr lang="en-US" sz="2400" dirty="0">
               <a:effectLst/>
               <a:ea typeface="Times New Roman" charset="0"/>
             </a:endParaRPr>
@@ -4835,14 +4820,14 @@
               </a:spcAft>
             </a:pPr>
             <a:r>
-              <a:rPr lang="en-US" sz="2400" dirty="0" smtClean="0">
+              <a:rPr lang="en-US" sz="2400" dirty="0">
                 <a:effectLst/>
                 <a:ea typeface="Times New Roman" charset="0"/>
               </a:rPr>
               <a:t>Data Source URL:</a:t>
             </a:r>
             <a:r>
-              <a:rPr lang="en-US" sz="2400" dirty="0" smtClean="0">
+              <a:rPr lang="en-US" sz="2400" dirty="0">
                 <a:solidFill>
                   <a:srgbClr val="FF0000"/>
                 </a:solidFill>
@@ -4865,7 +4850,7 @@
               </a:spcAft>
             </a:pPr>
             <a:r>
-              <a:rPr lang="en-US" sz="2400" u="sng" dirty="0" smtClean="0">
+              <a:rPr lang="en-US" sz="2400" u="sng" dirty="0">
                 <a:solidFill>
                   <a:srgbClr val="0070C0"/>
                 </a:solidFill>
@@ -4890,7 +4875,7 @@
               </a:spcAft>
             </a:pPr>
             <a:r>
-              <a:rPr lang="en-US" sz="2400" u="sng" dirty="0" smtClean="0">
+              <a:rPr lang="en-US" sz="2400" u="sng" dirty="0">
                 <a:solidFill>
                   <a:srgbClr val="0070C0"/>
                 </a:solidFill>
@@ -4901,7 +4886,7 @@
               </a:rPr>
               <a:t>debt</a:t>
             </a:r>
-            <a:endParaRPr lang="en-US" sz="2400" u="sng" dirty="0" smtClean="0">
+            <a:endParaRPr lang="en-US" sz="2400" u="sng" dirty="0">
               <a:solidFill>
                 <a:srgbClr val="0070C0"/>
               </a:solidFill>
@@ -4922,7 +4907,7 @@
                 <a:spcPts val="750"/>
               </a:spcAft>
             </a:pPr>
-            <a:endParaRPr lang="en-US" sz="2400" dirty="0" smtClean="0">
+            <a:endParaRPr lang="en-US" sz="2400" dirty="0">
               <a:effectLst/>
               <a:ea typeface="Times New Roman" charset="0"/>
             </a:endParaRPr>
@@ -4937,16 +4922,8 @@
               </a:spcAft>
             </a:pPr>
             <a:r>
-              <a:rPr lang="en-US" sz="2400" dirty="0" smtClean="0"/>
-              <a:t>H/W </a:t>
-            </a:r>
-            <a:r>
               <a:rPr lang="en-US" sz="2400" dirty="0"/>
-              <a:t>experimental Specifications (Database server, CPU speed, </a:t>
-            </a:r>
-            <a:r>
-              <a:rPr lang="en-US" sz="2400" dirty="0" smtClean="0"/>
-              <a:t>Memory </a:t>
+              <a:t>H/W experimental Specifications (Database server, CPU speed, Memory </a:t>
             </a:r>
           </a:p>
           <a:p>
@@ -4959,11 +4936,11 @@
               </a:spcAft>
             </a:pPr>
             <a:r>
-              <a:rPr lang="en-US" sz="2400" dirty="0" smtClean="0"/>
+              <a:rPr lang="en-US" sz="2400" dirty="0"/>
               <a:t>Size): </a:t>
             </a:r>
             <a:r>
-              <a:rPr lang="en-US" sz="2400" dirty="0" smtClean="0">
+              <a:rPr lang="en-US" sz="2400" dirty="0">
                 <a:solidFill>
                   <a:srgbClr val="FF0000"/>
                 </a:solidFill>
@@ -4971,7 +4948,7 @@
               <a:t>8% &lt;</a:t>
             </a:r>
             <a:r>
-              <a:rPr lang="en-US" sz="2400" dirty="0" err="1" smtClean="0">
+              <a:rPr lang="en-US" sz="2400" dirty="0" err="1">
                 <a:solidFill>
                   <a:srgbClr val="FF0000"/>
                 </a:solidFill>
@@ -4979,7 +4956,7 @@
               <a:t>Ramya</a:t>
             </a:r>
             <a:r>
-              <a:rPr lang="en-US" sz="2400" dirty="0" smtClean="0">
+              <a:rPr lang="en-US" sz="2400" dirty="0">
                 <a:solidFill>
                   <a:srgbClr val="FF0000"/>
                 </a:solidFill>
@@ -5008,10 +4985,9 @@
               </a:spcAft>
             </a:pPr>
             <a:r>
-              <a:rPr lang="en-US" sz="2400" dirty="0" smtClean="0"/>
+              <a:rPr lang="en-US" sz="2400" dirty="0"/>
               <a:t> </a:t>
             </a:r>
-            <a:endParaRPr lang="en-US" sz="2400" dirty="0"/>
           </a:p>
           <a:p>
             <a:pPr marL="457200" marR="0" indent="-228600">
@@ -5093,27 +5069,14 @@
                   <a:srgbClr val="FF0000"/>
                 </a:solidFill>
               </a:rPr>
-              <a:t>20%  &lt;Kim </a:t>
-            </a:r>
-            <a:r>
-              <a:rPr lang="en-US" sz="2400" dirty="0" smtClean="0">
-                <a:solidFill>
-                  <a:srgbClr val="FF0000"/>
-                </a:solidFill>
-              </a:rPr>
-              <a:t>Wong&gt;</a:t>
-            </a:r>
-          </a:p>
-          <a:p>
-            <a:r>
-              <a:rPr lang="en-US" sz="2400" dirty="0" smtClean="0"/>
-              <a:t>How </a:t>
-            </a:r>
+              <a:t>20%  &lt;Kim Wong&gt;</a:t>
+            </a:r>
+          </a:p>
+          <a:p>
             <a:r>
               <a:rPr lang="en-US" sz="2400" dirty="0"/>
-              <a:t>unique your idea different from the existing data analysis (10%) </a:t>
-            </a:r>
-            <a:endParaRPr lang="en-US" sz="2400" dirty="0" smtClean="0"/>
+              <a:t>How unique your idea different from the existing data analysis (10%) </a:t>
+            </a:r>
           </a:p>
           <a:p>
             <a:endParaRPr lang="en-US" sz="2400" dirty="0"/>
@@ -5190,11 +5153,11 @@
           <a:lstStyle/>
           <a:p>
             <a:r>
-              <a:rPr lang="en-US" sz="2400" dirty="0" smtClean="0"/>
+              <a:rPr lang="en-US" sz="2400" dirty="0"/>
               <a:t>Insights/Deliverables of the analysis: </a:t>
             </a:r>
             <a:r>
-              <a:rPr lang="en-US" sz="2400" dirty="0" smtClean="0">
+              <a:rPr lang="en-US" sz="2400" dirty="0">
                 <a:solidFill>
                   <a:srgbClr val="FF0000"/>
                 </a:solidFill>
@@ -5202,7 +5165,7 @@
               <a:t>(10%) </a:t>
             </a:r>
             <a:r>
-              <a:rPr lang="mr-IN" sz="2400" dirty="0" smtClean="0">
+              <a:rPr lang="mr-IN" sz="2400" dirty="0">
                 <a:solidFill>
                   <a:srgbClr val="FF0000"/>
                 </a:solidFill>
@@ -5210,7 +5173,7 @@
               <a:t>–</a:t>
             </a:r>
             <a:r>
-              <a:rPr lang="en-US" sz="2400" dirty="0" smtClean="0">
+              <a:rPr lang="en-US" sz="2400" dirty="0">
                 <a:solidFill>
                   <a:srgbClr val="FF0000"/>
                 </a:solidFill>
@@ -5218,20 +5181,13 @@
               <a:t> </a:t>
             </a:r>
             <a:r>
-              <a:rPr lang="en-US" sz="2400" dirty="0" err="1" smtClean="0">
+              <a:rPr lang="en-US" sz="2400" dirty="0" err="1">
                 <a:solidFill>
                   <a:srgbClr val="FF0000"/>
                 </a:solidFill>
               </a:rPr>
               <a:t>Chiran</a:t>
             </a:r>
-            <a:endParaRPr lang="en-US" sz="2400" dirty="0" smtClean="0">
-              <a:solidFill>
-                <a:srgbClr val="FF0000"/>
-              </a:solidFill>
-            </a:endParaRPr>
-          </a:p>
-          <a:p>
             <a:endParaRPr lang="en-US" sz="2400" dirty="0">
               <a:solidFill>
                 <a:srgbClr val="FF0000"/>
@@ -5239,8 +5195,15 @@
             </a:endParaRPr>
           </a:p>
           <a:p>
-            <a:r>
-              <a:rPr lang="en-US" sz="2400" dirty="0" smtClean="0">
+            <a:endParaRPr lang="en-US" sz="2400" dirty="0">
+              <a:solidFill>
+                <a:srgbClr val="FF0000"/>
+              </a:solidFill>
+            </a:endParaRPr>
+          </a:p>
+          <a:p>
+            <a:r>
+              <a:rPr lang="en-US" sz="2400" dirty="0">
                 <a:effectLst/>
                 <a:ea typeface="Calibri" charset="0"/>
                 <a:cs typeface="Times New Roman" charset="0"/>
@@ -5250,7 +5213,7 @@
           </a:p>
           <a:p>
             <a:r>
-              <a:rPr lang="en-US" sz="2400" dirty="0" smtClean="0">
+              <a:rPr lang="en-US" sz="2400" dirty="0">
                 <a:solidFill>
                   <a:srgbClr val="FF0000"/>
                 </a:solidFill>
@@ -5260,35 +5223,35 @@
               <a:t>XXXXX</a:t>
             </a:r>
             <a:r>
-              <a:rPr lang="en-US" sz="2400" dirty="0" smtClean="0">
+              <a:rPr lang="en-US" sz="2400" dirty="0">
                 <a:ea typeface="Calibri" charset="0"/>
                 <a:cs typeface="Times New Roman" charset="0"/>
               </a:rPr>
               <a:t> seems to have the highest external debt</a:t>
             </a:r>
             <a:r>
-              <a:rPr lang="en-US" sz="2400" baseline="30000" dirty="0" smtClean="0">
+              <a:rPr lang="en-US" sz="2400" baseline="30000" dirty="0">
                 <a:ea typeface="Calibri" charset="0"/>
                 <a:cs typeface="Times New Roman" charset="0"/>
               </a:rPr>
               <a:t>[1]</a:t>
             </a:r>
             <a:r>
-              <a:rPr lang="en-US" sz="2400" dirty="0" smtClean="0">
+              <a:rPr lang="en-US" sz="2400" dirty="0">
                 <a:ea typeface="Calibri" charset="0"/>
                 <a:cs typeface="Times New Roman" charset="0"/>
               </a:rPr>
               <a:t> </a:t>
             </a:r>
             <a:r>
-              <a:rPr lang="en-US" sz="2400" dirty="0" err="1" smtClean="0">
+              <a:rPr lang="en-US" sz="2400" dirty="0" err="1">
                 <a:ea typeface="Calibri" charset="0"/>
                 <a:cs typeface="Times New Roman" charset="0"/>
               </a:rPr>
               <a:t>i.e.</a:t>
             </a:r>
             <a:r>
-              <a:rPr lang="en-US" sz="2400" dirty="0" err="1" smtClean="0">
+              <a:rPr lang="en-US" sz="2400" dirty="0" err="1">
                 <a:solidFill>
                   <a:srgbClr val="FF0000"/>
                 </a:solidFill>
@@ -5298,7 +5261,7 @@
               <a:t>$XXXXX</a:t>
             </a:r>
             <a:r>
-              <a:rPr lang="en-US" sz="2400" dirty="0" smtClean="0">
+              <a:rPr lang="en-US" sz="2400" dirty="0">
                 <a:solidFill>
                   <a:srgbClr val="FF0000"/>
                 </a:solidFill>
@@ -5308,7 +5271,7 @@
               <a:t> </a:t>
             </a:r>
             <a:r>
-              <a:rPr lang="en-US" sz="2400" dirty="0" smtClean="0">
+              <a:rPr lang="en-US" sz="2400" dirty="0">
                 <a:ea typeface="Calibri" charset="0"/>
                 <a:cs typeface="Times New Roman" charset="0"/>
               </a:rPr>
@@ -5317,21 +5280,21 @@
           </a:p>
           <a:p>
             <a:r>
-              <a:rPr lang="en-US" sz="2400" dirty="0" smtClean="0">
+              <a:rPr lang="en-US" sz="2400" dirty="0">
                 <a:ea typeface="Calibri" charset="0"/>
                 <a:cs typeface="Times New Roman" charset="0"/>
               </a:rPr>
               <a:t>all</a:t>
             </a:r>
             <a:r>
-              <a:rPr lang="en-US" sz="2400" baseline="30000" dirty="0" smtClean="0">
+              <a:rPr lang="en-US" sz="2400" baseline="30000" dirty="0">
                 <a:ea typeface="Calibri" charset="0"/>
                 <a:cs typeface="Times New Roman" charset="0"/>
               </a:rPr>
               <a:t>[2]</a:t>
             </a:r>
             <a:r>
-              <a:rPr lang="en-US" sz="2400" dirty="0" smtClean="0">
+              <a:rPr lang="en-US" sz="2400" dirty="0">
                 <a:ea typeface="Calibri" charset="0"/>
                 <a:cs typeface="Times New Roman" charset="0"/>
               </a:rPr>
@@ -5339,7 +5302,7 @@
             </a:r>
           </a:p>
           <a:p>
-            <a:endParaRPr lang="en-US" sz="2400" dirty="0" smtClean="0">
+            <a:endParaRPr lang="en-US" sz="2400" dirty="0">
               <a:effectLst/>
               <a:ea typeface="Calibri" charset="0"/>
               <a:cs typeface="Times New Roman" charset="0"/>
@@ -5347,7 +5310,7 @@
           </a:p>
           <a:p>
             <a:r>
-              <a:rPr lang="en-US" sz="2400" dirty="0" smtClean="0">
+              <a:rPr lang="en-US" sz="2400" dirty="0">
                 <a:effectLst/>
                 <a:ea typeface="Calibri" charset="0"/>
                 <a:cs typeface="Times New Roman" charset="0"/>
@@ -5357,7 +5320,7 @@
           </a:p>
           <a:p>
             <a:r>
-              <a:rPr lang="en-US" sz="2400" dirty="0" smtClean="0">
+              <a:rPr lang="en-US" sz="2400" dirty="0">
                 <a:solidFill>
                   <a:srgbClr val="FF0000"/>
                 </a:solidFill>
@@ -5367,35 +5330,35 @@
               <a:t>XXXXX</a:t>
             </a:r>
             <a:r>
-              <a:rPr lang="en-US" sz="2400" dirty="0" smtClean="0">
+              <a:rPr lang="en-US" sz="2400" dirty="0">
                 <a:ea typeface="Calibri" charset="0"/>
                 <a:cs typeface="Times New Roman" charset="0"/>
               </a:rPr>
-              <a:t> seems to have the highest external debt</a:t>
-            </a:r>
-            <a:r>
-              <a:rPr lang="en-US" sz="2400" baseline="30000" dirty="0" smtClean="0">
+              <a:t> seems to have the lowest external debt</a:t>
+            </a:r>
+            <a:r>
+              <a:rPr lang="en-US" sz="2400" baseline="30000" dirty="0">
                 <a:ea typeface="Calibri" charset="0"/>
                 <a:cs typeface="Times New Roman" charset="0"/>
               </a:rPr>
               <a:t>[1]</a:t>
             </a:r>
             <a:r>
-              <a:rPr lang="en-US" sz="2400" dirty="0" smtClean="0">
+              <a:rPr lang="en-US" sz="2400" dirty="0">
                 <a:ea typeface="Calibri" charset="0"/>
                 <a:cs typeface="Times New Roman" charset="0"/>
               </a:rPr>
               <a:t> </a:t>
             </a:r>
             <a:r>
-              <a:rPr lang="en-US" sz="2400" dirty="0" err="1" smtClean="0">
+              <a:rPr lang="en-US" sz="2400" dirty="0" err="1">
                 <a:ea typeface="Calibri" charset="0"/>
                 <a:cs typeface="Times New Roman" charset="0"/>
               </a:rPr>
               <a:t>i.e.</a:t>
             </a:r>
             <a:r>
-              <a:rPr lang="en-US" sz="2400" dirty="0" err="1" smtClean="0">
+              <a:rPr lang="en-US" sz="2400" dirty="0" err="1">
                 <a:solidFill>
                   <a:srgbClr val="FF0000"/>
                 </a:solidFill>
@@ -5405,7 +5368,7 @@
               <a:t>$XXXXX</a:t>
             </a:r>
             <a:r>
-              <a:rPr lang="en-US" sz="2400" dirty="0" smtClean="0">
+              <a:rPr lang="en-US" sz="2400" dirty="0">
                 <a:solidFill>
                   <a:srgbClr val="FF0000"/>
                 </a:solidFill>
@@ -5415,7 +5378,7 @@
               <a:t> </a:t>
             </a:r>
             <a:r>
-              <a:rPr lang="en-US" sz="2400" dirty="0" smtClean="0">
+              <a:rPr lang="en-US" sz="2400" dirty="0">
                 <a:ea typeface="Calibri" charset="0"/>
                 <a:cs typeface="Times New Roman" charset="0"/>
               </a:rPr>
@@ -5424,33 +5387,29 @@
           </a:p>
           <a:p>
             <a:r>
-              <a:rPr lang="en-US" sz="2400" dirty="0" smtClean="0">
+              <a:rPr lang="en-US" sz="2400" dirty="0">
                 <a:ea typeface="Calibri" charset="0"/>
                 <a:cs typeface="Times New Roman" charset="0"/>
               </a:rPr>
               <a:t>all</a:t>
             </a:r>
             <a:r>
-              <a:rPr lang="en-US" sz="2400" baseline="30000" dirty="0" smtClean="0">
+              <a:rPr lang="en-US" sz="2400" baseline="30000" dirty="0">
                 <a:ea typeface="Calibri" charset="0"/>
                 <a:cs typeface="Times New Roman" charset="0"/>
               </a:rPr>
               <a:t>[2]</a:t>
             </a:r>
             <a:r>
-              <a:rPr lang="en-US" sz="2400" dirty="0" smtClean="0">
+              <a:rPr lang="en-US" sz="2400" dirty="0">
                 <a:ea typeface="Calibri" charset="0"/>
                 <a:cs typeface="Times New Roman" charset="0"/>
               </a:rPr>
               <a:t> countries </a:t>
             </a:r>
+          </a:p>
+          <a:p>
             <a:endParaRPr lang="en-US" sz="2400" dirty="0">
-              <a:ea typeface="Calibri" charset="0"/>
-              <a:cs typeface="Times New Roman" charset="0"/>
-            </a:endParaRPr>
-          </a:p>
-          <a:p>
-            <a:endParaRPr lang="en-US" sz="2400" dirty="0" smtClean="0">
               <a:effectLst/>
               <a:ea typeface="Calibri" charset="0"/>
               <a:cs typeface="Times New Roman" charset="0"/>
@@ -5458,7 +5417,7 @@
           </a:p>
           <a:p>
             <a:r>
-              <a:rPr lang="en-US" sz="2400" dirty="0" smtClean="0">
+              <a:rPr lang="en-US" sz="2400" dirty="0">
                 <a:effectLst/>
                 <a:ea typeface="Calibri" charset="0"/>
                 <a:cs typeface="Times New Roman" charset="0"/>
@@ -5468,44 +5427,28 @@
           </a:p>
           <a:p>
             <a:r>
-              <a:rPr lang="en-US" sz="2400" dirty="0" smtClean="0">
+              <a:rPr lang="en-US" sz="2400" dirty="0">
                 <a:ea typeface="Calibri" charset="0"/>
                 <a:cs typeface="Times New Roman" charset="0"/>
               </a:rPr>
               <a:t>On an average </a:t>
             </a:r>
             <a:r>
-              <a:rPr lang="en-US" sz="2400" dirty="0" smtClean="0">
+              <a:rPr lang="en-US" sz="2400" dirty="0">
                 <a:solidFill>
                   <a:srgbClr val="FF0000"/>
                 </a:solidFill>
               </a:rPr>
-              <a:t>long-term </a:t>
-            </a:r>
-            <a:r>
-              <a:rPr lang="en-US" sz="2400" dirty="0">
-                <a:solidFill>
-                  <a:srgbClr val="FF0000"/>
-                </a:solidFill>
-              </a:rPr>
-              <a:t>external </a:t>
-            </a:r>
-            <a:r>
-              <a:rPr lang="en-US" sz="2400" dirty="0" smtClean="0">
-                <a:solidFill>
-                  <a:srgbClr val="FF0000"/>
-                </a:solidFill>
-              </a:rPr>
-              <a:t>debt </a:t>
-            </a:r>
-            <a:r>
-              <a:rPr lang="en-US" sz="2400" dirty="0" smtClean="0"/>
+              <a:t>long-term external debt </a:t>
+            </a:r>
+            <a:r>
+              <a:rPr lang="en-US" sz="2400" dirty="0"/>
               <a:t>seems to be highest across </a:t>
             </a:r>
           </a:p>
           <a:p>
             <a:r>
-              <a:rPr lang="en-US" sz="2400" dirty="0" smtClean="0"/>
+              <a:rPr lang="en-US" sz="2400" dirty="0"/>
               <a:t>All countries</a:t>
             </a:r>
             <a:endParaRPr lang="en-US" sz="2400" dirty="0">
@@ -5569,7 +5512,7 @@
           <a:lstStyle/>
           <a:p>
             <a:r>
-              <a:rPr lang="en-US" sz="2400" dirty="0" smtClean="0">
+              <a:rPr lang="en-US" sz="2400" dirty="0">
                 <a:effectLst/>
                 <a:ea typeface="Calibri" charset="0"/>
                 <a:cs typeface="Times New Roman" charset="0"/>
@@ -5588,11 +5531,11 @@
           </a:p>
           <a:p>
             <a:r>
-              <a:rPr lang="en-US" sz="2400" dirty="0" smtClean="0"/>
+              <a:rPr lang="en-US" sz="2400" dirty="0"/>
               <a:t>The average debt of countries with </a:t>
             </a:r>
             <a:r>
-              <a:rPr lang="en-US" sz="2400" dirty="0" smtClean="0">
+              <a:rPr lang="en-US" sz="2400" dirty="0">
                 <a:solidFill>
                   <a:srgbClr val="FF0000"/>
                 </a:solidFill>
@@ -5600,17 +5543,17 @@
               <a:t>XXXX income level </a:t>
             </a:r>
             <a:r>
-              <a:rPr lang="en-US" sz="2400" dirty="0" smtClean="0"/>
+              <a:rPr lang="en-US" sz="2400" dirty="0"/>
               <a:t>seems to be highest</a:t>
             </a:r>
           </a:p>
           <a:p>
             <a:r>
-              <a:rPr lang="en-US" sz="2400" dirty="0" smtClean="0"/>
+              <a:rPr lang="en-US" sz="2400" dirty="0"/>
               <a:t>Among all the countries and </a:t>
             </a:r>
             <a:r>
-              <a:rPr lang="en-US" sz="2400" dirty="0" smtClean="0">
+              <a:rPr lang="en-US" sz="2400" dirty="0">
                 <a:solidFill>
                   <a:srgbClr val="FF0000"/>
                 </a:solidFill>
@@ -5618,7 +5561,7 @@
               <a:t>XXXX income level </a:t>
             </a:r>
             <a:r>
-              <a:rPr lang="en-US" sz="2400" dirty="0" smtClean="0"/>
+              <a:rPr lang="en-US" sz="2400" dirty="0"/>
               <a:t>seems to be the least.</a:t>
             </a:r>
           </a:p>
@@ -5626,27 +5569,27 @@
             <a:endParaRPr lang="en-US" sz="2400" dirty="0"/>
           </a:p>
           <a:p>
-            <a:endParaRPr lang="en-US" sz="2400" dirty="0" smtClean="0"/>
-          </a:p>
-          <a:p>
-            <a:r>
-              <a:rPr lang="en-US" sz="2400" dirty="0" err="1" smtClean="0"/>
+            <a:endParaRPr lang="en-US" sz="2400" dirty="0"/>
+          </a:p>
+          <a:p>
+            <a:r>
+              <a:rPr lang="en-US" sz="2400" dirty="0" err="1"/>
               <a:t>Github</a:t>
             </a:r>
             <a:r>
-              <a:rPr lang="en-US" sz="2400" dirty="0" smtClean="0"/>
+              <a:rPr lang="en-US" sz="2400" dirty="0"/>
               <a:t> link to </a:t>
             </a:r>
             <a:r>
-              <a:rPr lang="en-US" sz="2400" dirty="0" err="1" smtClean="0"/>
+              <a:rPr lang="en-US" sz="2400" dirty="0" err="1"/>
               <a:t>MySql</a:t>
             </a:r>
             <a:r>
-              <a:rPr lang="en-US" sz="2400" dirty="0" smtClean="0"/>
+              <a:rPr lang="en-US" sz="2400" dirty="0"/>
               <a:t> code: </a:t>
             </a:r>
             <a:r>
-              <a:rPr lang="en-US" sz="2400" dirty="0" smtClean="0">
+              <a:rPr lang="en-US" sz="2400" dirty="0">
                 <a:solidFill>
                   <a:srgbClr val="FF0000"/>
                 </a:solidFill>
@@ -5654,7 +5597,7 @@
               <a:t>&lt;</a:t>
             </a:r>
             <a:r>
-              <a:rPr lang="en-US" sz="2400" dirty="0" err="1" smtClean="0">
+              <a:rPr lang="en-US" sz="2400" dirty="0" err="1">
                 <a:solidFill>
                   <a:srgbClr val="FF0000"/>
                 </a:solidFill>
@@ -5662,7 +5605,7 @@
               <a:t>Sabitri</a:t>
             </a:r>
             <a:r>
-              <a:rPr lang="en-US" sz="2400" dirty="0" smtClean="0">
+              <a:rPr lang="en-US" sz="2400" dirty="0">
                 <a:solidFill>
                   <a:srgbClr val="FF0000"/>
                 </a:solidFill>
@@ -5674,7 +5617,7 @@
             <a:endParaRPr lang="en-US" sz="2400" dirty="0"/>
           </a:p>
           <a:p>
-            <a:endParaRPr lang="en-US" sz="2400" dirty="0" smtClean="0"/>
+            <a:endParaRPr lang="en-US" sz="2400" dirty="0"/>
           </a:p>
           <a:p>
             <a:endParaRPr lang="en-US" sz="2400" dirty="0"/>

</xml_diff>

<commit_message>
Update footnotes in insights
Updated definition of countries and debt
</commit_message>
<xml_diff>
--- a/Term Presentation MSDS7330-404 GrpB.pptx
+++ b/Term Presentation MSDS7330-404 GrpB.pptx
@@ -206,7 +206,7 @@
           <a:p>
             <a:fld id="{3B223B20-14E5-414C-943F-923CD8C3ABC0}" type="datetimeFigureOut">
               <a:rPr lang="en-US" smtClean="0"/>
-              <a:t>11/29/2017</a:t>
+              <a:t>11/29/17</a:t>
             </a:fld>
             <a:endParaRPr lang="en-US"/>
           </a:p>
@@ -642,7 +642,7 @@
           <a:p>
             <a:fld id="{19BFB1E6-C45E-FB40-AD8E-8FF72B5CFFBD}" type="datetimeFigureOut">
               <a:rPr lang="en-US" smtClean="0"/>
-              <a:t>11/29/2017</a:t>
+              <a:t>11/29/17</a:t>
             </a:fld>
             <a:endParaRPr lang="en-US"/>
           </a:p>
@@ -967,7 +967,7 @@
           <a:p>
             <a:fld id="{19BFB1E6-C45E-FB40-AD8E-8FF72B5CFFBD}" type="datetimeFigureOut">
               <a:rPr lang="en-US" smtClean="0"/>
-              <a:t>11/29/2017</a:t>
+              <a:t>11/29/17</a:t>
             </a:fld>
             <a:endParaRPr lang="en-US"/>
           </a:p>
@@ -1142,7 +1142,7 @@
           <a:p>
             <a:fld id="{19BFB1E6-C45E-FB40-AD8E-8FF72B5CFFBD}" type="datetimeFigureOut">
               <a:rPr lang="en-US" smtClean="0"/>
-              <a:t>11/29/2017</a:t>
+              <a:t>11/29/17</a:t>
             </a:fld>
             <a:endParaRPr lang="en-US"/>
           </a:p>
@@ -1307,7 +1307,7 @@
           <a:p>
             <a:fld id="{19BFB1E6-C45E-FB40-AD8E-8FF72B5CFFBD}" type="datetimeFigureOut">
               <a:rPr lang="en-US" smtClean="0"/>
-              <a:t>11/29/2017</a:t>
+              <a:t>11/29/17</a:t>
             </a:fld>
             <a:endParaRPr lang="en-US"/>
           </a:p>
@@ -1579,7 +1579,7 @@
           <a:p>
             <a:fld id="{19BFB1E6-C45E-FB40-AD8E-8FF72B5CFFBD}" type="datetimeFigureOut">
               <a:rPr lang="en-US" smtClean="0"/>
-              <a:t>11/29/2017</a:t>
+              <a:t>11/29/17</a:t>
             </a:fld>
             <a:endParaRPr lang="en-US"/>
           </a:p>
@@ -1968,7 +1968,7 @@
           <a:p>
             <a:fld id="{19BFB1E6-C45E-FB40-AD8E-8FF72B5CFFBD}" type="datetimeFigureOut">
               <a:rPr lang="en-US" smtClean="0"/>
-              <a:t>11/29/2017</a:t>
+              <a:t>11/29/17</a:t>
             </a:fld>
             <a:endParaRPr lang="en-US"/>
           </a:p>
@@ -2445,7 +2445,7 @@
           <a:p>
             <a:fld id="{19BFB1E6-C45E-FB40-AD8E-8FF72B5CFFBD}" type="datetimeFigureOut">
               <a:rPr lang="en-US" smtClean="0"/>
-              <a:t>11/29/2017</a:t>
+              <a:t>11/29/17</a:t>
             </a:fld>
             <a:endParaRPr lang="en-US"/>
           </a:p>
@@ -2563,7 +2563,7 @@
           <a:p>
             <a:fld id="{19BFB1E6-C45E-FB40-AD8E-8FF72B5CFFBD}" type="datetimeFigureOut">
               <a:rPr lang="en-US" smtClean="0"/>
-              <a:t>11/29/2017</a:t>
+              <a:t>11/29/17</a:t>
             </a:fld>
             <a:endParaRPr lang="en-US"/>
           </a:p>
@@ -2653,7 +2653,7 @@
           <a:p>
             <a:fld id="{19BFB1E6-C45E-FB40-AD8E-8FF72B5CFFBD}" type="datetimeFigureOut">
               <a:rPr lang="en-US" smtClean="0"/>
-              <a:t>11/29/2017</a:t>
+              <a:t>11/29/17</a:t>
             </a:fld>
             <a:endParaRPr lang="en-US"/>
           </a:p>
@@ -2994,7 +2994,7 @@
           <a:p>
             <a:fld id="{19BFB1E6-C45E-FB40-AD8E-8FF72B5CFFBD}" type="datetimeFigureOut">
               <a:rPr lang="en-US" smtClean="0"/>
-              <a:t>11/29/2017</a:t>
+              <a:t>11/29/17</a:t>
             </a:fld>
             <a:endParaRPr lang="en-US"/>
           </a:p>
@@ -3382,7 +3382,7 @@
           <a:p>
             <a:fld id="{19BFB1E6-C45E-FB40-AD8E-8FF72B5CFFBD}" type="datetimeFigureOut">
               <a:rPr lang="en-US" smtClean="0"/>
-              <a:t>11/29/2017</a:t>
+              <a:t>11/29/17</a:t>
             </a:fld>
             <a:endParaRPr lang="en-US"/>
           </a:p>
@@ -3655,7 +3655,7 @@
           <a:p>
             <a:fld id="{19BFB1E6-C45E-FB40-AD8E-8FF72B5CFFBD}" type="datetimeFigureOut">
               <a:rPr lang="en-US" smtClean="0"/>
-              <a:t>11/29/2017</a:t>
+              <a:t>11/29/17</a:t>
             </a:fld>
             <a:endParaRPr lang="en-US"/>
           </a:p>
@@ -4395,8 +4395,8 @@
         </p:nvSpPr>
         <p:spPr>
           <a:xfrm>
-            <a:off x="808382" y="490331"/>
-            <a:ext cx="10880035" cy="5632311"/>
+            <a:off x="1311965" y="437322"/>
+            <a:ext cx="10880035" cy="6001643"/>
           </a:xfrm>
           <a:prstGeom prst="rect">
             <a:avLst/>
@@ -4637,13 +4637,7 @@
             </a:r>
           </a:p>
           <a:p>
-            <a:pPr marR="0" lvl="2">
-              <a:spcBef>
-                <a:spcPts val="0"/>
-              </a:spcBef>
-              <a:spcAft>
-                <a:spcPts val="0"/>
-              </a:spcAft>
+            <a:pPr>
               <a:tabLst>
                 <a:tab pos="228600" algn="l"/>
               </a:tabLst>
@@ -4685,8 +4679,27 @@
                 <a:ea typeface="Calibri" charset="0"/>
                 <a:cs typeface="Times New Roman" charset="0"/>
               </a:rPr>
-              <a:t> on IBM bluemix.</a:t>
-            </a:r>
+              <a:t> on IBM bluemix</a:t>
+            </a:r>
+            <a:r>
+              <a:rPr lang="en-US" sz="2400" dirty="0" smtClean="0">
+                <a:effectLst/>
+                <a:ea typeface="Calibri" charset="0"/>
+                <a:cs typeface="Times New Roman" charset="0"/>
+              </a:rPr>
+              <a:t>.</a:t>
+            </a:r>
+          </a:p>
+          <a:p>
+            <a:pPr>
+              <a:tabLst>
+                <a:tab pos="228600" algn="l"/>
+              </a:tabLst>
+            </a:pPr>
+            <a:endParaRPr lang="en-US" sz="2400" dirty="0">
+              <a:ea typeface="Calibri" charset="0"/>
+              <a:cs typeface="Times New Roman" charset="0"/>
+            </a:endParaRPr>
           </a:p>
         </p:txBody>
       </p:sp>
@@ -5139,15 +5152,15 @@
         </p:nvSpPr>
         <p:spPr>
           <a:xfrm>
-            <a:off x="1167362" y="1057726"/>
-            <a:ext cx="8930650" cy="4893647"/>
+            <a:off x="1101101" y="593900"/>
+            <a:ext cx="10666829" cy="5816977"/>
           </a:xfrm>
           <a:prstGeom prst="rect">
             <a:avLst/>
           </a:prstGeom>
         </p:spPr>
         <p:txBody>
-          <a:bodyPr wrap="none">
+          <a:bodyPr wrap="square">
             <a:spAutoFit/>
           </a:bodyPr>
           <a:lstStyle/>
@@ -5449,13 +5462,47 @@
           <a:p>
             <a:r>
               <a:rPr lang="en-US" sz="2400" dirty="0"/>
-              <a:t>All countries</a:t>
-            </a:r>
-            <a:endParaRPr lang="en-US" sz="2400" dirty="0">
+              <a:t>All </a:t>
+            </a:r>
+            <a:r>
+              <a:rPr lang="en-US" sz="2400" dirty="0" smtClean="0"/>
+              <a:t>countries</a:t>
+            </a:r>
+          </a:p>
+          <a:p>
+            <a:endParaRPr lang="en-US" sz="1200" dirty="0">
               <a:solidFill>
                 <a:srgbClr val="FF0000"/>
               </a:solidFill>
             </a:endParaRPr>
+          </a:p>
+          <a:p>
+            <a:endParaRPr lang="en-US" sz="1200" dirty="0" smtClean="0">
+              <a:solidFill>
+                <a:srgbClr val="FF0000"/>
+              </a:solidFill>
+            </a:endParaRPr>
+          </a:p>
+          <a:p>
+            <a:r>
+              <a:rPr lang="en-US" sz="1200" dirty="0" smtClean="0"/>
+              <a:t>[1]  External debt refers to external debt stocks which comprises of long-term debt, short-term debt, use of IMF credit	</a:t>
+            </a:r>
+          </a:p>
+          <a:p>
+            <a:r>
+              <a:rPr lang="en-US" sz="1200" dirty="0" smtClean="0"/>
+              <a:t>[2] The countries in scope for this exercise are only those countries that report debt to World bank </a:t>
+            </a:r>
+            <a:r>
+              <a:rPr lang="mr-IN" sz="1200" dirty="0" smtClean="0"/>
+              <a:t>–</a:t>
+            </a:r>
+            <a:r>
+              <a:rPr lang="en-US" sz="1200" dirty="0" smtClean="0"/>
+              <a:t> excludes USA, Canada, Greenland and some of the european countries</a:t>
+            </a:r>
+            <a:endParaRPr lang="en-US" sz="1200" dirty="0"/>
           </a:p>
         </p:txBody>
       </p:sp>

</xml_diff>

<commit_message>
Changes 2 AM :)
</commit_message>
<xml_diff>
--- a/Term Presentation MSDS7330-404 GrpB.pptx
+++ b/Term Presentation MSDS7330-404 GrpB.pptx
@@ -206,7 +206,7 @@
           <a:p>
             <a:fld id="{3B223B20-14E5-414C-943F-923CD8C3ABC0}" type="datetimeFigureOut">
               <a:rPr lang="en-US" smtClean="0"/>
-              <a:t>11/29/17</a:t>
+              <a:t>11/29/2017</a:t>
             </a:fld>
             <a:endParaRPr lang="en-US"/>
           </a:p>
@@ -642,7 +642,7 @@
           <a:p>
             <a:fld id="{19BFB1E6-C45E-FB40-AD8E-8FF72B5CFFBD}" type="datetimeFigureOut">
               <a:rPr lang="en-US" smtClean="0"/>
-              <a:t>11/29/17</a:t>
+              <a:t>11/29/2017</a:t>
             </a:fld>
             <a:endParaRPr lang="en-US"/>
           </a:p>
@@ -967,7 +967,7 @@
           <a:p>
             <a:fld id="{19BFB1E6-C45E-FB40-AD8E-8FF72B5CFFBD}" type="datetimeFigureOut">
               <a:rPr lang="en-US" smtClean="0"/>
-              <a:t>11/29/17</a:t>
+              <a:t>11/29/2017</a:t>
             </a:fld>
             <a:endParaRPr lang="en-US"/>
           </a:p>
@@ -1142,7 +1142,7 @@
           <a:p>
             <a:fld id="{19BFB1E6-C45E-FB40-AD8E-8FF72B5CFFBD}" type="datetimeFigureOut">
               <a:rPr lang="en-US" smtClean="0"/>
-              <a:t>11/29/17</a:t>
+              <a:t>11/29/2017</a:t>
             </a:fld>
             <a:endParaRPr lang="en-US"/>
           </a:p>
@@ -1307,7 +1307,7 @@
           <a:p>
             <a:fld id="{19BFB1E6-C45E-FB40-AD8E-8FF72B5CFFBD}" type="datetimeFigureOut">
               <a:rPr lang="en-US" smtClean="0"/>
-              <a:t>11/29/17</a:t>
+              <a:t>11/29/2017</a:t>
             </a:fld>
             <a:endParaRPr lang="en-US"/>
           </a:p>
@@ -1579,7 +1579,7 @@
           <a:p>
             <a:fld id="{19BFB1E6-C45E-FB40-AD8E-8FF72B5CFFBD}" type="datetimeFigureOut">
               <a:rPr lang="en-US" smtClean="0"/>
-              <a:t>11/29/17</a:t>
+              <a:t>11/29/2017</a:t>
             </a:fld>
             <a:endParaRPr lang="en-US"/>
           </a:p>
@@ -1968,7 +1968,7 @@
           <a:p>
             <a:fld id="{19BFB1E6-C45E-FB40-AD8E-8FF72B5CFFBD}" type="datetimeFigureOut">
               <a:rPr lang="en-US" smtClean="0"/>
-              <a:t>11/29/17</a:t>
+              <a:t>11/29/2017</a:t>
             </a:fld>
             <a:endParaRPr lang="en-US"/>
           </a:p>
@@ -2445,7 +2445,7 @@
           <a:p>
             <a:fld id="{19BFB1E6-C45E-FB40-AD8E-8FF72B5CFFBD}" type="datetimeFigureOut">
               <a:rPr lang="en-US" smtClean="0"/>
-              <a:t>11/29/17</a:t>
+              <a:t>11/29/2017</a:t>
             </a:fld>
             <a:endParaRPr lang="en-US"/>
           </a:p>
@@ -2563,7 +2563,7 @@
           <a:p>
             <a:fld id="{19BFB1E6-C45E-FB40-AD8E-8FF72B5CFFBD}" type="datetimeFigureOut">
               <a:rPr lang="en-US" smtClean="0"/>
-              <a:t>11/29/17</a:t>
+              <a:t>11/29/2017</a:t>
             </a:fld>
             <a:endParaRPr lang="en-US"/>
           </a:p>
@@ -2653,7 +2653,7 @@
           <a:p>
             <a:fld id="{19BFB1E6-C45E-FB40-AD8E-8FF72B5CFFBD}" type="datetimeFigureOut">
               <a:rPr lang="en-US" smtClean="0"/>
-              <a:t>11/29/17</a:t>
+              <a:t>11/29/2017</a:t>
             </a:fld>
             <a:endParaRPr lang="en-US"/>
           </a:p>
@@ -2994,7 +2994,7 @@
           <a:p>
             <a:fld id="{19BFB1E6-C45E-FB40-AD8E-8FF72B5CFFBD}" type="datetimeFigureOut">
               <a:rPr lang="en-US" smtClean="0"/>
-              <a:t>11/29/17</a:t>
+              <a:t>11/29/2017</a:t>
             </a:fld>
             <a:endParaRPr lang="en-US"/>
           </a:p>
@@ -3382,7 +3382,7 @@
           <a:p>
             <a:fld id="{19BFB1E6-C45E-FB40-AD8E-8FF72B5CFFBD}" type="datetimeFigureOut">
               <a:rPr lang="en-US" smtClean="0"/>
-              <a:t>11/29/17</a:t>
+              <a:t>11/29/2017</a:t>
             </a:fld>
             <a:endParaRPr lang="en-US"/>
           </a:p>
@@ -3655,7 +3655,7 @@
           <a:p>
             <a:fld id="{19BFB1E6-C45E-FB40-AD8E-8FF72B5CFFBD}" type="datetimeFigureOut">
               <a:rPr lang="en-US" smtClean="0"/>
-              <a:t>11/29/17</a:t>
+              <a:t>11/29/2017</a:t>
             </a:fld>
             <a:endParaRPr lang="en-US"/>
           </a:p>
@@ -4679,15 +4679,7 @@
                 <a:ea typeface="Calibri" charset="0"/>
                 <a:cs typeface="Times New Roman" charset="0"/>
               </a:rPr>
-              <a:t> on IBM bluemix</a:t>
-            </a:r>
-            <a:r>
-              <a:rPr lang="en-US" sz="2400" dirty="0" smtClean="0">
-                <a:effectLst/>
-                <a:ea typeface="Calibri" charset="0"/>
-                <a:cs typeface="Times New Roman" charset="0"/>
-              </a:rPr>
-              <a:t>.</a:t>
+              <a:t> on IBM bluemix.</a:t>
             </a:r>
           </a:p>
           <a:p>
@@ -4780,27 +4772,14 @@
                 <a:effectLst/>
                 <a:ea typeface="Times New Roman" charset="0"/>
               </a:rPr>
-              <a:t> 7% &lt;</a:t>
-            </a:r>
-            <a:r>
-              <a:rPr lang="en-US" sz="2400" dirty="0" err="1">
-                <a:solidFill>
-                  <a:srgbClr val="FF0000"/>
-                </a:solidFill>
+              <a:t> </a:t>
+            </a:r>
+            <a:r>
+              <a:rPr lang="en-US" sz="2400" dirty="0">
                 <a:effectLst/>
                 <a:ea typeface="Times New Roman" charset="0"/>
               </a:rPr>
-              <a:t>Ramya</a:t>
-            </a:r>
-            <a:r>
-              <a:rPr lang="en-US" sz="2400" dirty="0">
-                <a:solidFill>
-                  <a:srgbClr val="FF0000"/>
-                </a:solidFill>
-                <a:effectLst/>
-                <a:ea typeface="Times New Roman" charset="0"/>
-              </a:rPr>
-              <a:t>&gt;</a:t>
+              <a:t>155 MB</a:t>
             </a:r>
           </a:p>
           <a:p>
@@ -4847,7 +4826,7 @@
                 <a:effectLst/>
                 <a:ea typeface="Times New Roman" charset="0"/>
               </a:rPr>
-              <a:t> 6%</a:t>
+              <a:t> </a:t>
             </a:r>
           </a:p>
           <a:p>
@@ -4950,31 +4929,7 @@
             </a:pPr>
             <a:r>
               <a:rPr lang="en-US" sz="2400" dirty="0"/>
-              <a:t>Size): </a:t>
-            </a:r>
-            <a:r>
-              <a:rPr lang="en-US" sz="2400" dirty="0">
-                <a:solidFill>
-                  <a:srgbClr val="FF0000"/>
-                </a:solidFill>
-              </a:rPr>
-              <a:t>8% &lt;</a:t>
-            </a:r>
-            <a:r>
-              <a:rPr lang="en-US" sz="2400" dirty="0" err="1">
-                <a:solidFill>
-                  <a:srgbClr val="FF0000"/>
-                </a:solidFill>
-              </a:rPr>
-              <a:t>Ramya</a:t>
-            </a:r>
-            <a:r>
-              <a:rPr lang="en-US" sz="2400" dirty="0">
-                <a:solidFill>
-                  <a:srgbClr val="FF0000"/>
-                </a:solidFill>
-              </a:rPr>
-              <a:t>&gt;</a:t>
+              <a:t>Size): MySQL (5.7.19), 1GB </a:t>
             </a:r>
           </a:p>
           <a:p>
@@ -5153,7 +5108,7 @@
         <p:spPr>
           <a:xfrm>
             <a:off x="1101101" y="593900"/>
-            <a:ext cx="10666829" cy="5816977"/>
+            <a:ext cx="10666829" cy="6555641"/>
           </a:xfrm>
           <a:prstGeom prst="rect">
             <a:avLst/>
@@ -5233,7 +5188,7 @@
                 <a:ea typeface="Calibri" charset="0"/>
                 <a:cs typeface="Times New Roman" charset="0"/>
               </a:rPr>
-              <a:t>XXXXX</a:t>
+              <a:t>China(CHN)</a:t>
             </a:r>
             <a:r>
               <a:rPr lang="en-US" sz="2400" dirty="0">
@@ -5254,34 +5209,17 @@
                 <a:ea typeface="Calibri" charset="0"/>
                 <a:cs typeface="Times New Roman" charset="0"/>
               </a:rPr>
-              <a:t> </a:t>
-            </a:r>
-            <a:r>
-              <a:rPr lang="en-US" sz="2400" dirty="0" err="1">
+              <a:t> i.e.</a:t>
+            </a:r>
+            <a:r>
+              <a:rPr lang="en-US" sz="2400" dirty="0">
+                <a:solidFill>
+                  <a:srgbClr val="FF0000"/>
+                </a:solidFill>
                 <a:ea typeface="Calibri" charset="0"/>
                 <a:cs typeface="Times New Roman" charset="0"/>
               </a:rPr>
-              <a:t>i.e.</a:t>
-            </a:r>
-            <a:r>
-              <a:rPr lang="en-US" sz="2400" dirty="0" err="1">
-                <a:solidFill>
-                  <a:srgbClr val="FF0000"/>
-                </a:solidFill>
-                <a:ea typeface="Calibri" charset="0"/>
-                <a:cs typeface="Times New Roman" charset="0"/>
-              </a:rPr>
-              <a:t>$XXXXX</a:t>
-            </a:r>
-            <a:r>
-              <a:rPr lang="en-US" sz="2400" dirty="0">
-                <a:solidFill>
-                  <a:srgbClr val="FF0000"/>
-                </a:solidFill>
-                <a:ea typeface="Calibri" charset="0"/>
-                <a:cs typeface="Times New Roman" charset="0"/>
-              </a:rPr>
-              <a:t> </a:t>
+              <a:t>$1430 Billion </a:t>
             </a:r>
             <a:r>
               <a:rPr lang="en-US" sz="2400" dirty="0">
@@ -5340,7 +5278,7 @@
                 <a:ea typeface="Calibri" charset="0"/>
                 <a:cs typeface="Times New Roman" charset="0"/>
               </a:rPr>
-              <a:t>XXXXX</a:t>
+              <a:t>Tonga(TON – Polynesian Island)</a:t>
             </a:r>
             <a:r>
               <a:rPr lang="en-US" sz="2400" dirty="0">
@@ -5361,34 +5299,17 @@
                 <a:ea typeface="Calibri" charset="0"/>
                 <a:cs typeface="Times New Roman" charset="0"/>
               </a:rPr>
-              <a:t> </a:t>
-            </a:r>
-            <a:r>
-              <a:rPr lang="en-US" sz="2400" dirty="0" err="1">
+              <a:t> i.e.</a:t>
+            </a:r>
+            <a:r>
+              <a:rPr lang="en-US" sz="2400" dirty="0">
+                <a:solidFill>
+                  <a:srgbClr val="FF0000"/>
+                </a:solidFill>
                 <a:ea typeface="Calibri" charset="0"/>
                 <a:cs typeface="Times New Roman" charset="0"/>
               </a:rPr>
-              <a:t>i.e.</a:t>
-            </a:r>
-            <a:r>
-              <a:rPr lang="en-US" sz="2400" dirty="0" err="1">
-                <a:solidFill>
-                  <a:srgbClr val="FF0000"/>
-                </a:solidFill>
-                <a:ea typeface="Calibri" charset="0"/>
-                <a:cs typeface="Times New Roman" charset="0"/>
-              </a:rPr>
-              <a:t>$XXXXX</a:t>
-            </a:r>
-            <a:r>
-              <a:rPr lang="en-US" sz="2400" dirty="0">
-                <a:solidFill>
-                  <a:srgbClr val="FF0000"/>
-                </a:solidFill>
-                <a:ea typeface="Calibri" charset="0"/>
-                <a:cs typeface="Times New Roman" charset="0"/>
-              </a:rPr>
-              <a:t> </a:t>
+              <a:t>$159.855 Million </a:t>
             </a:r>
             <a:r>
               <a:rPr lang="en-US" sz="2400" dirty="0">
@@ -5462,14 +5383,32 @@
           <a:p>
             <a:r>
               <a:rPr lang="en-US" sz="2400" dirty="0"/>
-              <a:t>All </a:t>
-            </a:r>
-            <a:r>
-              <a:rPr lang="en-US" sz="2400" dirty="0" smtClean="0"/>
-              <a:t>countries</a:t>
-            </a:r>
-          </a:p>
-          <a:p>
+              <a:t>All countries. Within long-term debt, private non-guaranteed category contributes majorly towards the debt(</a:t>
+            </a:r>
+            <a:r>
+              <a:rPr lang="en-US" sz="2400" b="1" dirty="0">
+                <a:solidFill>
+                  <a:srgbClr val="FF0000"/>
+                </a:solidFill>
+              </a:rPr>
+              <a:t>49.4%</a:t>
+            </a:r>
+            <a:r>
+              <a:rPr lang="en-US" sz="2400" dirty="0"/>
+              <a:t>). Official creditors(WB entities) contributing </a:t>
+            </a:r>
+            <a:r>
+              <a:rPr lang="en-US" sz="2400" b="1" dirty="0">
+                <a:solidFill>
+                  <a:srgbClr val="00B050"/>
+                </a:solidFill>
+              </a:rPr>
+              <a:t>20%</a:t>
+            </a:r>
+            <a:r>
+              <a:rPr lang="en-US" sz="2400" dirty="0"/>
+              <a:t>.</a:t>
+            </a:r>
             <a:endParaRPr lang="en-US" sz="1200" dirty="0">
               <a:solidFill>
                 <a:srgbClr val="FF0000"/>
@@ -5477,7 +5416,7 @@
             </a:endParaRPr>
           </a:p>
           <a:p>
-            <a:endParaRPr lang="en-US" sz="1200" dirty="0" smtClean="0">
+            <a:endParaRPr lang="en-US" sz="1200" dirty="0">
               <a:solidFill>
                 <a:srgbClr val="FF0000"/>
               </a:solidFill>
@@ -5485,24 +5424,23 @@
           </a:p>
           <a:p>
             <a:r>
-              <a:rPr lang="en-US" sz="1200" dirty="0" smtClean="0"/>
+              <a:rPr lang="en-US" sz="1200" dirty="0"/>
               <a:t>[1]  External debt refers to external debt stocks which comprises of long-term debt, short-term debt, use of IMF credit	</a:t>
             </a:r>
           </a:p>
           <a:p>
             <a:r>
-              <a:rPr lang="en-US" sz="1200" dirty="0" smtClean="0"/>
+              <a:rPr lang="en-US" sz="1200" dirty="0"/>
               <a:t>[2] The countries in scope for this exercise are only those countries that report debt to World bank </a:t>
             </a:r>
             <a:r>
-              <a:rPr lang="mr-IN" sz="1200" dirty="0" smtClean="0"/>
+              <a:rPr lang="mr-IN" sz="1200" dirty="0"/>
               <a:t>–</a:t>
             </a:r>
             <a:r>
-              <a:rPr lang="en-US" sz="1200" dirty="0" smtClean="0"/>
+              <a:rPr lang="en-US" sz="1200" dirty="0"/>
               <a:t> excludes USA, Canada, Greenland and some of the european countries</a:t>
             </a:r>
-            <a:endParaRPr lang="en-US" sz="1200" dirty="0"/>
           </a:p>
         </p:txBody>
       </p:sp>
@@ -5545,7 +5483,7 @@
         <p:spPr>
           <a:xfrm>
             <a:off x="1298712" y="1311965"/>
-            <a:ext cx="9755684" cy="3785652"/>
+            <a:ext cx="10835467" cy="3785652"/>
           </a:xfrm>
           <a:prstGeom prst="rect">
             <a:avLst/>
@@ -5587,17 +5525,29 @@
                   <a:srgbClr val="FF0000"/>
                 </a:solidFill>
               </a:rPr>
-              <a:t>XXXX income level </a:t>
+              <a:t>Upper middle income level </a:t>
             </a:r>
             <a:r>
               <a:rPr lang="en-US" sz="2400" dirty="0"/>
-              <a:t>seems to be highest</a:t>
+              <a:t>seems to be </a:t>
             </a:r>
           </a:p>
           <a:p>
             <a:r>
               <a:rPr lang="en-US" sz="2400" dirty="0"/>
-              <a:t>Among all the countries and </a:t>
+              <a:t>highest(</a:t>
+            </a:r>
+            <a:r>
+              <a:rPr lang="en-US" sz="2400" b="1" dirty="0">
+                <a:solidFill>
+                  <a:srgbClr val="FF0000"/>
+                </a:solidFill>
+              </a:rPr>
+              <a:t>64%</a:t>
+            </a:r>
+            <a:r>
+              <a:rPr lang="en-US" sz="2400" dirty="0"/>
+              <a:t>) among all the countries and </a:t>
             </a:r>
             <a:r>
               <a:rPr lang="en-US" sz="2400" dirty="0">
@@ -5605,7 +5555,7 @@
                   <a:srgbClr val="FF0000"/>
                 </a:solidFill>
               </a:rPr>
-              <a:t>XXXX income level </a:t>
+              <a:t>Low income level </a:t>
             </a:r>
             <a:r>
               <a:rPr lang="en-US" sz="2400" dirty="0"/>

</xml_diff>

<commit_message>
Kim update originality in power ppt
</commit_message>
<xml_diff>
--- a/Term Presentation MSDS7330-404 GrpB.pptx
+++ b/Term Presentation MSDS7330-404 GrpB.pptx
@@ -206,7 +206,7 @@
           <a:p>
             <a:fld id="{3B223B20-14E5-414C-943F-923CD8C3ABC0}" type="datetimeFigureOut">
               <a:rPr lang="en-US" smtClean="0"/>
-              <a:t>11/29/2017</a:t>
+              <a:t>11/30/17</a:t>
             </a:fld>
             <a:endParaRPr lang="en-US"/>
           </a:p>
@@ -642,7 +642,7 @@
           <a:p>
             <a:fld id="{19BFB1E6-C45E-FB40-AD8E-8FF72B5CFFBD}" type="datetimeFigureOut">
               <a:rPr lang="en-US" smtClean="0"/>
-              <a:t>11/29/2017</a:t>
+              <a:t>11/30/17</a:t>
             </a:fld>
             <a:endParaRPr lang="en-US"/>
           </a:p>
@@ -967,7 +967,7 @@
           <a:p>
             <a:fld id="{19BFB1E6-C45E-FB40-AD8E-8FF72B5CFFBD}" type="datetimeFigureOut">
               <a:rPr lang="en-US" smtClean="0"/>
-              <a:t>11/29/2017</a:t>
+              <a:t>11/30/17</a:t>
             </a:fld>
             <a:endParaRPr lang="en-US"/>
           </a:p>
@@ -1142,7 +1142,7 @@
           <a:p>
             <a:fld id="{19BFB1E6-C45E-FB40-AD8E-8FF72B5CFFBD}" type="datetimeFigureOut">
               <a:rPr lang="en-US" smtClean="0"/>
-              <a:t>11/29/2017</a:t>
+              <a:t>11/30/17</a:t>
             </a:fld>
             <a:endParaRPr lang="en-US"/>
           </a:p>
@@ -1307,7 +1307,7 @@
           <a:p>
             <a:fld id="{19BFB1E6-C45E-FB40-AD8E-8FF72B5CFFBD}" type="datetimeFigureOut">
               <a:rPr lang="en-US" smtClean="0"/>
-              <a:t>11/29/2017</a:t>
+              <a:t>11/30/17</a:t>
             </a:fld>
             <a:endParaRPr lang="en-US"/>
           </a:p>
@@ -1579,7 +1579,7 @@
           <a:p>
             <a:fld id="{19BFB1E6-C45E-FB40-AD8E-8FF72B5CFFBD}" type="datetimeFigureOut">
               <a:rPr lang="en-US" smtClean="0"/>
-              <a:t>11/29/2017</a:t>
+              <a:t>11/30/17</a:t>
             </a:fld>
             <a:endParaRPr lang="en-US"/>
           </a:p>
@@ -1968,7 +1968,7 @@
           <a:p>
             <a:fld id="{19BFB1E6-C45E-FB40-AD8E-8FF72B5CFFBD}" type="datetimeFigureOut">
               <a:rPr lang="en-US" smtClean="0"/>
-              <a:t>11/29/2017</a:t>
+              <a:t>11/30/17</a:t>
             </a:fld>
             <a:endParaRPr lang="en-US"/>
           </a:p>
@@ -2445,7 +2445,7 @@
           <a:p>
             <a:fld id="{19BFB1E6-C45E-FB40-AD8E-8FF72B5CFFBD}" type="datetimeFigureOut">
               <a:rPr lang="en-US" smtClean="0"/>
-              <a:t>11/29/2017</a:t>
+              <a:t>11/30/17</a:t>
             </a:fld>
             <a:endParaRPr lang="en-US"/>
           </a:p>
@@ -2563,7 +2563,7 @@
           <a:p>
             <a:fld id="{19BFB1E6-C45E-FB40-AD8E-8FF72B5CFFBD}" type="datetimeFigureOut">
               <a:rPr lang="en-US" smtClean="0"/>
-              <a:t>11/29/2017</a:t>
+              <a:t>11/30/17</a:t>
             </a:fld>
             <a:endParaRPr lang="en-US"/>
           </a:p>
@@ -2653,7 +2653,7 @@
           <a:p>
             <a:fld id="{19BFB1E6-C45E-FB40-AD8E-8FF72B5CFFBD}" type="datetimeFigureOut">
               <a:rPr lang="en-US" smtClean="0"/>
-              <a:t>11/29/2017</a:t>
+              <a:t>11/30/17</a:t>
             </a:fld>
             <a:endParaRPr lang="en-US"/>
           </a:p>
@@ -2994,7 +2994,7 @@
           <a:p>
             <a:fld id="{19BFB1E6-C45E-FB40-AD8E-8FF72B5CFFBD}" type="datetimeFigureOut">
               <a:rPr lang="en-US" smtClean="0"/>
-              <a:t>11/29/2017</a:t>
+              <a:t>11/30/17</a:t>
             </a:fld>
             <a:endParaRPr lang="en-US"/>
           </a:p>
@@ -3382,7 +3382,7 @@
           <a:p>
             <a:fld id="{19BFB1E6-C45E-FB40-AD8E-8FF72B5CFFBD}" type="datetimeFigureOut">
               <a:rPr lang="en-US" smtClean="0"/>
-              <a:t>11/29/2017</a:t>
+              <a:t>11/30/17</a:t>
             </a:fld>
             <a:endParaRPr lang="en-US"/>
           </a:p>
@@ -3655,7 +3655,7 @@
           <a:p>
             <a:fld id="{19BFB1E6-C45E-FB40-AD8E-8FF72B5CFFBD}" type="datetimeFigureOut">
               <a:rPr lang="en-US" smtClean="0"/>
-              <a:t>11/29/2017</a:t>
+              <a:t>11/30/17</a:t>
             </a:fld>
             <a:endParaRPr lang="en-US"/>
           </a:p>
@@ -5014,8 +5014,8 @@
         </p:nvSpPr>
         <p:spPr>
           <a:xfrm>
-            <a:off x="1245704" y="1297125"/>
-            <a:ext cx="9090991" cy="1416734"/>
+            <a:off x="1162577" y="0"/>
+            <a:ext cx="10813523" cy="6932667"/>
           </a:xfrm>
           <a:prstGeom prst="rect">
             <a:avLst/>
@@ -5044,6 +5044,243 @@
             <a:r>
               <a:rPr lang="en-US" sz="2400" dirty="0"/>
               <a:t>How unique your idea different from the existing data analysis (10%) </a:t>
+            </a:r>
+          </a:p>
+          <a:p>
+            <a:endParaRPr lang="en-US" sz="2400" dirty="0" smtClean="0"/>
+          </a:p>
+          <a:p>
+            <a:r>
+              <a:rPr lang="en-US" sz="2400" dirty="0" smtClean="0"/>
+              <a:t>Link to existing data analysis : </a:t>
+            </a:r>
+            <a:r>
+              <a:rPr lang="en-US" sz="2400" u="sng" dirty="0" smtClean="0">
+                <a:solidFill>
+                  <a:srgbClr val="0070C0"/>
+                </a:solidFill>
+                <a:ea typeface="Calibri" charset="0"/>
+                <a:cs typeface="Times New Roman" charset="0"/>
+                <a:hlinkClick r:id="rId2"/>
+              </a:rPr>
+              <a:t>https</a:t>
+            </a:r>
+            <a:r>
+              <a:rPr lang="en-US" sz="2400" u="sng" dirty="0">
+                <a:solidFill>
+                  <a:srgbClr val="0070C0"/>
+                </a:solidFill>
+                <a:ea typeface="Calibri" charset="0"/>
+                <a:cs typeface="Times New Roman" charset="0"/>
+                <a:hlinkClick r:id="rId2"/>
+              </a:rPr>
+              <a:t>://cloud.google.com/bigquery/public-data/world-bank-international-debt</a:t>
+            </a:r>
+            <a:r>
+              <a:rPr lang="en-US" sz="2400" dirty="0">
+                <a:solidFill>
+                  <a:srgbClr val="0070C0"/>
+                </a:solidFill>
+                <a:ea typeface="Calibri" charset="0"/>
+                <a:cs typeface="Times New Roman" charset="0"/>
+              </a:rPr>
+              <a:t> </a:t>
+            </a:r>
+            <a:endParaRPr lang="en-US" sz="2400" dirty="0" smtClean="0"/>
+          </a:p>
+          <a:p>
+            <a:pPr fontAlgn="base"/>
+            <a:endParaRPr lang="en-US" sz="2400" dirty="0" smtClean="0"/>
+          </a:p>
+          <a:p>
+            <a:pPr fontAlgn="base"/>
+            <a:r>
+              <a:rPr lang="en-US" sz="2400" dirty="0" smtClean="0"/>
+              <a:t>While </a:t>
+            </a:r>
+            <a:r>
+              <a:rPr lang="en-US" sz="2400" dirty="0"/>
+              <a:t>existing data analysis </a:t>
+            </a:r>
+            <a:r>
+              <a:rPr lang="en-US" sz="2400" dirty="0" smtClean="0"/>
+              <a:t>is on Present </a:t>
+            </a:r>
+            <a:r>
+              <a:rPr lang="en-US" sz="2400" dirty="0"/>
+              <a:t>Value of External Debt, we focus on </a:t>
+            </a:r>
+            <a:r>
+              <a:rPr lang="en-US" sz="2400" dirty="0">
+                <a:solidFill>
+                  <a:srgbClr val="FF0000"/>
+                </a:solidFill>
+              </a:rPr>
+              <a:t>debt outstanding as of Year 2016</a:t>
+            </a:r>
+            <a:r>
+              <a:rPr lang="en-US" sz="2400" dirty="0"/>
+              <a:t>. This is to ensure we </a:t>
+            </a:r>
+            <a:r>
+              <a:rPr lang="en-US" sz="2400" dirty="0" smtClean="0"/>
+              <a:t>minimize </a:t>
+            </a:r>
+            <a:r>
+              <a:rPr lang="en-US" sz="2400" dirty="0"/>
+              <a:t>the need to make assumptions on what is the relevant rate to discount specific </a:t>
+            </a:r>
+            <a:r>
+              <a:rPr lang="en-US" sz="2400" dirty="0" smtClean="0"/>
+              <a:t>currency. </a:t>
+            </a:r>
+            <a:r>
+              <a:rPr lang="en-US" sz="2400" dirty="0"/>
+              <a:t> </a:t>
+            </a:r>
+            <a:r>
+              <a:rPr lang="en-US" sz="2400" dirty="0" smtClean="0"/>
+              <a:t>These assumption are often speculative and subject to country-specific </a:t>
+            </a:r>
+            <a:r>
+              <a:rPr lang="en-US" sz="2400" dirty="0"/>
+              <a:t>circumstances and </a:t>
+            </a:r>
+            <a:r>
+              <a:rPr lang="en-US" sz="2400" dirty="0" smtClean="0"/>
+              <a:t>changes happen </a:t>
+            </a:r>
+            <a:r>
+              <a:rPr lang="en-US" sz="2400" dirty="0"/>
+              <a:t>over the life of the </a:t>
+            </a:r>
+            <a:r>
+              <a:rPr lang="en-US" sz="2400" dirty="0" smtClean="0"/>
+              <a:t>debt. </a:t>
+            </a:r>
+            <a:r>
+              <a:rPr lang="en-US" sz="2400" dirty="0"/>
+              <a:t>In additional, 2016 had the most completed data to date for most countries </a:t>
+            </a:r>
+          </a:p>
+          <a:p>
+            <a:pPr fontAlgn="base"/>
+            <a:r>
+              <a:rPr lang="en-US" sz="2400" dirty="0"/>
+              <a:t> </a:t>
+            </a:r>
+          </a:p>
+          <a:p>
+            <a:pPr fontAlgn="base"/>
+            <a:r>
+              <a:rPr lang="en-US" sz="2400" dirty="0"/>
+              <a:t>We also </a:t>
+            </a:r>
+            <a:r>
+              <a:rPr lang="en-US" sz="2400" dirty="0" smtClean="0"/>
+              <a:t>explore </a:t>
+            </a:r>
+            <a:r>
+              <a:rPr lang="en-US" sz="2400" dirty="0" smtClean="0">
+                <a:solidFill>
+                  <a:srgbClr val="FF0000"/>
+                </a:solidFill>
+              </a:rPr>
+              <a:t>if </a:t>
+            </a:r>
+            <a:r>
+              <a:rPr lang="en-US" sz="2400" dirty="0">
+                <a:solidFill>
+                  <a:srgbClr val="FF0000"/>
+                </a:solidFill>
+                <a:ea typeface="Calibri" charset="0"/>
+                <a:cs typeface="Times New Roman" charset="0"/>
+              </a:rPr>
+              <a:t>income level has </a:t>
+            </a:r>
+            <a:r>
+              <a:rPr lang="en-US" sz="2400" dirty="0" smtClean="0">
+                <a:solidFill>
+                  <a:srgbClr val="FF0000"/>
+                </a:solidFill>
+                <a:ea typeface="Calibri" charset="0"/>
+                <a:cs typeface="Times New Roman" charset="0"/>
+              </a:rPr>
+              <a:t>impact on </a:t>
+            </a:r>
+            <a:r>
+              <a:rPr lang="en-US" sz="2400" dirty="0">
+                <a:solidFill>
+                  <a:srgbClr val="FF0000"/>
+                </a:solidFill>
+                <a:ea typeface="Calibri" charset="0"/>
+                <a:cs typeface="Times New Roman" charset="0"/>
+              </a:rPr>
+              <a:t>the debt level of the country </a:t>
+            </a:r>
+            <a:r>
+              <a:rPr lang="en-US" sz="2400" dirty="0" smtClean="0">
+                <a:solidFill>
+                  <a:srgbClr val="FF0000"/>
+                </a:solidFill>
+              </a:rPr>
+              <a:t>and</a:t>
+            </a:r>
+            <a:r>
+              <a:rPr lang="en-US" sz="2400" dirty="0">
+                <a:solidFill>
+                  <a:srgbClr val="FF0000"/>
+                </a:solidFill>
+              </a:rPr>
+              <a:t> distribution of </a:t>
+            </a:r>
+            <a:r>
+              <a:rPr lang="en-US" sz="2400" dirty="0" smtClean="0">
+                <a:solidFill>
+                  <a:srgbClr val="FF0000"/>
+                </a:solidFill>
+              </a:rPr>
+              <a:t>debt </a:t>
+            </a:r>
+            <a:r>
+              <a:rPr lang="en-US" sz="2400" dirty="0">
+                <a:solidFill>
+                  <a:srgbClr val="FF0000"/>
+                </a:solidFill>
+              </a:rPr>
+              <a:t>categories</a:t>
+            </a:r>
+            <a:r>
+              <a:rPr lang="en-US" sz="2400" dirty="0"/>
+              <a:t>. This will expand our understanding of what kind of debt instrument were widely used and what income level have access to such instruments. </a:t>
+            </a:r>
+            <a:r>
+              <a:rPr lang="en-US" sz="2400" dirty="0"/>
+              <a:t> </a:t>
+            </a:r>
+            <a:r>
+              <a:rPr lang="en-US" sz="2400" dirty="0" smtClean="0"/>
+              <a:t>Existing </a:t>
+            </a:r>
+            <a:r>
+              <a:rPr lang="en-US" sz="2400" dirty="0"/>
+              <a:t>data analysis </a:t>
+            </a:r>
+            <a:r>
+              <a:rPr lang="en-US" sz="2400" dirty="0" smtClean="0"/>
+              <a:t>limited</a:t>
+            </a:r>
+            <a:r>
+              <a:rPr lang="en-US" sz="2400" dirty="0"/>
+              <a:t> </a:t>
+            </a:r>
+            <a:r>
+              <a:rPr lang="en-US" sz="2400" dirty="0" smtClean="0"/>
+              <a:t>to </a:t>
+            </a:r>
+            <a:r>
+              <a:rPr lang="en-US" sz="2400" dirty="0"/>
+              <a:t>by country ranking</a:t>
             </a:r>
           </a:p>
           <a:p>

</xml_diff>

<commit_message>
Few updates to footnotes
</commit_message>
<xml_diff>
--- a/Term Presentation MSDS7330-404 GrpB.pptx
+++ b/Term Presentation MSDS7330-404 GrpB.pptx
@@ -206,7 +206,7 @@
           <a:p>
             <a:fld id="{3B223B20-14E5-414C-943F-923CD8C3ABC0}" type="datetimeFigureOut">
               <a:rPr lang="en-US" smtClean="0"/>
-              <a:t>11/29/2017</a:t>
+              <a:t>11/30/17</a:t>
             </a:fld>
             <a:endParaRPr lang="en-US"/>
           </a:p>
@@ -642,7 +642,7 @@
           <a:p>
             <a:fld id="{19BFB1E6-C45E-FB40-AD8E-8FF72B5CFFBD}" type="datetimeFigureOut">
               <a:rPr lang="en-US" smtClean="0"/>
-              <a:t>11/29/2017</a:t>
+              <a:t>11/30/17</a:t>
             </a:fld>
             <a:endParaRPr lang="en-US"/>
           </a:p>
@@ -967,7 +967,7 @@
           <a:p>
             <a:fld id="{19BFB1E6-C45E-FB40-AD8E-8FF72B5CFFBD}" type="datetimeFigureOut">
               <a:rPr lang="en-US" smtClean="0"/>
-              <a:t>11/29/2017</a:t>
+              <a:t>11/30/17</a:t>
             </a:fld>
             <a:endParaRPr lang="en-US"/>
           </a:p>
@@ -1142,7 +1142,7 @@
           <a:p>
             <a:fld id="{19BFB1E6-C45E-FB40-AD8E-8FF72B5CFFBD}" type="datetimeFigureOut">
               <a:rPr lang="en-US" smtClean="0"/>
-              <a:t>11/29/2017</a:t>
+              <a:t>11/30/17</a:t>
             </a:fld>
             <a:endParaRPr lang="en-US"/>
           </a:p>
@@ -1307,7 +1307,7 @@
           <a:p>
             <a:fld id="{19BFB1E6-C45E-FB40-AD8E-8FF72B5CFFBD}" type="datetimeFigureOut">
               <a:rPr lang="en-US" smtClean="0"/>
-              <a:t>11/29/2017</a:t>
+              <a:t>11/30/17</a:t>
             </a:fld>
             <a:endParaRPr lang="en-US"/>
           </a:p>
@@ -1579,7 +1579,7 @@
           <a:p>
             <a:fld id="{19BFB1E6-C45E-FB40-AD8E-8FF72B5CFFBD}" type="datetimeFigureOut">
               <a:rPr lang="en-US" smtClean="0"/>
-              <a:t>11/29/2017</a:t>
+              <a:t>11/30/17</a:t>
             </a:fld>
             <a:endParaRPr lang="en-US"/>
           </a:p>
@@ -1968,7 +1968,7 @@
           <a:p>
             <a:fld id="{19BFB1E6-C45E-FB40-AD8E-8FF72B5CFFBD}" type="datetimeFigureOut">
               <a:rPr lang="en-US" smtClean="0"/>
-              <a:t>11/29/2017</a:t>
+              <a:t>11/30/17</a:t>
             </a:fld>
             <a:endParaRPr lang="en-US"/>
           </a:p>
@@ -2445,7 +2445,7 @@
           <a:p>
             <a:fld id="{19BFB1E6-C45E-FB40-AD8E-8FF72B5CFFBD}" type="datetimeFigureOut">
               <a:rPr lang="en-US" smtClean="0"/>
-              <a:t>11/29/2017</a:t>
+              <a:t>11/30/17</a:t>
             </a:fld>
             <a:endParaRPr lang="en-US"/>
           </a:p>
@@ -2563,7 +2563,7 @@
           <a:p>
             <a:fld id="{19BFB1E6-C45E-FB40-AD8E-8FF72B5CFFBD}" type="datetimeFigureOut">
               <a:rPr lang="en-US" smtClean="0"/>
-              <a:t>11/29/2017</a:t>
+              <a:t>11/30/17</a:t>
             </a:fld>
             <a:endParaRPr lang="en-US"/>
           </a:p>
@@ -2653,7 +2653,7 @@
           <a:p>
             <a:fld id="{19BFB1E6-C45E-FB40-AD8E-8FF72B5CFFBD}" type="datetimeFigureOut">
               <a:rPr lang="en-US" smtClean="0"/>
-              <a:t>11/29/2017</a:t>
+              <a:t>11/30/17</a:t>
             </a:fld>
             <a:endParaRPr lang="en-US"/>
           </a:p>
@@ -2994,7 +2994,7 @@
           <a:p>
             <a:fld id="{19BFB1E6-C45E-FB40-AD8E-8FF72B5CFFBD}" type="datetimeFigureOut">
               <a:rPr lang="en-US" smtClean="0"/>
-              <a:t>11/29/2017</a:t>
+              <a:t>11/30/17</a:t>
             </a:fld>
             <a:endParaRPr lang="en-US"/>
           </a:p>
@@ -3382,7 +3382,7 @@
           <a:p>
             <a:fld id="{19BFB1E6-C45E-FB40-AD8E-8FF72B5CFFBD}" type="datetimeFigureOut">
               <a:rPr lang="en-US" smtClean="0"/>
-              <a:t>11/29/2017</a:t>
+              <a:t>11/30/17</a:t>
             </a:fld>
             <a:endParaRPr lang="en-US"/>
           </a:p>
@@ -3655,7 +3655,7 @@
           <a:p>
             <a:fld id="{19BFB1E6-C45E-FB40-AD8E-8FF72B5CFFBD}" type="datetimeFigureOut">
               <a:rPr lang="en-US" smtClean="0"/>
-              <a:t>11/29/2017</a:t>
+              <a:t>11/30/17</a:t>
             </a:fld>
             <a:endParaRPr lang="en-US"/>
           </a:p>
@@ -4395,7 +4395,7 @@
         </p:nvSpPr>
         <p:spPr>
           <a:xfrm>
-            <a:off x="1311965" y="437322"/>
+            <a:off x="736231" y="646333"/>
             <a:ext cx="10880035" cy="6001643"/>
           </a:xfrm>
           <a:prstGeom prst="rect">
@@ -4457,12 +4457,12 @@
           </a:p>
           <a:p>
             <a:r>
-              <a:rPr lang="en-US" sz="2400" u="sng" dirty="0">
+              <a:rPr lang="en-US" sz="2400" dirty="0" smtClean="0">
                 <a:effectLst/>
                 <a:ea typeface="Calibri" charset="0"/>
                 <a:cs typeface="Times New Roman" charset="0"/>
               </a:rPr>
-              <a:t>Answer: </a:t>
+              <a:t>We </a:t>
             </a:r>
             <a:r>
               <a:rPr lang="en-US" sz="2400" dirty="0">
@@ -4470,7 +4470,7 @@
                 <a:ea typeface="Calibri" charset="0"/>
                 <a:cs typeface="Times New Roman" charset="0"/>
               </a:rPr>
-              <a:t>We would like to use the international debt public data set from World Bank available at </a:t>
+              <a:t>would like to use the international debt public data set from World Bank available at </a:t>
             </a:r>
             <a:r>
               <a:rPr lang="en-US" sz="2400" u="sng" dirty="0">
@@ -4564,12 +4564,12 @@
           </a:p>
           <a:p>
             <a:r>
-              <a:rPr lang="en-US" sz="2400" u="sng" dirty="0">
+              <a:rPr lang="en-US" sz="2400" dirty="0" smtClean="0">
                 <a:effectLst/>
                 <a:ea typeface="Calibri" charset="0"/>
                 <a:cs typeface="Times New Roman" charset="0"/>
               </a:rPr>
-              <a:t>Answer:</a:t>
+              <a:t>We </a:t>
             </a:r>
             <a:r>
               <a:rPr lang="en-US" sz="2400" dirty="0">
@@ -4577,7 +4577,7 @@
                 <a:ea typeface="Calibri" charset="0"/>
                 <a:cs typeface="Times New Roman" charset="0"/>
               </a:rPr>
-              <a:t> We would like to find out which country has the highest debt. Which country has the least debt. And what category of debt is highest across different countries. Does the income level has any effect on the debt level of the country? </a:t>
+              <a:t>would like to find out which country has the highest debt. Which country has the least debt. And what category of debt is highest across different countries. Does the income level has any effect on the debt level of the country? </a:t>
             </a:r>
           </a:p>
           <a:p>
@@ -4643,19 +4643,12 @@
               </a:tabLst>
             </a:pPr>
             <a:r>
-              <a:rPr lang="en-US" sz="2400" u="sng" dirty="0">
-                <a:ea typeface="Calibri" charset="0"/>
-                <a:cs typeface="Times New Roman" charset="0"/>
-              </a:rPr>
-              <a:t>Ans</a:t>
-            </a:r>
-            <a:r>
-              <a:rPr lang="en-US" sz="2400" u="sng" dirty="0">
+              <a:rPr lang="en-US" sz="2400" dirty="0" smtClean="0">
                 <a:effectLst/>
                 <a:ea typeface="Calibri" charset="0"/>
                 <a:cs typeface="Times New Roman" charset="0"/>
               </a:rPr>
-              <a:t>wer</a:t>
+              <a:t>We </a:t>
             </a:r>
             <a:r>
               <a:rPr lang="en-US" sz="2400" dirty="0">
@@ -4663,7 +4656,7 @@
                 <a:ea typeface="Calibri" charset="0"/>
                 <a:cs typeface="Times New Roman" charset="0"/>
               </a:rPr>
-              <a:t>: We will be doing this in</a:t>
+              <a:t>will be doing this in</a:t>
             </a:r>
             <a:r>
               <a:rPr lang="en-US" sz="2400" b="1" dirty="0">
@@ -4733,8 +4726,8 @@
         </p:nvSpPr>
         <p:spPr>
           <a:xfrm>
-            <a:off x="954154" y="1270619"/>
-            <a:ext cx="9939132" cy="3234219"/>
+            <a:off x="505788" y="689120"/>
+            <a:ext cx="11295147" cy="4119076"/>
           </a:xfrm>
           <a:prstGeom prst="rect">
             <a:avLst/>
@@ -4745,6 +4738,37 @@
             <a:spAutoFit/>
           </a:bodyPr>
           <a:lstStyle/>
+          <a:p>
+            <a:pPr marL="457200" indent="-228600">
+              <a:lnSpc>
+                <a:spcPts val="1500"/>
+              </a:lnSpc>
+              <a:spcAft>
+                <a:spcPts val="750"/>
+              </a:spcAft>
+            </a:pPr>
+            <a:r>
+              <a:rPr lang="en-US" sz="2400" b="1" u="sng" dirty="0">
+                <a:ea typeface="Calibri" charset="0"/>
+                <a:cs typeface="Times New Roman" charset="0"/>
+              </a:rPr>
+              <a:t>Project </a:t>
+            </a:r>
+            <a:r>
+              <a:rPr lang="en-US" sz="2400" b="1" u="sng" dirty="0" smtClean="0">
+                <a:ea typeface="Calibri" charset="0"/>
+                <a:cs typeface="Times New Roman" charset="0"/>
+              </a:rPr>
+              <a:t>Specifications</a:t>
+            </a:r>
+            <a:r>
+              <a:rPr lang="en-US" sz="2400" dirty="0">
+                <a:ea typeface="Calibri" charset="0"/>
+                <a:cs typeface="Times New Roman" charset="0"/>
+              </a:rPr>
+              <a:t> </a:t>
+            </a:r>
+          </a:p>
           <a:p>
             <a:pPr marL="457200" marR="0" indent="-228600">
               <a:lnSpc>
@@ -4757,12 +4781,36 @@
                 <a:spcPts val="750"/>
               </a:spcAft>
             </a:pPr>
+            <a:endParaRPr lang="en-US" sz="2400" dirty="0" smtClean="0">
+              <a:effectLst/>
+              <a:ea typeface="Times New Roman" charset="0"/>
+            </a:endParaRPr>
+          </a:p>
+          <a:p>
+            <a:pPr marL="457200" marR="0" indent="-228600">
+              <a:lnSpc>
+                <a:spcPts val="1500"/>
+              </a:lnSpc>
+              <a:spcBef>
+                <a:spcPts val="0"/>
+              </a:spcBef>
+              <a:spcAft>
+                <a:spcPts val="750"/>
+              </a:spcAft>
+            </a:pPr>
+            <a:r>
+              <a:rPr lang="en-US" sz="2400" dirty="0" smtClean="0">
+                <a:effectLst/>
+                <a:ea typeface="Times New Roman" charset="0"/>
+              </a:rPr>
+              <a:t>Data </a:t>
+            </a:r>
             <a:r>
               <a:rPr lang="en-US" sz="2400" dirty="0">
                 <a:effectLst/>
                 <a:ea typeface="Times New Roman" charset="0"/>
               </a:rPr>
-              <a:t>Data Size (How much MB or GB):</a:t>
+              <a:t>Size (How much MB or GB):</a:t>
             </a:r>
             <a:r>
               <a:rPr lang="en-US" sz="2400" dirty="0">
@@ -4773,13 +4821,40 @@
                 <a:ea typeface="Times New Roman" charset="0"/>
               </a:rPr>
               <a:t> </a:t>
+            </a:r>
+            <a:endParaRPr lang="en-US" sz="2400" dirty="0" smtClean="0">
+              <a:solidFill>
+                <a:srgbClr val="FF0000"/>
+              </a:solidFill>
+              <a:effectLst/>
+              <a:ea typeface="Times New Roman" charset="0"/>
+            </a:endParaRPr>
+          </a:p>
+          <a:p>
+            <a:pPr marL="457200" marR="0" indent="-228600">
+              <a:lnSpc>
+                <a:spcPts val="1500"/>
+              </a:lnSpc>
+              <a:spcBef>
+                <a:spcPts val="0"/>
+              </a:spcBef>
+              <a:spcAft>
+                <a:spcPts val="750"/>
+              </a:spcAft>
+            </a:pPr>
+            <a:r>
+              <a:rPr lang="en-US" sz="2400" dirty="0" smtClean="0">
+                <a:effectLst/>
+                <a:ea typeface="Times New Roman" charset="0"/>
+              </a:rPr>
+              <a:t>155 </a:t>
             </a:r>
             <a:r>
               <a:rPr lang="en-US" sz="2400" dirty="0">
                 <a:effectLst/>
                 <a:ea typeface="Times New Roman" charset="0"/>
               </a:rPr>
-              <a:t>155 MB</a:t>
+              <a:t>MB</a:t>
             </a:r>
           </a:p>
           <a:p>
@@ -4917,6 +4992,10 @@
               <a:rPr lang="en-US" sz="2400" dirty="0"/>
               <a:t>H/W experimental Specifications (Database server, CPU speed, Memory </a:t>
             </a:r>
+            <a:r>
+              <a:rPr lang="en-US" sz="2400" dirty="0" smtClean="0"/>
+              <a:t>Size):</a:t>
+            </a:r>
           </a:p>
           <a:p>
             <a:pPr marL="457200" indent="-228600">
@@ -4928,8 +5007,12 @@
               </a:spcAft>
             </a:pPr>
             <a:r>
+              <a:rPr lang="en-US" sz="2400" dirty="0" smtClean="0"/>
+              <a:t>MySQL </a:t>
+            </a:r>
+            <a:r>
               <a:rPr lang="en-US" sz="2400" dirty="0"/>
-              <a:t>Size): MySQL (5.7.19), 1GB </a:t>
+              <a:t>(5.7.19), 1GB </a:t>
             </a:r>
           </a:p>
           <a:p>
@@ -5014,8 +5097,8 @@
         </p:nvSpPr>
         <p:spPr>
           <a:xfrm>
-            <a:off x="1245704" y="1297125"/>
-            <a:ext cx="9090991" cy="1416734"/>
+            <a:off x="789130" y="674523"/>
+            <a:ext cx="9090991" cy="1762021"/>
           </a:xfrm>
           <a:prstGeom prst="rect">
             <a:avLst/>
@@ -5028,8 +5111,22 @@
           <a:lstStyle/>
           <a:p>
             <a:r>
-              <a:rPr lang="en-US" sz="2400" dirty="0"/>
-              <a:t>Originality: </a:t>
+              <a:rPr lang="en-US" sz="2400" b="1" u="sng" dirty="0" smtClean="0"/>
+              <a:t>Originality</a:t>
+            </a:r>
+            <a:r>
+              <a:rPr lang="en-US" sz="2400" dirty="0" smtClean="0"/>
+              <a:t> </a:t>
+            </a:r>
+          </a:p>
+          <a:p>
+            <a:r>
+              <a:rPr lang="en-US" sz="2400" dirty="0" smtClean="0">
+                <a:solidFill>
+                  <a:srgbClr val="FF0000"/>
+                </a:solidFill>
+              </a:rPr>
+              <a:t>20</a:t>
             </a:r>
             <a:r>
               <a:rPr lang="en-US" sz="2400" dirty="0">
@@ -5037,7 +5134,7 @@
                   <a:srgbClr val="FF0000"/>
                 </a:solidFill>
               </a:rPr>
-              <a:t>20%  &lt;Kim Wong&gt;</a:t>
+              <a:t>%  &lt;Kim Wong&gt;</a:t>
             </a:r>
           </a:p>
           <a:p>
@@ -5107,8 +5204,8 @@
         </p:nvSpPr>
         <p:spPr>
           <a:xfrm>
-            <a:off x="1101101" y="593900"/>
-            <a:ext cx="10666829" cy="6555641"/>
+            <a:off x="709786" y="487025"/>
+            <a:ext cx="10666829" cy="6370975"/>
           </a:xfrm>
           <a:prstGeom prst="rect">
             <a:avLst/>
@@ -5121,41 +5218,12 @@
           <a:lstStyle/>
           <a:p>
             <a:r>
-              <a:rPr lang="en-US" sz="2400" dirty="0"/>
-              <a:t>Insights/Deliverables of the analysis: </a:t>
-            </a:r>
-            <a:r>
-              <a:rPr lang="en-US" sz="2400" dirty="0">
-                <a:solidFill>
-                  <a:srgbClr val="FF0000"/>
-                </a:solidFill>
-              </a:rPr>
-              <a:t>(10%) </a:t>
-            </a:r>
-            <a:r>
-              <a:rPr lang="mr-IN" sz="2400" dirty="0">
-                <a:solidFill>
-                  <a:srgbClr val="FF0000"/>
-                </a:solidFill>
-              </a:rPr>
-              <a:t>–</a:t>
-            </a:r>
-            <a:r>
-              <a:rPr lang="en-US" sz="2400" dirty="0">
-                <a:solidFill>
-                  <a:srgbClr val="FF0000"/>
-                </a:solidFill>
-              </a:rPr>
-              <a:t> </a:t>
-            </a:r>
-            <a:r>
-              <a:rPr lang="en-US" sz="2400" dirty="0" err="1">
-                <a:solidFill>
-                  <a:srgbClr val="FF0000"/>
-                </a:solidFill>
-              </a:rPr>
-              <a:t>Chiran</a:t>
-            </a:r>
+              <a:rPr lang="en-US" sz="2400" b="1" u="sng" dirty="0" smtClean="0"/>
+              <a:t>Project Deliverables</a:t>
+            </a:r>
+            <a:endParaRPr lang="en-US" sz="2400" dirty="0" smtClean="0"/>
+          </a:p>
+          <a:p>
             <a:endParaRPr lang="en-US" sz="2400" dirty="0">
               <a:solidFill>
                 <a:srgbClr val="FF0000"/>
@@ -5163,13 +5231,6 @@
             </a:endParaRPr>
           </a:p>
           <a:p>
-            <a:endParaRPr lang="en-US" sz="2400" dirty="0">
-              <a:solidFill>
-                <a:srgbClr val="FF0000"/>
-              </a:solidFill>
-            </a:endParaRPr>
-          </a:p>
-          <a:p>
             <a:r>
               <a:rPr lang="en-US" sz="2400" dirty="0">
                 <a:effectLst/>
@@ -5181,21 +5242,21 @@
           </a:p>
           <a:p>
             <a:r>
-              <a:rPr lang="en-US" sz="2400" dirty="0">
-                <a:solidFill>
-                  <a:srgbClr val="FF0000"/>
+              <a:rPr lang="en-US" sz="2400" dirty="0" smtClean="0">
+                <a:solidFill>
+                  <a:srgbClr val="0432FF"/>
                 </a:solidFill>
                 <a:ea typeface="Calibri" charset="0"/>
                 <a:cs typeface="Times New Roman" charset="0"/>
               </a:rPr>
-              <a:t>China(CHN)</a:t>
+              <a:t>China </a:t>
             </a:r>
             <a:r>
               <a:rPr lang="en-US" sz="2400" dirty="0">
                 <a:ea typeface="Calibri" charset="0"/>
                 <a:cs typeface="Times New Roman" charset="0"/>
               </a:rPr>
-              <a:t> seems to have the highest external debt</a:t>
+              <a:t>seems to have the highest external debt</a:t>
             </a:r>
             <a:r>
               <a:rPr lang="en-US" sz="2400" baseline="30000" dirty="0">
@@ -5209,17 +5270,17 @@
                 <a:ea typeface="Calibri" charset="0"/>
                 <a:cs typeface="Times New Roman" charset="0"/>
               </a:rPr>
-              <a:t> i.e.</a:t>
+              <a:t> i.e</a:t>
             </a:r>
             <a:r>
               <a:rPr lang="en-US" sz="2400" dirty="0">
                 <a:solidFill>
-                  <a:srgbClr val="FF0000"/>
+                  <a:srgbClr val="0432FF"/>
                 </a:solidFill>
                 <a:ea typeface="Calibri" charset="0"/>
                 <a:cs typeface="Times New Roman" charset="0"/>
               </a:rPr>
-              <a:t>$1430 Billion </a:t>
+              <a:t>.$1430 Billion </a:t>
             </a:r>
             <a:r>
               <a:rPr lang="en-US" sz="2400" dirty="0">
@@ -5271,21 +5332,21 @@
           </a:p>
           <a:p>
             <a:r>
-              <a:rPr lang="en-US" sz="2400" dirty="0">
-                <a:solidFill>
-                  <a:srgbClr val="FF0000"/>
+              <a:rPr lang="en-US" sz="2400" dirty="0" smtClean="0">
+                <a:solidFill>
+                  <a:srgbClr val="0432FF"/>
                 </a:solidFill>
                 <a:ea typeface="Calibri" charset="0"/>
                 <a:cs typeface="Times New Roman" charset="0"/>
               </a:rPr>
-              <a:t>Tonga(TON – Polynesian Island)</a:t>
+              <a:t>Tonga(a Polynesian island) </a:t>
             </a:r>
             <a:r>
               <a:rPr lang="en-US" sz="2400" dirty="0">
                 <a:ea typeface="Calibri" charset="0"/>
                 <a:cs typeface="Times New Roman" charset="0"/>
               </a:rPr>
-              <a:t> seems to have the lowest external debt</a:t>
+              <a:t>seems to have the lowest external debt</a:t>
             </a:r>
             <a:r>
               <a:rPr lang="en-US" sz="2400" baseline="30000" dirty="0">
@@ -5299,17 +5360,17 @@
                 <a:ea typeface="Calibri" charset="0"/>
                 <a:cs typeface="Times New Roman" charset="0"/>
               </a:rPr>
-              <a:t> i.e.</a:t>
+              <a:t> i.e</a:t>
             </a:r>
             <a:r>
               <a:rPr lang="en-US" sz="2400" dirty="0">
                 <a:solidFill>
-                  <a:srgbClr val="FF0000"/>
+                  <a:srgbClr val="0432FF"/>
                 </a:solidFill>
                 <a:ea typeface="Calibri" charset="0"/>
                 <a:cs typeface="Times New Roman" charset="0"/>
               </a:rPr>
-              <a:t>$159.855 Million </a:t>
+              <a:t>.$159.855 Million </a:t>
             </a:r>
             <a:r>
               <a:rPr lang="en-US" sz="2400" dirty="0">
@@ -5318,21 +5379,26 @@
               </a:rPr>
               <a:t>across </a:t>
             </a:r>
-          </a:p>
-          <a:p>
-            <a:r>
-              <a:rPr lang="en-US" sz="2400" dirty="0">
+            <a:r>
+              <a:rPr lang="en-US" sz="2400" dirty="0" smtClean="0">
                 <a:ea typeface="Calibri" charset="0"/>
                 <a:cs typeface="Times New Roman" charset="0"/>
               </a:rPr>
               <a:t>all</a:t>
+            </a:r>
+            <a:r>
+              <a:rPr lang="en-US" sz="2400" baseline="30000" dirty="0" smtClean="0">
+                <a:ea typeface="Calibri" charset="0"/>
+                <a:cs typeface="Times New Roman" charset="0"/>
+              </a:rPr>
+              <a:t>[2</a:t>
             </a:r>
             <a:r>
               <a:rPr lang="en-US" sz="2400" baseline="30000" dirty="0">
                 <a:ea typeface="Calibri" charset="0"/>
                 <a:cs typeface="Times New Roman" charset="0"/>
               </a:rPr>
-              <a:t>[2]</a:t>
+              <a:t>]</a:t>
             </a:r>
             <a:r>
               <a:rPr lang="en-US" sz="2400" dirty="0">
@@ -5370,7 +5436,7 @@
             <a:r>
               <a:rPr lang="en-US" sz="2400" dirty="0">
                 <a:solidFill>
-                  <a:srgbClr val="FF0000"/>
+                  <a:srgbClr val="0432FF"/>
                 </a:solidFill>
               </a:rPr>
               <a:t>long-term external debt </a:t>
@@ -5383,7 +5449,47 @@
           <a:p>
             <a:r>
               <a:rPr lang="en-US" sz="2400" dirty="0"/>
-              <a:t>All countries. Within long-term debt, private non-guaranteed category contributes majorly towards the debt(</a:t>
+              <a:t>a</a:t>
+            </a:r>
+            <a:r>
+              <a:rPr lang="en-US" sz="2400" dirty="0" smtClean="0"/>
+              <a:t>ll</a:t>
+            </a:r>
+            <a:r>
+              <a:rPr lang="en-US" sz="2400" baseline="30000" dirty="0" smtClean="0"/>
+              <a:t>[2]</a:t>
+            </a:r>
+            <a:r>
+              <a:rPr lang="en-US" sz="2400" dirty="0" smtClean="0"/>
+              <a:t> </a:t>
+            </a:r>
+            <a:r>
+              <a:rPr lang="en-US" sz="2400" dirty="0"/>
+              <a:t>countries. Within long-term debt, </a:t>
+            </a:r>
+            <a:r>
+              <a:rPr lang="en-US" sz="2400" dirty="0">
+                <a:solidFill>
+                  <a:srgbClr val="0432FF"/>
+                </a:solidFill>
+              </a:rPr>
+              <a:t>private non-guaranteed </a:t>
+            </a:r>
+            <a:r>
+              <a:rPr lang="en-US" sz="2400" dirty="0"/>
+              <a:t>category contributes majorly towards the </a:t>
+            </a:r>
+            <a:r>
+              <a:rPr lang="en-US" sz="2400" dirty="0" smtClean="0"/>
+              <a:t>international debt(</a:t>
+            </a:r>
+            <a:r>
+              <a:rPr lang="en-US" sz="2400" b="1" dirty="0" smtClean="0">
+                <a:solidFill>
+                  <a:srgbClr val="FF0000"/>
+                </a:solidFill>
+              </a:rPr>
+              <a:t>49.4</a:t>
             </a:r>
             <a:r>
               <a:rPr lang="en-US" sz="2400" b="1" dirty="0">
@@ -5391,22 +5497,34 @@
                   <a:srgbClr val="FF0000"/>
                 </a:solidFill>
               </a:rPr>
-              <a:t>49.4%</a:t>
+              <a:t>%</a:t>
             </a:r>
             <a:r>
               <a:rPr lang="en-US" sz="2400" dirty="0"/>
-              <a:t>). Official creditors(WB entities) contributing </a:t>
-            </a:r>
-            <a:r>
-              <a:rPr lang="en-US" sz="2400" b="1" dirty="0">
+              <a:t>). Official </a:t>
+            </a:r>
+            <a:r>
+              <a:rPr lang="en-US" sz="2400" dirty="0" smtClean="0"/>
+              <a:t>creditors(World Bank </a:t>
+            </a:r>
+            <a:r>
+              <a:rPr lang="en-US" sz="2400" dirty="0"/>
+              <a:t>entities) contributing </a:t>
+            </a:r>
+            <a:r>
+              <a:rPr lang="en-US" sz="2400" dirty="0" smtClean="0"/>
+              <a:t>least (</a:t>
+            </a:r>
+            <a:r>
+              <a:rPr lang="en-US" sz="2400" b="1" dirty="0" smtClean="0">
                 <a:solidFill>
                   <a:srgbClr val="00B050"/>
                 </a:solidFill>
               </a:rPr>
-              <a:t>20%</a:t>
-            </a:r>
-            <a:r>
-              <a:rPr lang="en-US" sz="2400" dirty="0"/>
+              <a:t>20%)</a:t>
+            </a:r>
+            <a:r>
+              <a:rPr lang="en-US" sz="2400" b="1" dirty="0" smtClean="0"/>
               <a:t>.</a:t>
             </a:r>
             <a:endParaRPr lang="en-US" sz="1200" dirty="0">
@@ -5425,7 +5543,15 @@
           <a:p>
             <a:r>
               <a:rPr lang="en-US" sz="1200" dirty="0"/>
-              <a:t>[1]  External debt refers to external debt stocks which comprises of long-term debt, short-term debt, use of IMF credit	</a:t>
+              <a:t>[1]  External debt </a:t>
+            </a:r>
+            <a:r>
+              <a:rPr lang="en-US" sz="1200" dirty="0" smtClean="0"/>
+              <a:t>comprises </a:t>
+            </a:r>
+            <a:r>
+              <a:rPr lang="en-US" sz="1200" dirty="0"/>
+              <a:t>of long-term debt, short-term debt, use of IMF credit	</a:t>
             </a:r>
           </a:p>
           <a:p>
@@ -5482,8 +5608,8 @@
         </p:nvSpPr>
         <p:spPr>
           <a:xfrm>
-            <a:off x="1298712" y="1311965"/>
-            <a:ext cx="10835467" cy="3785652"/>
+            <a:off x="748123" y="697115"/>
+            <a:ext cx="10833863" cy="4154984"/>
           </a:xfrm>
           <a:prstGeom prst="rect">
             <a:avLst/>
@@ -5497,118 +5623,142 @@
           <a:lstStyle/>
           <a:p>
             <a:r>
+              <a:rPr lang="en-US" sz="2400" b="1" u="sng" dirty="0"/>
+              <a:t>Project </a:t>
+            </a:r>
+            <a:r>
+              <a:rPr lang="en-US" sz="2400" b="1" u="sng" dirty="0" smtClean="0"/>
+              <a:t>Deliverables - Continued</a:t>
+            </a:r>
+            <a:endParaRPr lang="en-US" sz="2400" dirty="0"/>
+          </a:p>
+          <a:p>
+            <a:endParaRPr lang="en-US" sz="2400" dirty="0" smtClean="0">
+              <a:effectLst/>
+              <a:ea typeface="Calibri" charset="0"/>
+              <a:cs typeface="Times New Roman" charset="0"/>
+            </a:endParaRPr>
+          </a:p>
+          <a:p>
+            <a:r>
+              <a:rPr lang="en-US" sz="2400" dirty="0" smtClean="0">
+                <a:effectLst/>
+                <a:ea typeface="Calibri" charset="0"/>
+                <a:cs typeface="Times New Roman" charset="0"/>
+              </a:rPr>
+              <a:t>Does </a:t>
+            </a:r>
+            <a:r>
               <a:rPr lang="en-US" sz="2400" dirty="0">
                 <a:effectLst/>
                 <a:ea typeface="Calibri" charset="0"/>
                 <a:cs typeface="Times New Roman" charset="0"/>
               </a:rPr>
-              <a:t>Does the income level has any effect on the debt level of the country?</a:t>
-            </a:r>
-          </a:p>
-          <a:p>
-            <a:endParaRPr lang="en-US" sz="2400" dirty="0">
+              <a:t>the income level has any effect on the debt level of the country?</a:t>
+            </a:r>
+          </a:p>
+          <a:p>
+            <a:r>
+              <a:rPr lang="en-US" sz="2400" dirty="0" smtClean="0"/>
+              <a:t>The </a:t>
+            </a:r>
+            <a:r>
+              <a:rPr lang="en-US" sz="2400" dirty="0"/>
+              <a:t>average debt of countries with </a:t>
+            </a:r>
+            <a:r>
+              <a:rPr lang="en-US" sz="2400" dirty="0">
+                <a:solidFill>
+                  <a:srgbClr val="0432FF"/>
+                </a:solidFill>
+              </a:rPr>
+              <a:t>Upper middle income level</a:t>
+            </a:r>
+            <a:r>
+              <a:rPr lang="en-US" sz="2400" dirty="0">
+                <a:solidFill>
+                  <a:srgbClr val="FF0000"/>
+                </a:solidFill>
+              </a:rPr>
+              <a:t> </a:t>
+            </a:r>
+            <a:r>
+              <a:rPr lang="en-US" sz="2400" dirty="0"/>
+              <a:t>seems to be </a:t>
+            </a:r>
+          </a:p>
+          <a:p>
+            <a:r>
+              <a:rPr lang="en-US" sz="2400" dirty="0"/>
+              <a:t>highest(</a:t>
+            </a:r>
+            <a:r>
+              <a:rPr lang="en-US" sz="2400" b="1" dirty="0">
+                <a:solidFill>
+                  <a:srgbClr val="FF0000"/>
+                </a:solidFill>
+              </a:rPr>
+              <a:t>64%</a:t>
+            </a:r>
+            <a:r>
+              <a:rPr lang="en-US" sz="2400" dirty="0"/>
+              <a:t>) among all the countries and </a:t>
+            </a:r>
+            <a:r>
+              <a:rPr lang="en-US" sz="2400" dirty="0">
+                <a:solidFill>
+                  <a:srgbClr val="0432FF"/>
+                </a:solidFill>
+              </a:rPr>
+              <a:t>Low income level </a:t>
+            </a:r>
+            <a:r>
+              <a:rPr lang="en-US" sz="2400" dirty="0"/>
+              <a:t>seems to be the least.</a:t>
+            </a:r>
+          </a:p>
+          <a:p>
+            <a:endParaRPr lang="en-US" sz="2400" dirty="0"/>
+          </a:p>
+          <a:p>
+            <a:endParaRPr lang="en-US" sz="2400" dirty="0"/>
+          </a:p>
+          <a:p>
+            <a:r>
+              <a:rPr lang="en-US" sz="2400" b="1" u="sng" dirty="0" err="1"/>
+              <a:t>Github</a:t>
+            </a:r>
+            <a:r>
+              <a:rPr lang="en-US" sz="2400" dirty="0"/>
+              <a:t> </a:t>
+            </a:r>
+            <a:r>
+              <a:rPr lang="en-US" sz="2400" dirty="0" smtClean="0"/>
+              <a:t>: </a:t>
+            </a:r>
+            <a:r>
+              <a:rPr lang="en-US" sz="2400" dirty="0">
+                <a:solidFill>
+                  <a:srgbClr val="FF0000"/>
+                </a:solidFill>
+                <a:hlinkClick r:id="rId2"/>
+              </a:rPr>
+              <a:t>https://</a:t>
+            </a:r>
+            <a:r>
+              <a:rPr lang="en-US" sz="2400" dirty="0" smtClean="0">
+                <a:solidFill>
+                  <a:srgbClr val="FF0000"/>
+                </a:solidFill>
+                <a:hlinkClick r:id="rId2"/>
+              </a:rPr>
+              <a:t>github.com/skc00/DBMS-Term-Project</a:t>
+            </a:r>
+            <a:endParaRPr lang="en-US" sz="2400" dirty="0" smtClean="0">
               <a:solidFill>
                 <a:srgbClr val="FF0000"/>
               </a:solidFill>
-              <a:ea typeface="Calibri" charset="0"/>
-              <a:cs typeface="Times New Roman" charset="0"/>
             </a:endParaRPr>
-          </a:p>
-          <a:p>
-            <a:r>
-              <a:rPr lang="en-US" sz="2400" dirty="0"/>
-              <a:t>The average debt of countries with </a:t>
-            </a:r>
-            <a:r>
-              <a:rPr lang="en-US" sz="2400" dirty="0">
-                <a:solidFill>
-                  <a:srgbClr val="FF0000"/>
-                </a:solidFill>
-              </a:rPr>
-              <a:t>Upper middle income level </a:t>
-            </a:r>
-            <a:r>
-              <a:rPr lang="en-US" sz="2400" dirty="0"/>
-              <a:t>seems to be </a:t>
-            </a:r>
-          </a:p>
-          <a:p>
-            <a:r>
-              <a:rPr lang="en-US" sz="2400" dirty="0"/>
-              <a:t>highest(</a:t>
-            </a:r>
-            <a:r>
-              <a:rPr lang="en-US" sz="2400" b="1" dirty="0">
-                <a:solidFill>
-                  <a:srgbClr val="FF0000"/>
-                </a:solidFill>
-              </a:rPr>
-              <a:t>64%</a:t>
-            </a:r>
-            <a:r>
-              <a:rPr lang="en-US" sz="2400" dirty="0"/>
-              <a:t>) among all the countries and </a:t>
-            </a:r>
-            <a:r>
-              <a:rPr lang="en-US" sz="2400" dirty="0">
-                <a:solidFill>
-                  <a:srgbClr val="FF0000"/>
-                </a:solidFill>
-              </a:rPr>
-              <a:t>Low income level </a:t>
-            </a:r>
-            <a:r>
-              <a:rPr lang="en-US" sz="2400" dirty="0"/>
-              <a:t>seems to be the least.</a:t>
-            </a:r>
-          </a:p>
-          <a:p>
-            <a:endParaRPr lang="en-US" sz="2400" dirty="0"/>
-          </a:p>
-          <a:p>
-            <a:endParaRPr lang="en-US" sz="2400" dirty="0"/>
-          </a:p>
-          <a:p>
-            <a:r>
-              <a:rPr lang="en-US" sz="2400" dirty="0" err="1"/>
-              <a:t>Github</a:t>
-            </a:r>
-            <a:r>
-              <a:rPr lang="en-US" sz="2400" dirty="0"/>
-              <a:t> link to </a:t>
-            </a:r>
-            <a:r>
-              <a:rPr lang="en-US" sz="2400" dirty="0" err="1"/>
-              <a:t>MySql</a:t>
-            </a:r>
-            <a:r>
-              <a:rPr lang="en-US" sz="2400" dirty="0"/>
-              <a:t> code: </a:t>
-            </a:r>
-            <a:r>
-              <a:rPr lang="en-US" sz="2400" dirty="0">
-                <a:solidFill>
-                  <a:srgbClr val="FF0000"/>
-                </a:solidFill>
-              </a:rPr>
-              <a:t>&lt;</a:t>
-            </a:r>
-            <a:r>
-              <a:rPr lang="en-US" sz="2400" dirty="0" err="1">
-                <a:solidFill>
-                  <a:srgbClr val="FF0000"/>
-                </a:solidFill>
-              </a:rPr>
-              <a:t>Sabitri</a:t>
-            </a:r>
-            <a:r>
-              <a:rPr lang="en-US" sz="2400" dirty="0">
-                <a:solidFill>
-                  <a:srgbClr val="FF0000"/>
-                </a:solidFill>
-              </a:rPr>
-              <a:t>&gt;</a:t>
-            </a:r>
           </a:p>
           <a:p>
             <a:endParaRPr lang="en-US" sz="2400" dirty="0"/>

</xml_diff>

<commit_message>
Countries in scope definition
</commit_message>
<xml_diff>
--- a/Term Presentation MSDS7330-404 GrpB.pptx
+++ b/Term Presentation MSDS7330-404 GrpB.pptx
@@ -5205,7 +5205,7 @@
         <p:spPr>
           <a:xfrm>
             <a:off x="709786" y="487025"/>
-            <a:ext cx="10666829" cy="6370975"/>
+            <a:ext cx="10666829" cy="6463308"/>
           </a:xfrm>
           <a:prstGeom prst="rect">
             <a:avLst/>
@@ -5557,16 +5557,29 @@
           <a:p>
             <a:r>
               <a:rPr lang="en-US" sz="1200" dirty="0"/>
-              <a:t>[2] The countries in scope for this exercise are only those countries that report debt to World bank </a:t>
-            </a:r>
-            <a:r>
-              <a:rPr lang="mr-IN" sz="1200" dirty="0"/>
+              <a:t>[2] The countries in scope for this exercise are only those countries </a:t>
+            </a:r>
+            <a:r>
+              <a:rPr lang="en-US" sz="1200" dirty="0" smtClean="0"/>
+              <a:t>that fall under low </a:t>
+            </a:r>
+            <a:r>
+              <a:rPr lang="en-US" sz="1200" dirty="0"/>
+              <a:t>and </a:t>
+            </a:r>
+            <a:r>
+              <a:rPr lang="en-US" sz="1200" dirty="0" smtClean="0"/>
+              <a:t>middle-income and report debt to World bank </a:t>
+            </a:r>
+            <a:r>
+              <a:rPr lang="mr-IN" sz="1200" dirty="0" smtClean="0"/>
               <a:t>–</a:t>
             </a:r>
             <a:r>
-              <a:rPr lang="en-US" sz="1200" dirty="0"/>
+              <a:rPr lang="en-US" sz="1200" dirty="0" smtClean="0"/>
               <a:t> excludes USA, Canada, Greenland and some of the european countries</a:t>
             </a:r>
+            <a:endParaRPr lang="en-US" sz="1200" dirty="0"/>
           </a:p>
         </p:txBody>
       </p:sp>

</xml_diff>

<commit_message>
Originality update from Kim
</commit_message>
<xml_diff>
--- a/Term Presentation MSDS7330-404 GrpB.pptx
+++ b/Term Presentation MSDS7330-404 GrpB.pptx
@@ -5,15 +5,17 @@
     <p:sldMasterId id="2147483906" r:id="rId1"/>
   </p:sldMasterIdLst>
   <p:notesMasterIdLst>
-    <p:notesMasterId r:id="rId8"/>
+    <p:notesMasterId r:id="rId10"/>
   </p:notesMasterIdLst>
   <p:sldIdLst>
     <p:sldId id="256" r:id="rId2"/>
     <p:sldId id="257" r:id="rId3"/>
     <p:sldId id="258" r:id="rId4"/>
     <p:sldId id="259" r:id="rId5"/>
-    <p:sldId id="260" r:id="rId6"/>
-    <p:sldId id="261" r:id="rId7"/>
+    <p:sldId id="263" r:id="rId6"/>
+    <p:sldId id="260" r:id="rId7"/>
+    <p:sldId id="261" r:id="rId8"/>
+    <p:sldId id="262" r:id="rId9"/>
   </p:sldIdLst>
   <p:sldSz cx="12192000" cy="6858000"/>
   <p:notesSz cx="6858000" cy="9144000"/>
@@ -4367,6 +4369,13 @@
   <p:clrMapOvr>
     <a:masterClrMapping/>
   </p:clrMapOvr>
+  <p:timing>
+    <p:tnLst>
+      <p:par>
+        <p:cTn id="1" dur="indefinite" restart="never" nodeType="tmRoot"/>
+      </p:par>
+    </p:tnLst>
+  </p:timing>
 </p:sld>
 </file>
 
@@ -4698,6 +4707,13 @@
   <p:clrMapOvr>
     <a:masterClrMapping/>
   </p:clrMapOvr>
+  <p:timing>
+    <p:tnLst>
+      <p:par>
+        <p:cTn id="1" dur="indefinite" restart="never" nodeType="tmRoot"/>
+      </p:par>
+    </p:tnLst>
+  </p:timing>
 </p:sld>
 </file>
 
@@ -5069,6 +5085,13 @@
   <p:clrMapOvr>
     <a:masterClrMapping/>
   </p:clrMapOvr>
+  <p:timing>
+    <p:tnLst>
+      <p:par>
+        <p:cTn id="1" dur="indefinite" restart="never" nodeType="tmRoot"/>
+      </p:par>
+    </p:tnLst>
+  </p:timing>
 </p:sld>
 </file>
 
@@ -5097,8 +5120,8 @@
         </p:nvSpPr>
         <p:spPr>
           <a:xfrm>
-            <a:off x="789130" y="674523"/>
-            <a:ext cx="9090991" cy="1762021"/>
+            <a:off x="789130" y="688377"/>
+            <a:ext cx="11292034" cy="5455340"/>
           </a:xfrm>
           <a:prstGeom prst="rect">
             <a:avLst/>
@@ -5112,35 +5135,148 @@
           <a:p>
             <a:r>
               <a:rPr lang="en-US" sz="2400" b="1" u="sng" dirty="0" smtClean="0"/>
-              <a:t>Originality</a:t>
-            </a:r>
+              <a:t>Originality of our work:</a:t>
+            </a:r>
+          </a:p>
+          <a:p>
             <a:r>
               <a:rPr lang="en-US" sz="2400" dirty="0" smtClean="0"/>
               <a:t> </a:t>
             </a:r>
-          </a:p>
-          <a:p>
+            <a:endParaRPr lang="en-US" sz="2400" dirty="0" smtClean="0"/>
+          </a:p>
+          <a:p>
+            <a:pPr fontAlgn="base"/>
+            <a:r>
+              <a:rPr lang="en-US" sz="2400" dirty="0"/>
+              <a:t>While Google analysis is about </a:t>
+            </a:r>
+            <a:r>
+              <a:rPr lang="en-US" sz="2400" dirty="0">
+                <a:solidFill>
+                  <a:srgbClr val="0432FF"/>
+                </a:solidFill>
+              </a:rPr>
+              <a:t>Present Value of External Debt</a:t>
+            </a:r>
+            <a:r>
+              <a:rPr lang="en-US" sz="2400" dirty="0"/>
+              <a:t>, we focus on </a:t>
+            </a:r>
+            <a:r>
+              <a:rPr lang="en-US" sz="2400" dirty="0">
+                <a:solidFill>
+                  <a:srgbClr val="0432FF"/>
+                </a:solidFill>
+              </a:rPr>
+              <a:t>debt outstanding as of Year 2016</a:t>
+            </a:r>
+            <a:r>
+              <a:rPr lang="en-US" sz="2400" dirty="0"/>
+              <a:t>. This is to ensure we have comparable analysis (on the same </a:t>
+            </a:r>
+            <a:r>
+              <a:rPr lang="en-US" sz="2400" dirty="0" smtClean="0"/>
+              <a:t>terms) </a:t>
+            </a:r>
+            <a:r>
+              <a:rPr lang="en-US" sz="2400" dirty="0"/>
+              <a:t>and minimize the need to make assumptions on what is the relevant rate to discount specific currency, given country-specific circumstances and changes that may happen over the life of the debt. In </a:t>
+            </a:r>
+            <a:r>
+              <a:rPr lang="en-US" sz="2400" dirty="0" smtClean="0"/>
+              <a:t>addition,</a:t>
+            </a:r>
+            <a:r>
+              <a:rPr lang="en-US" sz="2400" dirty="0"/>
+              <a:t> </a:t>
+            </a:r>
+            <a:r>
+              <a:rPr lang="en-US" sz="2400" dirty="0">
+                <a:solidFill>
+                  <a:srgbClr val="0432FF"/>
+                </a:solidFill>
+              </a:rPr>
+              <a:t>2016 had the most </a:t>
+            </a:r>
             <a:r>
               <a:rPr lang="en-US" sz="2400" dirty="0" smtClean="0">
                 <a:solidFill>
-                  <a:srgbClr val="FF0000"/>
-                </a:solidFill>
-              </a:rPr>
-              <a:t>20</a:t>
+                  <a:srgbClr val="0432FF"/>
+                </a:solidFill>
+              </a:rPr>
+              <a:t>complete </a:t>
             </a:r>
             <a:r>
               <a:rPr lang="en-US" sz="2400" dirty="0">
                 <a:solidFill>
-                  <a:srgbClr val="FF0000"/>
-                </a:solidFill>
-              </a:rPr>
-              <a:t>%  &lt;Kim Wong&gt;</a:t>
-            </a:r>
-          </a:p>
-          <a:p>
+                  <a:srgbClr val="0432FF"/>
+                </a:solidFill>
+              </a:rPr>
+              <a:t>data </a:t>
+            </a:r>
             <a:r>
               <a:rPr lang="en-US" sz="2400" dirty="0"/>
-              <a:t>How unique your idea different from the existing data analysis (10%) </a:t>
+              <a:t>to date for most </a:t>
+            </a:r>
+            <a:r>
+              <a:rPr lang="en-US" sz="2400" dirty="0" smtClean="0"/>
+              <a:t>countries.</a:t>
+            </a:r>
+            <a:endParaRPr lang="en-US" sz="2400" dirty="0"/>
+          </a:p>
+          <a:p>
+            <a:pPr fontAlgn="base"/>
+            <a:r>
+              <a:rPr lang="en-US" sz="2400" dirty="0"/>
+              <a:t> </a:t>
+            </a:r>
+          </a:p>
+          <a:p>
+            <a:pPr fontAlgn="base"/>
+            <a:r>
+              <a:rPr lang="en-US" sz="2400" dirty="0"/>
+              <a:t>We also venture into a </a:t>
+            </a:r>
+            <a:r>
+              <a:rPr lang="en-US" sz="2400" dirty="0">
+                <a:solidFill>
+                  <a:srgbClr val="0432FF"/>
+                </a:solidFill>
+              </a:rPr>
+              <a:t>new perspective</a:t>
+            </a:r>
+            <a:r>
+              <a:rPr lang="en-US" sz="2400" dirty="0"/>
+              <a:t>, analyzing metrics such </a:t>
+            </a:r>
+            <a:r>
+              <a:rPr lang="en-US" sz="2400" dirty="0" smtClean="0"/>
+              <a:t>as debts </a:t>
+            </a:r>
+            <a:r>
+              <a:rPr lang="en-US" sz="2400" dirty="0" smtClean="0">
+                <a:solidFill>
+                  <a:srgbClr val="0432FF"/>
+                </a:solidFill>
+              </a:rPr>
+              <a:t>via official creditors vs private non guaranteed,</a:t>
+            </a:r>
+            <a:r>
+              <a:rPr lang="en-US" sz="2400" dirty="0" smtClean="0"/>
+              <a:t> </a:t>
+            </a:r>
+            <a:r>
+              <a:rPr lang="en-US" sz="2400" dirty="0">
+                <a:solidFill>
+                  <a:srgbClr val="0432FF"/>
+                </a:solidFill>
+              </a:rPr>
+              <a:t>income level </a:t>
+            </a:r>
+            <a:r>
+              <a:rPr lang="en-US" sz="2400" dirty="0"/>
+              <a:t>of the country and distribution of most owned debt categories. This will expand our understanding of what kind of debt instrument were widely used and what income level have access to such instruments. </a:t>
             </a:r>
           </a:p>
           <a:p>
@@ -5176,6 +5312,13 @@
   <p:clrMapOvr>
     <a:masterClrMapping/>
   </p:clrMapOvr>
+  <p:timing>
+    <p:tnLst>
+      <p:par>
+        <p:cTn id="1" dur="indefinite" restart="never" nodeType="tmRoot"/>
+      </p:par>
+    </p:tnLst>
+  </p:timing>
 </p:sld>
 </file>
 
@@ -5198,401 +5341,107 @@
       </p:grpSpPr>
       <p:sp>
         <p:nvSpPr>
-          <p:cNvPr id="4" name="Rectangle 3"/>
-          <p:cNvSpPr/>
+          <p:cNvPr id="4" name="TextBox 3"/>
+          <p:cNvSpPr txBox="1"/>
           <p:nvPr/>
         </p:nvSpPr>
         <p:spPr>
           <a:xfrm>
-            <a:off x="709786" y="487025"/>
-            <a:ext cx="10666829" cy="6463308"/>
+            <a:off x="748122" y="184497"/>
+            <a:ext cx="5902060" cy="2677656"/>
+          </a:xfrm>
+          <a:prstGeom prst="rect">
+            <a:avLst/>
+          </a:prstGeom>
+          <a:noFill/>
+        </p:spPr>
+        <p:txBody>
+          <a:bodyPr wrap="square" rtlCol="0">
+            <a:spAutoFit/>
+          </a:bodyPr>
+          <a:lstStyle/>
+          <a:p>
+            <a:r>
+              <a:rPr lang="en-US" sz="2400" b="1" u="sng" dirty="0" smtClean="0"/>
+              <a:t>Project Background :</a:t>
+            </a:r>
+            <a:r>
+              <a:rPr lang="en-US" sz="2400" b="1" dirty="0" smtClean="0"/>
+              <a:t> Debt classification</a:t>
+            </a:r>
+            <a:endParaRPr lang="en-US" sz="2400" dirty="0"/>
+          </a:p>
+          <a:p>
+            <a:endParaRPr lang="en-US" sz="2400" dirty="0" smtClean="0">
+              <a:effectLst/>
+              <a:ea typeface="Calibri" charset="0"/>
+              <a:cs typeface="Times New Roman" charset="0"/>
+            </a:endParaRPr>
+          </a:p>
+          <a:p>
+            <a:endParaRPr lang="en-US" sz="2400" dirty="0"/>
+          </a:p>
+          <a:p>
+            <a:endParaRPr lang="en-US" sz="2400" dirty="0"/>
+          </a:p>
+          <a:p>
+            <a:endParaRPr lang="en-US" sz="2400" dirty="0"/>
+          </a:p>
+          <a:p>
+            <a:endParaRPr lang="en-US" sz="2400" dirty="0"/>
+          </a:p>
+          <a:p>
+            <a:endParaRPr lang="en-US" sz="2400" dirty="0"/>
+          </a:p>
+        </p:txBody>
+      </p:sp>
+      <p:pic>
+        <p:nvPicPr>
+          <p:cNvPr id="2" name="Picture 1"/>
+          <p:cNvPicPr>
+            <a:picLocks noChangeAspect="1"/>
+          </p:cNvPicPr>
+          <p:nvPr/>
+        </p:nvPicPr>
+        <p:blipFill>
+          <a:blip r:embed="rId2">
+            <a:extLst>
+              <a:ext uri="{28A0092B-C50C-407E-A947-70E740481C1C}">
+                <a14:useLocalDpi xmlns:a14="http://schemas.microsoft.com/office/drawing/2010/main" val="0"/>
+              </a:ext>
+            </a:extLst>
+          </a:blip>
+          <a:stretch>
+            <a:fillRect/>
+          </a:stretch>
+        </p:blipFill>
+        <p:spPr>
+          <a:xfrm>
+            <a:off x="2639279" y="1104181"/>
+            <a:ext cx="7594600" cy="5262113"/>
           </a:xfrm>
           <a:prstGeom prst="rect">
             <a:avLst/>
           </a:prstGeom>
         </p:spPr>
-        <p:txBody>
-          <a:bodyPr wrap="square">
-            <a:spAutoFit/>
-          </a:bodyPr>
-          <a:lstStyle/>
-          <a:p>
-            <a:r>
-              <a:rPr lang="en-US" sz="2400" b="1" u="sng" dirty="0" smtClean="0"/>
-              <a:t>Project Deliverables</a:t>
-            </a:r>
-            <a:endParaRPr lang="en-US" sz="2400" dirty="0" smtClean="0"/>
-          </a:p>
-          <a:p>
-            <a:endParaRPr lang="en-US" sz="2400" dirty="0">
-              <a:solidFill>
-                <a:srgbClr val="FF0000"/>
-              </a:solidFill>
-            </a:endParaRPr>
-          </a:p>
-          <a:p>
-            <a:r>
-              <a:rPr lang="en-US" sz="2400" dirty="0">
-                <a:effectLst/>
-                <a:ea typeface="Calibri" charset="0"/>
-                <a:cs typeface="Times New Roman" charset="0"/>
-              </a:rPr>
-              <a:t>Which country has the highest debt?</a:t>
-            </a:r>
-          </a:p>
-          <a:p>
-            <a:r>
-              <a:rPr lang="en-US" sz="2400" dirty="0" smtClean="0">
-                <a:solidFill>
-                  <a:srgbClr val="0432FF"/>
-                </a:solidFill>
-                <a:ea typeface="Calibri" charset="0"/>
-                <a:cs typeface="Times New Roman" charset="0"/>
-              </a:rPr>
-              <a:t>China </a:t>
-            </a:r>
-            <a:r>
-              <a:rPr lang="en-US" sz="2400" dirty="0">
-                <a:ea typeface="Calibri" charset="0"/>
-                <a:cs typeface="Times New Roman" charset="0"/>
-              </a:rPr>
-              <a:t>seems to have the highest external debt</a:t>
-            </a:r>
-            <a:r>
-              <a:rPr lang="en-US" sz="2400" baseline="30000" dirty="0">
-                <a:ea typeface="Calibri" charset="0"/>
-                <a:cs typeface="Times New Roman" charset="0"/>
-              </a:rPr>
-              <a:t>[1]</a:t>
-            </a:r>
-            <a:r>
-              <a:rPr lang="en-US" sz="2400" dirty="0">
-                <a:ea typeface="Calibri" charset="0"/>
-                <a:cs typeface="Times New Roman" charset="0"/>
-              </a:rPr>
-              <a:t> i.e</a:t>
-            </a:r>
-            <a:r>
-              <a:rPr lang="en-US" sz="2400" dirty="0">
-                <a:solidFill>
-                  <a:srgbClr val="0432FF"/>
-                </a:solidFill>
-                <a:ea typeface="Calibri" charset="0"/>
-                <a:cs typeface="Times New Roman" charset="0"/>
-              </a:rPr>
-              <a:t>.$1430 Billion </a:t>
-            </a:r>
-            <a:r>
-              <a:rPr lang="en-US" sz="2400" dirty="0">
-                <a:ea typeface="Calibri" charset="0"/>
-                <a:cs typeface="Times New Roman" charset="0"/>
-              </a:rPr>
-              <a:t>across </a:t>
-            </a:r>
-          </a:p>
-          <a:p>
-            <a:r>
-              <a:rPr lang="en-US" sz="2400" dirty="0">
-                <a:ea typeface="Calibri" charset="0"/>
-                <a:cs typeface="Times New Roman" charset="0"/>
-              </a:rPr>
-              <a:t>all</a:t>
-            </a:r>
-            <a:r>
-              <a:rPr lang="en-US" sz="2400" baseline="30000" dirty="0">
-                <a:ea typeface="Calibri" charset="0"/>
-                <a:cs typeface="Times New Roman" charset="0"/>
-              </a:rPr>
-              <a:t>[2]</a:t>
-            </a:r>
-            <a:r>
-              <a:rPr lang="en-US" sz="2400" dirty="0">
-                <a:ea typeface="Calibri" charset="0"/>
-                <a:cs typeface="Times New Roman" charset="0"/>
-              </a:rPr>
-              <a:t> countries </a:t>
-            </a:r>
-          </a:p>
-          <a:p>
-            <a:endParaRPr lang="en-US" sz="2400" dirty="0">
-              <a:effectLst/>
-              <a:ea typeface="Calibri" charset="0"/>
-              <a:cs typeface="Times New Roman" charset="0"/>
-            </a:endParaRPr>
-          </a:p>
-          <a:p>
-            <a:r>
-              <a:rPr lang="en-US" sz="2400" dirty="0">
-                <a:effectLst/>
-                <a:ea typeface="Calibri" charset="0"/>
-                <a:cs typeface="Times New Roman" charset="0"/>
-              </a:rPr>
-              <a:t>Which country has the least debt?</a:t>
-            </a:r>
-          </a:p>
-          <a:p>
-            <a:r>
-              <a:rPr lang="en-US" sz="2400" dirty="0" smtClean="0">
-                <a:solidFill>
-                  <a:srgbClr val="0432FF"/>
-                </a:solidFill>
-                <a:ea typeface="Calibri" charset="0"/>
-                <a:cs typeface="Times New Roman" charset="0"/>
-              </a:rPr>
-              <a:t>Tonga(a Polynesian island) </a:t>
-            </a:r>
-            <a:r>
-              <a:rPr lang="en-US" sz="2400" dirty="0">
-                <a:ea typeface="Calibri" charset="0"/>
-                <a:cs typeface="Times New Roman" charset="0"/>
-              </a:rPr>
-              <a:t>seems to have the lowest external debt</a:t>
-            </a:r>
-            <a:r>
-              <a:rPr lang="en-US" sz="2400" baseline="30000" dirty="0">
-                <a:ea typeface="Calibri" charset="0"/>
-                <a:cs typeface="Times New Roman" charset="0"/>
-              </a:rPr>
-              <a:t>[1]</a:t>
-            </a:r>
-            <a:r>
-              <a:rPr lang="en-US" sz="2400" dirty="0">
-                <a:ea typeface="Calibri" charset="0"/>
-                <a:cs typeface="Times New Roman" charset="0"/>
-              </a:rPr>
-              <a:t> i.e</a:t>
-            </a:r>
-            <a:r>
-              <a:rPr lang="en-US" sz="2400" dirty="0">
-                <a:solidFill>
-                  <a:srgbClr val="0432FF"/>
-                </a:solidFill>
-                <a:ea typeface="Calibri" charset="0"/>
-                <a:cs typeface="Times New Roman" charset="0"/>
-              </a:rPr>
-              <a:t>.$159.855 Million </a:t>
-            </a:r>
-            <a:r>
-              <a:rPr lang="en-US" sz="2400" dirty="0">
-                <a:ea typeface="Calibri" charset="0"/>
-                <a:cs typeface="Times New Roman" charset="0"/>
-              </a:rPr>
-              <a:t>across </a:t>
-            </a:r>
-            <a:r>
-              <a:rPr lang="en-US" sz="2400" dirty="0" smtClean="0">
-                <a:ea typeface="Calibri" charset="0"/>
-                <a:cs typeface="Times New Roman" charset="0"/>
-              </a:rPr>
-              <a:t>all</a:t>
-            </a:r>
-            <a:r>
-              <a:rPr lang="en-US" sz="2400" baseline="30000" dirty="0" smtClean="0">
-                <a:ea typeface="Calibri" charset="0"/>
-                <a:cs typeface="Times New Roman" charset="0"/>
-              </a:rPr>
-              <a:t>[2</a:t>
-            </a:r>
-            <a:r>
-              <a:rPr lang="en-US" sz="2400" baseline="30000" dirty="0">
-                <a:ea typeface="Calibri" charset="0"/>
-                <a:cs typeface="Times New Roman" charset="0"/>
-              </a:rPr>
-              <a:t>]</a:t>
-            </a:r>
-            <a:r>
-              <a:rPr lang="en-US" sz="2400" dirty="0">
-                <a:ea typeface="Calibri" charset="0"/>
-                <a:cs typeface="Times New Roman" charset="0"/>
-              </a:rPr>
-              <a:t> countries </a:t>
-            </a:r>
-          </a:p>
-          <a:p>
-            <a:endParaRPr lang="en-US" sz="2400" dirty="0">
-              <a:effectLst/>
-              <a:ea typeface="Calibri" charset="0"/>
-              <a:cs typeface="Times New Roman" charset="0"/>
-            </a:endParaRPr>
-          </a:p>
-          <a:p>
-            <a:r>
-              <a:rPr lang="en-US" sz="2400" dirty="0">
-                <a:effectLst/>
-                <a:ea typeface="Calibri" charset="0"/>
-                <a:cs typeface="Times New Roman" charset="0"/>
-              </a:rPr>
-              <a:t>What category of debt is highest across different countries?</a:t>
-            </a:r>
-          </a:p>
-          <a:p>
-            <a:r>
-              <a:rPr lang="en-US" sz="2400" dirty="0">
-                <a:ea typeface="Calibri" charset="0"/>
-                <a:cs typeface="Times New Roman" charset="0"/>
-              </a:rPr>
-              <a:t>On an average </a:t>
-            </a:r>
-            <a:r>
-              <a:rPr lang="en-US" sz="2400" dirty="0">
-                <a:solidFill>
-                  <a:srgbClr val="0432FF"/>
-                </a:solidFill>
-              </a:rPr>
-              <a:t>long-term external debt </a:t>
-            </a:r>
-            <a:r>
-              <a:rPr lang="en-US" sz="2400" dirty="0"/>
-              <a:t>seems to be highest across </a:t>
-            </a:r>
-          </a:p>
-          <a:p>
-            <a:r>
-              <a:rPr lang="en-US" sz="2400" dirty="0"/>
-              <a:t>a</a:t>
-            </a:r>
-            <a:r>
-              <a:rPr lang="en-US" sz="2400" dirty="0" smtClean="0"/>
-              <a:t>ll</a:t>
-            </a:r>
-            <a:r>
-              <a:rPr lang="en-US" sz="2400" baseline="30000" dirty="0" smtClean="0"/>
-              <a:t>[2]</a:t>
-            </a:r>
-            <a:r>
-              <a:rPr lang="en-US" sz="2400" dirty="0" smtClean="0"/>
-              <a:t> </a:t>
-            </a:r>
-            <a:r>
-              <a:rPr lang="en-US" sz="2400" dirty="0"/>
-              <a:t>countries. Within long-term debt, </a:t>
-            </a:r>
-            <a:r>
-              <a:rPr lang="en-US" sz="2400" dirty="0">
-                <a:solidFill>
-                  <a:srgbClr val="0432FF"/>
-                </a:solidFill>
-              </a:rPr>
-              <a:t>private non-guaranteed </a:t>
-            </a:r>
-            <a:r>
-              <a:rPr lang="en-US" sz="2400" dirty="0"/>
-              <a:t>category contributes majorly towards the </a:t>
-            </a:r>
-            <a:r>
-              <a:rPr lang="en-US" sz="2400" dirty="0" smtClean="0"/>
-              <a:t>international debt(</a:t>
-            </a:r>
-            <a:r>
-              <a:rPr lang="en-US" sz="2400" b="1" dirty="0" smtClean="0">
-                <a:solidFill>
-                  <a:srgbClr val="FF0000"/>
-                </a:solidFill>
-              </a:rPr>
-              <a:t>49.4</a:t>
-            </a:r>
-            <a:r>
-              <a:rPr lang="en-US" sz="2400" b="1" dirty="0">
-                <a:solidFill>
-                  <a:srgbClr val="FF0000"/>
-                </a:solidFill>
-              </a:rPr>
-              <a:t>%</a:t>
-            </a:r>
-            <a:r>
-              <a:rPr lang="en-US" sz="2400" dirty="0"/>
-              <a:t>). Official </a:t>
-            </a:r>
-            <a:r>
-              <a:rPr lang="en-US" sz="2400" dirty="0" smtClean="0"/>
-              <a:t>creditors(World Bank </a:t>
-            </a:r>
-            <a:r>
-              <a:rPr lang="en-US" sz="2400" dirty="0"/>
-              <a:t>entities) contributing </a:t>
-            </a:r>
-            <a:r>
-              <a:rPr lang="en-US" sz="2400" dirty="0" smtClean="0"/>
-              <a:t>least (</a:t>
-            </a:r>
-            <a:r>
-              <a:rPr lang="en-US" sz="2400" b="1" dirty="0" smtClean="0">
-                <a:solidFill>
-                  <a:srgbClr val="00B050"/>
-                </a:solidFill>
-              </a:rPr>
-              <a:t>20%)</a:t>
-            </a:r>
-            <a:r>
-              <a:rPr lang="en-US" sz="2400" b="1" dirty="0" smtClean="0"/>
-              <a:t>.</a:t>
-            </a:r>
-            <a:endParaRPr lang="en-US" sz="1200" dirty="0">
-              <a:solidFill>
-                <a:srgbClr val="FF0000"/>
-              </a:solidFill>
-            </a:endParaRPr>
-          </a:p>
-          <a:p>
-            <a:endParaRPr lang="en-US" sz="1200" dirty="0">
-              <a:solidFill>
-                <a:srgbClr val="FF0000"/>
-              </a:solidFill>
-            </a:endParaRPr>
-          </a:p>
-          <a:p>
-            <a:r>
-              <a:rPr lang="en-US" sz="1200" dirty="0"/>
-              <a:t>[1]  External debt </a:t>
-            </a:r>
-            <a:r>
-              <a:rPr lang="en-US" sz="1200" dirty="0" smtClean="0"/>
-              <a:t>comprises </a:t>
-            </a:r>
-            <a:r>
-              <a:rPr lang="en-US" sz="1200" dirty="0"/>
-              <a:t>of long-term debt, short-term debt, use of IMF credit	</a:t>
-            </a:r>
-          </a:p>
-          <a:p>
-            <a:r>
-              <a:rPr lang="en-US" sz="1200" dirty="0"/>
-              <a:t>[2] The countries in scope for this exercise are only those countries </a:t>
-            </a:r>
-            <a:r>
-              <a:rPr lang="en-US" sz="1200" dirty="0" smtClean="0"/>
-              <a:t>that fall under low </a:t>
-            </a:r>
-            <a:r>
-              <a:rPr lang="en-US" sz="1200" dirty="0"/>
-              <a:t>and </a:t>
-            </a:r>
-            <a:r>
-              <a:rPr lang="en-US" sz="1200" dirty="0" smtClean="0"/>
-              <a:t>middle-income and report debt to World bank </a:t>
-            </a:r>
-            <a:r>
-              <a:rPr lang="mr-IN" sz="1200" dirty="0" smtClean="0"/>
-              <a:t>–</a:t>
-            </a:r>
-            <a:r>
-              <a:rPr lang="en-US" sz="1200" dirty="0" smtClean="0"/>
-              <a:t> excludes USA, Canada, Greenland and some of the european countries</a:t>
-            </a:r>
-            <a:endParaRPr lang="en-US" sz="1200" dirty="0"/>
-          </a:p>
-        </p:txBody>
-      </p:sp>
+      </p:pic>
     </p:spTree>
     <p:extLst>
       <p:ext uri="{BB962C8B-B14F-4D97-AF65-F5344CB8AC3E}">
-        <p14:creationId xmlns:p14="http://schemas.microsoft.com/office/powerpoint/2010/main" val="2027746872"/>
+        <p14:creationId xmlns:p14="http://schemas.microsoft.com/office/powerpoint/2010/main" val="1047208648"/>
       </p:ext>
     </p:extLst>
   </p:cSld>
   <p:clrMapOvr>
     <a:masterClrMapping/>
   </p:clrMapOvr>
+  <p:timing>
+    <p:tnLst>
+      <p:par>
+        <p:cTn id="1" dur="indefinite" restart="never" nodeType="tmRoot"/>
+      </p:par>
+    </p:tnLst>
+  </p:timing>
 </p:sld>
 </file>
 
@@ -5615,6 +5464,430 @@
       </p:grpSpPr>
       <p:sp>
         <p:nvSpPr>
+          <p:cNvPr id="4" name="Rectangle 3"/>
+          <p:cNvSpPr/>
+          <p:nvPr/>
+        </p:nvSpPr>
+        <p:spPr>
+          <a:xfrm>
+            <a:off x="709786" y="487025"/>
+            <a:ext cx="10666829" cy="6463308"/>
+          </a:xfrm>
+          <a:prstGeom prst="rect">
+            <a:avLst/>
+          </a:prstGeom>
+        </p:spPr>
+        <p:txBody>
+          <a:bodyPr wrap="square">
+            <a:spAutoFit/>
+          </a:bodyPr>
+          <a:lstStyle/>
+          <a:p>
+            <a:r>
+              <a:rPr lang="en-US" sz="2400" b="1" u="sng" dirty="0" smtClean="0"/>
+              <a:t>Project Deliverables</a:t>
+            </a:r>
+            <a:endParaRPr lang="en-US" sz="2400" dirty="0" smtClean="0"/>
+          </a:p>
+          <a:p>
+            <a:endParaRPr lang="en-US" sz="2400" dirty="0">
+              <a:solidFill>
+                <a:srgbClr val="FF0000"/>
+              </a:solidFill>
+            </a:endParaRPr>
+          </a:p>
+          <a:p>
+            <a:r>
+              <a:rPr lang="en-US" sz="2400" dirty="0">
+                <a:effectLst/>
+                <a:ea typeface="Calibri" charset="0"/>
+                <a:cs typeface="Times New Roman" charset="0"/>
+              </a:rPr>
+              <a:t>Which country has the highest debt?</a:t>
+            </a:r>
+          </a:p>
+          <a:p>
+            <a:r>
+              <a:rPr lang="en-US" sz="2400" dirty="0" smtClean="0">
+                <a:solidFill>
+                  <a:srgbClr val="0432FF"/>
+                </a:solidFill>
+                <a:ea typeface="Calibri" charset="0"/>
+                <a:cs typeface="Times New Roman" charset="0"/>
+              </a:rPr>
+              <a:t>China </a:t>
+            </a:r>
+            <a:r>
+              <a:rPr lang="en-US" sz="2400" dirty="0">
+                <a:ea typeface="Calibri" charset="0"/>
+                <a:cs typeface="Times New Roman" charset="0"/>
+              </a:rPr>
+              <a:t>seems to have the highest external debt</a:t>
+            </a:r>
+            <a:r>
+              <a:rPr lang="en-US" sz="2400" baseline="30000" dirty="0">
+                <a:ea typeface="Calibri" charset="0"/>
+                <a:cs typeface="Times New Roman" charset="0"/>
+              </a:rPr>
+              <a:t>[1]</a:t>
+            </a:r>
+            <a:r>
+              <a:rPr lang="en-US" sz="2400" dirty="0">
+                <a:ea typeface="Calibri" charset="0"/>
+                <a:cs typeface="Times New Roman" charset="0"/>
+              </a:rPr>
+              <a:t> i.e</a:t>
+            </a:r>
+            <a:r>
+              <a:rPr lang="en-US" sz="2400" dirty="0">
+                <a:solidFill>
+                  <a:srgbClr val="0432FF"/>
+                </a:solidFill>
+                <a:ea typeface="Calibri" charset="0"/>
+                <a:cs typeface="Times New Roman" charset="0"/>
+              </a:rPr>
+              <a:t>.$1430 Billion </a:t>
+            </a:r>
+            <a:r>
+              <a:rPr lang="en-US" sz="2400" dirty="0">
+                <a:ea typeface="Calibri" charset="0"/>
+                <a:cs typeface="Times New Roman" charset="0"/>
+              </a:rPr>
+              <a:t>across </a:t>
+            </a:r>
+          </a:p>
+          <a:p>
+            <a:r>
+              <a:rPr lang="en-US" sz="2400" dirty="0">
+                <a:ea typeface="Calibri" charset="0"/>
+                <a:cs typeface="Times New Roman" charset="0"/>
+              </a:rPr>
+              <a:t>all</a:t>
+            </a:r>
+            <a:r>
+              <a:rPr lang="en-US" sz="2400" baseline="30000" dirty="0">
+                <a:ea typeface="Calibri" charset="0"/>
+                <a:cs typeface="Times New Roman" charset="0"/>
+              </a:rPr>
+              <a:t>[2]</a:t>
+            </a:r>
+            <a:r>
+              <a:rPr lang="en-US" sz="2400" dirty="0">
+                <a:ea typeface="Calibri" charset="0"/>
+                <a:cs typeface="Times New Roman" charset="0"/>
+              </a:rPr>
+              <a:t> countries </a:t>
+            </a:r>
+          </a:p>
+          <a:p>
+            <a:endParaRPr lang="en-US" sz="2400" dirty="0">
+              <a:effectLst/>
+              <a:ea typeface="Calibri" charset="0"/>
+              <a:cs typeface="Times New Roman" charset="0"/>
+            </a:endParaRPr>
+          </a:p>
+          <a:p>
+            <a:r>
+              <a:rPr lang="en-US" sz="2400" dirty="0">
+                <a:effectLst/>
+                <a:ea typeface="Calibri" charset="0"/>
+                <a:cs typeface="Times New Roman" charset="0"/>
+              </a:rPr>
+              <a:t>Which country has the least debt?</a:t>
+            </a:r>
+          </a:p>
+          <a:p>
+            <a:r>
+              <a:rPr lang="en-US" sz="2400" dirty="0" smtClean="0">
+                <a:solidFill>
+                  <a:srgbClr val="0432FF"/>
+                </a:solidFill>
+                <a:ea typeface="Calibri" charset="0"/>
+                <a:cs typeface="Times New Roman" charset="0"/>
+              </a:rPr>
+              <a:t>Tonga(a Polynesian island) </a:t>
+            </a:r>
+            <a:r>
+              <a:rPr lang="en-US" sz="2400" dirty="0">
+                <a:ea typeface="Calibri" charset="0"/>
+                <a:cs typeface="Times New Roman" charset="0"/>
+              </a:rPr>
+              <a:t>seems to have the lowest external debt</a:t>
+            </a:r>
+            <a:r>
+              <a:rPr lang="en-US" sz="2400" baseline="30000" dirty="0">
+                <a:ea typeface="Calibri" charset="0"/>
+                <a:cs typeface="Times New Roman" charset="0"/>
+              </a:rPr>
+              <a:t>[1]</a:t>
+            </a:r>
+            <a:r>
+              <a:rPr lang="en-US" sz="2400" dirty="0">
+                <a:ea typeface="Calibri" charset="0"/>
+                <a:cs typeface="Times New Roman" charset="0"/>
+              </a:rPr>
+              <a:t> i.e</a:t>
+            </a:r>
+            <a:r>
+              <a:rPr lang="en-US" sz="2400" dirty="0">
+                <a:solidFill>
+                  <a:srgbClr val="0432FF"/>
+                </a:solidFill>
+                <a:ea typeface="Calibri" charset="0"/>
+                <a:cs typeface="Times New Roman" charset="0"/>
+              </a:rPr>
+              <a:t>.$159.855 Million </a:t>
+            </a:r>
+            <a:r>
+              <a:rPr lang="en-US" sz="2400" dirty="0">
+                <a:ea typeface="Calibri" charset="0"/>
+                <a:cs typeface="Times New Roman" charset="0"/>
+              </a:rPr>
+              <a:t>across </a:t>
+            </a:r>
+            <a:r>
+              <a:rPr lang="en-US" sz="2400" dirty="0" smtClean="0">
+                <a:ea typeface="Calibri" charset="0"/>
+                <a:cs typeface="Times New Roman" charset="0"/>
+              </a:rPr>
+              <a:t>all</a:t>
+            </a:r>
+            <a:r>
+              <a:rPr lang="en-US" sz="2400" baseline="30000" dirty="0" smtClean="0">
+                <a:ea typeface="Calibri" charset="0"/>
+                <a:cs typeface="Times New Roman" charset="0"/>
+              </a:rPr>
+              <a:t>[2</a:t>
+            </a:r>
+            <a:r>
+              <a:rPr lang="en-US" sz="2400" baseline="30000" dirty="0">
+                <a:ea typeface="Calibri" charset="0"/>
+                <a:cs typeface="Times New Roman" charset="0"/>
+              </a:rPr>
+              <a:t>]</a:t>
+            </a:r>
+            <a:r>
+              <a:rPr lang="en-US" sz="2400" dirty="0">
+                <a:ea typeface="Calibri" charset="0"/>
+                <a:cs typeface="Times New Roman" charset="0"/>
+              </a:rPr>
+              <a:t> countries </a:t>
+            </a:r>
+          </a:p>
+          <a:p>
+            <a:endParaRPr lang="en-US" sz="2400" dirty="0">
+              <a:effectLst/>
+              <a:ea typeface="Calibri" charset="0"/>
+              <a:cs typeface="Times New Roman" charset="0"/>
+            </a:endParaRPr>
+          </a:p>
+          <a:p>
+            <a:r>
+              <a:rPr lang="en-US" sz="2400" dirty="0">
+                <a:effectLst/>
+                <a:ea typeface="Calibri" charset="0"/>
+                <a:cs typeface="Times New Roman" charset="0"/>
+              </a:rPr>
+              <a:t>What category of debt is highest across different countries?</a:t>
+            </a:r>
+          </a:p>
+          <a:p>
+            <a:r>
+              <a:rPr lang="en-US" sz="2400" dirty="0">
+                <a:ea typeface="Calibri" charset="0"/>
+                <a:cs typeface="Times New Roman" charset="0"/>
+              </a:rPr>
+              <a:t>On an average </a:t>
+            </a:r>
+            <a:r>
+              <a:rPr lang="en-US" sz="2400" dirty="0">
+                <a:solidFill>
+                  <a:srgbClr val="0432FF"/>
+                </a:solidFill>
+              </a:rPr>
+              <a:t>long-term external debt </a:t>
+            </a:r>
+            <a:r>
+              <a:rPr lang="en-US" sz="2400" dirty="0"/>
+              <a:t>seems to be highest across </a:t>
+            </a:r>
+          </a:p>
+          <a:p>
+            <a:r>
+              <a:rPr lang="en-US" sz="2400" dirty="0"/>
+              <a:t>a</a:t>
+            </a:r>
+            <a:r>
+              <a:rPr lang="en-US" sz="2400" dirty="0" smtClean="0"/>
+              <a:t>ll</a:t>
+            </a:r>
+            <a:r>
+              <a:rPr lang="en-US" sz="2400" baseline="30000" dirty="0" smtClean="0"/>
+              <a:t>[2]</a:t>
+            </a:r>
+            <a:r>
+              <a:rPr lang="en-US" sz="2400" dirty="0" smtClean="0"/>
+              <a:t> </a:t>
+            </a:r>
+            <a:r>
+              <a:rPr lang="en-US" sz="2400" dirty="0"/>
+              <a:t>countries. Within long-term debt, </a:t>
+            </a:r>
+            <a:r>
+              <a:rPr lang="en-US" sz="2400" dirty="0">
+                <a:solidFill>
+                  <a:srgbClr val="0432FF"/>
+                </a:solidFill>
+              </a:rPr>
+              <a:t>private non-guaranteed </a:t>
+            </a:r>
+            <a:r>
+              <a:rPr lang="en-US" sz="2400" dirty="0"/>
+              <a:t>category contributes majorly towards the </a:t>
+            </a:r>
+            <a:r>
+              <a:rPr lang="en-US" sz="2400" dirty="0" smtClean="0"/>
+              <a:t>international debt(</a:t>
+            </a:r>
+            <a:r>
+              <a:rPr lang="en-US" sz="2400" b="1" dirty="0" smtClean="0">
+                <a:solidFill>
+                  <a:srgbClr val="FF0000"/>
+                </a:solidFill>
+              </a:rPr>
+              <a:t>49.4</a:t>
+            </a:r>
+            <a:r>
+              <a:rPr lang="en-US" sz="2400" b="1" dirty="0">
+                <a:solidFill>
+                  <a:srgbClr val="FF0000"/>
+                </a:solidFill>
+              </a:rPr>
+              <a:t>%</a:t>
+            </a:r>
+            <a:r>
+              <a:rPr lang="en-US" sz="2400" dirty="0"/>
+              <a:t>). Official </a:t>
+            </a:r>
+            <a:r>
+              <a:rPr lang="en-US" sz="2400" dirty="0" smtClean="0"/>
+              <a:t>creditors(World Bank </a:t>
+            </a:r>
+            <a:r>
+              <a:rPr lang="en-US" sz="2400" dirty="0"/>
+              <a:t>entities) contributing </a:t>
+            </a:r>
+            <a:r>
+              <a:rPr lang="en-US" sz="2400" dirty="0" smtClean="0"/>
+              <a:t>least (</a:t>
+            </a:r>
+            <a:r>
+              <a:rPr lang="en-US" sz="2400" b="1" dirty="0" smtClean="0">
+                <a:solidFill>
+                  <a:srgbClr val="00B050"/>
+                </a:solidFill>
+              </a:rPr>
+              <a:t>20%)</a:t>
+            </a:r>
+            <a:r>
+              <a:rPr lang="en-US" sz="2400" b="1" dirty="0" smtClean="0"/>
+              <a:t>.</a:t>
+            </a:r>
+            <a:endParaRPr lang="en-US" sz="1200" dirty="0">
+              <a:solidFill>
+                <a:srgbClr val="FF0000"/>
+              </a:solidFill>
+            </a:endParaRPr>
+          </a:p>
+          <a:p>
+            <a:endParaRPr lang="en-US" sz="1200" dirty="0">
+              <a:solidFill>
+                <a:srgbClr val="FF0000"/>
+              </a:solidFill>
+            </a:endParaRPr>
+          </a:p>
+          <a:p>
+            <a:r>
+              <a:rPr lang="en-US" sz="1200" dirty="0"/>
+              <a:t>[1]  External debt </a:t>
+            </a:r>
+            <a:r>
+              <a:rPr lang="en-US" sz="1200" dirty="0" smtClean="0"/>
+              <a:t>comprises </a:t>
+            </a:r>
+            <a:r>
+              <a:rPr lang="en-US" sz="1200" dirty="0"/>
+              <a:t>of long-term debt, short-term debt, use of IMF credit	</a:t>
+            </a:r>
+          </a:p>
+          <a:p>
+            <a:r>
+              <a:rPr lang="en-US" sz="1200" dirty="0"/>
+              <a:t>[2] The countries in scope for this exercise are only those countries </a:t>
+            </a:r>
+            <a:r>
+              <a:rPr lang="en-US" sz="1200" dirty="0" smtClean="0"/>
+              <a:t>that fall under low </a:t>
+            </a:r>
+            <a:r>
+              <a:rPr lang="en-US" sz="1200" dirty="0"/>
+              <a:t>and </a:t>
+            </a:r>
+            <a:r>
+              <a:rPr lang="en-US" sz="1200" dirty="0" smtClean="0"/>
+              <a:t>middle-income and report debt to World bank </a:t>
+            </a:r>
+            <a:r>
+              <a:rPr lang="mr-IN" sz="1200" dirty="0" smtClean="0"/>
+              <a:t>–</a:t>
+            </a:r>
+            <a:r>
+              <a:rPr lang="en-US" sz="1200" dirty="0" smtClean="0"/>
+              <a:t> excludes USA, Canada, Greenland and some of the european countries</a:t>
+            </a:r>
+            <a:endParaRPr lang="en-US" sz="1200" dirty="0"/>
+          </a:p>
+        </p:txBody>
+      </p:sp>
+    </p:spTree>
+    <p:extLst>
+      <p:ext uri="{BB962C8B-B14F-4D97-AF65-F5344CB8AC3E}">
+        <p14:creationId xmlns:p14="http://schemas.microsoft.com/office/powerpoint/2010/main" val="2027746872"/>
+      </p:ext>
+    </p:extLst>
+  </p:cSld>
+  <p:clrMapOvr>
+    <a:masterClrMapping/>
+  </p:clrMapOvr>
+  <p:timing>
+    <p:tnLst>
+      <p:par>
+        <p:cTn id="1" dur="indefinite" restart="never" nodeType="tmRoot"/>
+      </p:par>
+    </p:tnLst>
+  </p:timing>
+</p:sld>
+</file>
+
+<file path=ppt/slides/slide7.xml><?xml version="1.0" encoding="utf-8"?>
+<p:sld xmlns:a="http://schemas.openxmlformats.org/drawingml/2006/main" xmlns:r="http://schemas.openxmlformats.org/officeDocument/2006/relationships" xmlns:p="http://schemas.openxmlformats.org/presentationml/2006/main">
+  <p:cSld>
+    <p:spTree>
+      <p:nvGrpSpPr>
+        <p:cNvPr id="1" name=""/>
+        <p:cNvGrpSpPr/>
+        <p:nvPr/>
+      </p:nvGrpSpPr>
+      <p:grpSpPr>
+        <a:xfrm>
+          <a:off x="0" y="0"/>
+          <a:ext cx="0" cy="0"/>
+          <a:chOff x="0" y="0"/>
+          <a:chExt cx="0" cy="0"/>
+        </a:xfrm>
+      </p:grpSpPr>
+      <p:sp>
+        <p:nvSpPr>
           <p:cNvPr id="4" name="TextBox 3"/>
           <p:cNvSpPr txBox="1"/>
           <p:nvPr/>
@@ -5788,6 +6061,110 @@
     <p:extLst>
       <p:ext uri="{BB962C8B-B14F-4D97-AF65-F5344CB8AC3E}">
         <p14:creationId xmlns:p14="http://schemas.microsoft.com/office/powerpoint/2010/main" val="1448400585"/>
+      </p:ext>
+    </p:extLst>
+  </p:cSld>
+  <p:clrMapOvr>
+    <a:masterClrMapping/>
+  </p:clrMapOvr>
+</p:sld>
+</file>
+
+<file path=ppt/slides/slide8.xml><?xml version="1.0" encoding="utf-8"?>
+<p:sld xmlns:a="http://schemas.openxmlformats.org/drawingml/2006/main" xmlns:r="http://schemas.openxmlformats.org/officeDocument/2006/relationships" xmlns:p="http://schemas.openxmlformats.org/presentationml/2006/main">
+  <p:cSld>
+    <p:spTree>
+      <p:nvGrpSpPr>
+        <p:cNvPr id="1" name=""/>
+        <p:cNvGrpSpPr/>
+        <p:nvPr/>
+      </p:nvGrpSpPr>
+      <p:grpSpPr>
+        <a:xfrm>
+          <a:off x="0" y="0"/>
+          <a:ext cx="0" cy="0"/>
+          <a:chOff x="0" y="0"/>
+          <a:chExt cx="0" cy="0"/>
+        </a:xfrm>
+      </p:grpSpPr>
+      <p:sp>
+        <p:nvSpPr>
+          <p:cNvPr id="4" name="TextBox 3"/>
+          <p:cNvSpPr txBox="1"/>
+          <p:nvPr/>
+        </p:nvSpPr>
+        <p:spPr>
+          <a:xfrm>
+            <a:off x="748123" y="392315"/>
+            <a:ext cx="9870844" cy="3046988"/>
+          </a:xfrm>
+          <a:prstGeom prst="rect">
+            <a:avLst/>
+          </a:prstGeom>
+          <a:noFill/>
+        </p:spPr>
+        <p:txBody>
+          <a:bodyPr wrap="none" rtlCol="0">
+            <a:spAutoFit/>
+          </a:bodyPr>
+          <a:lstStyle/>
+          <a:p>
+            <a:r>
+              <a:rPr lang="en-US" sz="2400" b="1" u="sng" dirty="0" smtClean="0"/>
+              <a:t>References</a:t>
+            </a:r>
+            <a:endParaRPr lang="en-US" sz="2400" dirty="0"/>
+          </a:p>
+          <a:p>
+            <a:endParaRPr lang="en-US" sz="2400" dirty="0" smtClean="0">
+              <a:effectLst/>
+              <a:ea typeface="Calibri" charset="0"/>
+              <a:cs typeface="Times New Roman" charset="0"/>
+            </a:endParaRPr>
+          </a:p>
+          <a:p>
+            <a:r>
+              <a:rPr lang="en-US" sz="2400" dirty="0">
+                <a:ea typeface="Calibri" charset="0"/>
+                <a:cs typeface="Times New Roman" charset="0"/>
+                <a:hlinkClick r:id="rId2"/>
+              </a:rPr>
+              <a:t>http://</a:t>
+            </a:r>
+            <a:r>
+              <a:rPr lang="en-US" sz="2400" dirty="0" smtClean="0">
+                <a:ea typeface="Calibri" charset="0"/>
+                <a:cs typeface="Times New Roman" charset="0"/>
+                <a:hlinkClick r:id="rId2"/>
+              </a:rPr>
+              <a:t>databank.worldbank.org/data/download/site-content/IDS-2018.pdf</a:t>
+            </a:r>
+            <a:endParaRPr lang="en-US" sz="2400" dirty="0" smtClean="0">
+              <a:ea typeface="Calibri" charset="0"/>
+              <a:cs typeface="Times New Roman" charset="0"/>
+            </a:endParaRPr>
+          </a:p>
+          <a:p>
+            <a:endParaRPr lang="en-US" sz="2400" dirty="0"/>
+          </a:p>
+          <a:p>
+            <a:endParaRPr lang="en-US" sz="2400" dirty="0"/>
+          </a:p>
+          <a:p>
+            <a:endParaRPr lang="en-US" sz="2400" dirty="0"/>
+          </a:p>
+          <a:p>
+            <a:endParaRPr lang="en-US" sz="2400" dirty="0"/>
+          </a:p>
+          <a:p>
+            <a:endParaRPr lang="en-US" sz="2400" dirty="0"/>
+          </a:p>
+        </p:txBody>
+      </p:sp>
+    </p:spTree>
+    <p:extLst>
+      <p:ext uri="{BB962C8B-B14F-4D97-AF65-F5344CB8AC3E}">
+        <p14:creationId xmlns:p14="http://schemas.microsoft.com/office/powerpoint/2010/main" val="1355907221"/>
       </p:ext>
     </p:extLst>
   </p:cSld>

</xml_diff>